<commit_message>
Fixes for circular motion L2
</commit_message>
<xml_diff>
--- a/content/12phy/as91171/assets/figures.pptx
+++ b/content/12phy/as91171/assets/figures.pptx
@@ -5,7 +5,7 @@
     <p:sldMasterId id="2147483648" r:id="rId1"/>
   </p:sldMasterIdLst>
   <p:notesMasterIdLst>
-    <p:notesMasterId r:id="rId18"/>
+    <p:notesMasterId r:id="rId19"/>
   </p:notesMasterIdLst>
   <p:sldIdLst>
     <p:sldId id="256" r:id="rId2"/>
@@ -24,6 +24,7 @@
     <p:sldId id="271" r:id="rId15"/>
     <p:sldId id="272" r:id="rId16"/>
     <p:sldId id="273" r:id="rId17"/>
+    <p:sldId id="274" r:id="rId18"/>
   </p:sldIdLst>
   <p:sldSz cx="12192000" cy="6858000"/>
   <p:notesSz cx="6858000" cy="9144000"/>
@@ -6236,8 +6237,8 @@
           </a:p>
         </p:txBody>
       </p:sp>
-      <mc:AlternateContent xmlns:mc="http://schemas.openxmlformats.org/markup-compatibility/2006">
-        <mc:Choice xmlns:a14="http://schemas.microsoft.com/office/drawing/2010/main" Requires="a14">
+      <mc:AlternateContent xmlns:mc="http://schemas.openxmlformats.org/markup-compatibility/2006" xmlns:a14="http://schemas.microsoft.com/office/drawing/2010/main">
+        <mc:Choice Requires="a14">
           <p:sp>
             <p:nvSpPr>
               <p:cNvPr id="12" name="TextBox 11">
@@ -6266,6 +6267,7 @@
               </a:bodyPr>
               <a:lstStyle/>
               <a:p>
+                <a:pPr/>
                 <a14:m>
                   <m:oMathPara xmlns:m="http://schemas.openxmlformats.org/officeDocument/2006/math">
                     <m:oMathParaPr>
@@ -6317,7 +6319,7 @@
             </p:txBody>
           </p:sp>
         </mc:Choice>
-        <mc:Fallback>
+        <mc:Fallback xmlns="">
           <p:sp>
             <p:nvSpPr>
               <p:cNvPr id="12" name="TextBox 11">
@@ -6633,8 +6635,8 @@
           </a:p>
         </p:txBody>
       </p:sp>
-      <mc:AlternateContent xmlns:mc="http://schemas.openxmlformats.org/markup-compatibility/2006">
-        <mc:Choice xmlns:a14="http://schemas.microsoft.com/office/drawing/2010/main" Requires="a14">
+      <mc:AlternateContent xmlns:mc="http://schemas.openxmlformats.org/markup-compatibility/2006" xmlns:a14="http://schemas.microsoft.com/office/drawing/2010/main">
+        <mc:Choice Requires="a14">
           <p:sp>
             <p:nvSpPr>
               <p:cNvPr id="12" name="TextBox 11">
@@ -6715,7 +6717,7 @@
             </p:txBody>
           </p:sp>
         </mc:Choice>
-        <mc:Fallback>
+        <mc:Fallback xmlns="">
           <p:sp>
             <p:nvSpPr>
               <p:cNvPr id="12" name="TextBox 11">
@@ -6818,6 +6820,483 @@
     <p:extLst>
       <p:ext uri="{BB962C8B-B14F-4D97-AF65-F5344CB8AC3E}">
         <p14:creationId xmlns:p14="http://schemas.microsoft.com/office/powerpoint/2010/main" val="3422602442"/>
+      </p:ext>
+    </p:extLst>
+  </p:cSld>
+  <p:clrMapOvr>
+    <a:masterClrMapping/>
+  </p:clrMapOvr>
+</p:sld>
+</file>
+
+<file path=ppt/slides/slide17.xml><?xml version="1.0" encoding="utf-8"?>
+<p:sld xmlns:a="http://schemas.openxmlformats.org/drawingml/2006/main" xmlns:r="http://schemas.openxmlformats.org/officeDocument/2006/relationships" xmlns:p="http://schemas.openxmlformats.org/presentationml/2006/main">
+  <p:cSld>
+    <p:spTree>
+      <p:nvGrpSpPr>
+        <p:cNvPr id="1" name=""/>
+        <p:cNvGrpSpPr/>
+        <p:nvPr/>
+      </p:nvGrpSpPr>
+      <p:grpSpPr>
+        <a:xfrm>
+          <a:off x="0" y="0"/>
+          <a:ext cx="0" cy="0"/>
+          <a:chOff x="0" y="0"/>
+          <a:chExt cx="0" cy="0"/>
+        </a:xfrm>
+      </p:grpSpPr>
+      <p:sp>
+        <p:nvSpPr>
+          <p:cNvPr id="8" name="Rectangle 7">
+            <a:extLst>
+              <a:ext uri="{FF2B5EF4-FFF2-40B4-BE49-F238E27FC236}">
+                <a16:creationId xmlns:a16="http://schemas.microsoft.com/office/drawing/2014/main" id="{16D5C1A2-B54A-9443-A4AC-9C5072BD2217}"/>
+              </a:ext>
+            </a:extLst>
+          </p:cNvPr>
+          <p:cNvSpPr/>
+          <p:nvPr/>
+        </p:nvSpPr>
+        <p:spPr>
+          <a:xfrm>
+            <a:off x="6096000" y="3398178"/>
+            <a:ext cx="2065106" cy="82194"/>
+          </a:xfrm>
+          <a:prstGeom prst="rect">
+            <a:avLst/>
+          </a:prstGeom>
+          <a:solidFill>
+            <a:schemeClr val="accent2"/>
+          </a:solidFill>
+          <a:ln>
+            <a:noFill/>
+          </a:ln>
+        </p:spPr>
+        <p:style>
+          <a:lnRef idx="2">
+            <a:schemeClr val="accent1">
+              <a:shade val="50000"/>
+            </a:schemeClr>
+          </a:lnRef>
+          <a:fillRef idx="1">
+            <a:schemeClr val="accent1"/>
+          </a:fillRef>
+          <a:effectRef idx="0">
+            <a:schemeClr val="accent1"/>
+          </a:effectRef>
+          <a:fontRef idx="minor">
+            <a:schemeClr val="lt1"/>
+          </a:fontRef>
+        </p:style>
+        <p:txBody>
+          <a:bodyPr rtlCol="0" anchor="ctr"/>
+          <a:lstStyle/>
+          <a:p>
+            <a:pPr algn="ctr"/>
+            <a:endParaRPr lang="en-GB"/>
+          </a:p>
+        </p:txBody>
+      </p:sp>
+      <p:sp>
+        <p:nvSpPr>
+          <p:cNvPr id="5" name="Oval 4">
+            <a:extLst>
+              <a:ext uri="{FF2B5EF4-FFF2-40B4-BE49-F238E27FC236}">
+                <a16:creationId xmlns:a16="http://schemas.microsoft.com/office/drawing/2014/main" id="{1CA7CFEB-60BA-3742-9A79-978087A169F3}"/>
+              </a:ext>
+            </a:extLst>
+          </p:cNvPr>
+          <p:cNvSpPr/>
+          <p:nvPr/>
+        </p:nvSpPr>
+        <p:spPr>
+          <a:xfrm>
+            <a:off x="4030894" y="1363894"/>
+            <a:ext cx="4130212" cy="4130212"/>
+          </a:xfrm>
+          <a:prstGeom prst="ellipse">
+            <a:avLst/>
+          </a:prstGeom>
+          <a:noFill/>
+          <a:ln w="76200"/>
+        </p:spPr>
+        <p:style>
+          <a:lnRef idx="2">
+            <a:schemeClr val="accent1">
+              <a:shade val="50000"/>
+            </a:schemeClr>
+          </a:lnRef>
+          <a:fillRef idx="1">
+            <a:schemeClr val="accent1"/>
+          </a:fillRef>
+          <a:effectRef idx="0">
+            <a:schemeClr val="accent1"/>
+          </a:effectRef>
+          <a:fontRef idx="minor">
+            <a:schemeClr val="lt1"/>
+          </a:fontRef>
+        </p:style>
+        <p:txBody>
+          <a:bodyPr rtlCol="0" anchor="ctr"/>
+          <a:lstStyle/>
+          <a:p>
+            <a:pPr algn="ctr"/>
+            <a:endParaRPr lang="en-GB"/>
+          </a:p>
+        </p:txBody>
+      </p:sp>
+      <p:sp>
+        <p:nvSpPr>
+          <p:cNvPr id="9" name="TextBox 8">
+            <a:extLst>
+              <a:ext uri="{FF2B5EF4-FFF2-40B4-BE49-F238E27FC236}">
+                <a16:creationId xmlns:a16="http://schemas.microsoft.com/office/drawing/2014/main" id="{A2A77EB5-44B4-294E-AF3F-8DE374A6063F}"/>
+              </a:ext>
+            </a:extLst>
+          </p:cNvPr>
+          <p:cNvSpPr txBox="1"/>
+          <p:nvPr/>
+        </p:nvSpPr>
+        <p:spPr>
+          <a:xfrm>
+            <a:off x="6765312" y="2895597"/>
+            <a:ext cx="1043876" cy="584775"/>
+          </a:xfrm>
+          <a:prstGeom prst="rect">
+            <a:avLst/>
+          </a:prstGeom>
+          <a:noFill/>
+        </p:spPr>
+        <p:txBody>
+          <a:bodyPr wrap="none" rtlCol="0">
+            <a:spAutoFit/>
+          </a:bodyPr>
+          <a:lstStyle/>
+          <a:p>
+            <a:r>
+              <a:rPr lang="en-GB" sz="3200" b="1" dirty="0"/>
+              <a:t>0.3m</a:t>
+            </a:r>
+          </a:p>
+        </p:txBody>
+      </p:sp>
+      <p:sp>
+        <p:nvSpPr>
+          <p:cNvPr id="11" name="Up Arrow 10">
+            <a:extLst>
+              <a:ext uri="{FF2B5EF4-FFF2-40B4-BE49-F238E27FC236}">
+                <a16:creationId xmlns:a16="http://schemas.microsoft.com/office/drawing/2014/main" id="{917A6D33-9FBB-0A4B-896C-9F9DA0C3E16C}"/>
+              </a:ext>
+            </a:extLst>
+          </p:cNvPr>
+          <p:cNvSpPr/>
+          <p:nvPr/>
+        </p:nvSpPr>
+        <p:spPr>
+          <a:xfrm>
+            <a:off x="8073346" y="934948"/>
+            <a:ext cx="175517" cy="2545424"/>
+          </a:xfrm>
+          <a:prstGeom prst="upArrow">
+            <a:avLst/>
+          </a:prstGeom>
+          <a:solidFill>
+            <a:schemeClr val="accent4"/>
+          </a:solidFill>
+          <a:ln>
+            <a:noFill/>
+          </a:ln>
+        </p:spPr>
+        <p:style>
+          <a:lnRef idx="2">
+            <a:schemeClr val="accent1">
+              <a:shade val="50000"/>
+            </a:schemeClr>
+          </a:lnRef>
+          <a:fillRef idx="1">
+            <a:schemeClr val="accent1"/>
+          </a:fillRef>
+          <a:effectRef idx="0">
+            <a:schemeClr val="accent1"/>
+          </a:effectRef>
+          <a:fontRef idx="minor">
+            <a:schemeClr val="lt1"/>
+          </a:fontRef>
+        </p:style>
+        <p:txBody>
+          <a:bodyPr rtlCol="0" anchor="ctr"/>
+          <a:lstStyle/>
+          <a:p>
+            <a:pPr algn="ctr"/>
+            <a:endParaRPr lang="en-GB"/>
+          </a:p>
+        </p:txBody>
+      </p:sp>
+      <mc:AlternateContent xmlns:mc="http://schemas.openxmlformats.org/markup-compatibility/2006">
+        <mc:Choice xmlns:a14="http://schemas.microsoft.com/office/drawing/2010/main" Requires="a14">
+          <p:sp>
+            <p:nvSpPr>
+              <p:cNvPr id="12" name="TextBox 11">
+                <a:extLst>
+                  <a:ext uri="{FF2B5EF4-FFF2-40B4-BE49-F238E27FC236}">
+                    <a16:creationId xmlns:a16="http://schemas.microsoft.com/office/drawing/2014/main" id="{0257E436-6FEB-5F41-8193-F0059AA642EE}"/>
+                  </a:ext>
+                </a:extLst>
+              </p:cNvPr>
+              <p:cNvSpPr txBox="1"/>
+              <p:nvPr/>
+            </p:nvSpPr>
+            <p:spPr>
+              <a:xfrm>
+                <a:off x="8235593" y="1971998"/>
+                <a:ext cx="2134880" cy="532966"/>
+              </a:xfrm>
+              <a:prstGeom prst="rect">
+                <a:avLst/>
+              </a:prstGeom>
+              <a:noFill/>
+            </p:spPr>
+            <p:txBody>
+              <a:bodyPr wrap="none" rtlCol="0">
+                <a:spAutoFit/>
+              </a:bodyPr>
+              <a:lstStyle/>
+              <a:p>
+                <a:pPr/>
+                <a14:m>
+                  <m:oMathPara xmlns:m="http://schemas.openxmlformats.org/officeDocument/2006/math">
+                    <m:oMathParaPr>
+                      <m:jc m:val="centerGroup"/>
+                    </m:oMathParaPr>
+                    <m:oMath xmlns:m="http://schemas.openxmlformats.org/officeDocument/2006/math">
+                      <m:r>
+                        <a:rPr lang="mi-NZ" sz="2800" b="1" i="1" smtClean="0">
+                          <a:latin typeface="Cambria Math" panose="02040503050406030204" pitchFamily="18" charset="0"/>
+                        </a:rPr>
+                        <m:t>𝟐</m:t>
+                      </m:r>
+                      <m:r>
+                        <a:rPr lang="mi-NZ" sz="2800" b="1" i="1" smtClean="0">
+                          <a:latin typeface="Cambria Math" panose="02040503050406030204" pitchFamily="18" charset="0"/>
+                        </a:rPr>
+                        <m:t>.</m:t>
+                      </m:r>
+                      <m:r>
+                        <a:rPr lang="mi-NZ" sz="2800" b="1" i="1" smtClean="0">
+                          <a:latin typeface="Cambria Math" panose="02040503050406030204" pitchFamily="18" charset="0"/>
+                        </a:rPr>
+                        <m:t>𝟖𝟐𝟔</m:t>
+                      </m:r>
+                      <m:sSup>
+                        <m:sSupPr>
+                          <m:ctrlPr>
+                            <a:rPr lang="mi-NZ" sz="2800" b="1" i="1" smtClean="0">
+                              <a:latin typeface="Cambria Math" panose="02040503050406030204" pitchFamily="18" charset="0"/>
+                            </a:rPr>
+                          </m:ctrlPr>
+                        </m:sSupPr>
+                        <m:e>
+                          <m:r>
+                            <a:rPr lang="mi-NZ" sz="2800" b="1" i="1" smtClean="0">
+                              <a:latin typeface="Cambria Math" panose="02040503050406030204" pitchFamily="18" charset="0"/>
+                            </a:rPr>
+                            <m:t>𝒎𝒔</m:t>
+                          </m:r>
+                        </m:e>
+                        <m:sup>
+                          <m:r>
+                            <a:rPr lang="mi-NZ" sz="2800" b="1" i="1" smtClean="0">
+                              <a:latin typeface="Cambria Math" panose="02040503050406030204" pitchFamily="18" charset="0"/>
+                            </a:rPr>
+                            <m:t>−</m:t>
+                          </m:r>
+                          <m:r>
+                            <a:rPr lang="mi-NZ" sz="2800" b="1" i="1" smtClean="0">
+                              <a:latin typeface="Cambria Math" panose="02040503050406030204" pitchFamily="18" charset="0"/>
+                            </a:rPr>
+                            <m:t>𝟏</m:t>
+                          </m:r>
+                        </m:sup>
+                      </m:sSup>
+                    </m:oMath>
+                  </m:oMathPara>
+                </a14:m>
+                <a:endParaRPr lang="en-GB" sz="2800" b="1" dirty="0"/>
+              </a:p>
+            </p:txBody>
+          </p:sp>
+        </mc:Choice>
+        <mc:Fallback>
+          <p:sp>
+            <p:nvSpPr>
+              <p:cNvPr id="12" name="TextBox 11">
+                <a:extLst>
+                  <a:ext uri="{FF2B5EF4-FFF2-40B4-BE49-F238E27FC236}">
+                    <a16:creationId xmlns:a16="http://schemas.microsoft.com/office/drawing/2014/main" id="{0257E436-6FEB-5F41-8193-F0059AA642EE}"/>
+                  </a:ext>
+                </a:extLst>
+              </p:cNvPr>
+              <p:cNvSpPr txBox="1">
+                <a:spLocks noRot="1" noChangeAspect="1" noMove="1" noResize="1" noEditPoints="1" noAdjustHandles="1" noChangeArrowheads="1" noChangeShapeType="1" noTextEdit="1"/>
+              </p:cNvSpPr>
+              <p:nvPr/>
+            </p:nvSpPr>
+            <p:spPr>
+              <a:xfrm>
+                <a:off x="8235593" y="1971998"/>
+                <a:ext cx="2134880" cy="532966"/>
+              </a:xfrm>
+              <a:prstGeom prst="rect">
+                <a:avLst/>
+              </a:prstGeom>
+              <a:blipFill>
+                <a:blip r:embed="rId2"/>
+                <a:stretch>
+                  <a:fillRect/>
+                </a:stretch>
+              </a:blipFill>
+            </p:spPr>
+            <p:txBody>
+              <a:bodyPr/>
+              <a:lstStyle/>
+              <a:p>
+                <a:r>
+                  <a:rPr lang="en-GB">
+                    <a:noFill/>
+                  </a:rPr>
+                  <a:t> </a:t>
+                </a:r>
+              </a:p>
+            </p:txBody>
+          </p:sp>
+        </mc:Fallback>
+      </mc:AlternateContent>
+      <p:sp>
+        <p:nvSpPr>
+          <p:cNvPr id="10" name="Rectangle 9">
+            <a:extLst>
+              <a:ext uri="{FF2B5EF4-FFF2-40B4-BE49-F238E27FC236}">
+                <a16:creationId xmlns:a16="http://schemas.microsoft.com/office/drawing/2014/main" id="{9B521A9B-FA06-F449-86CE-AD2B1603DF41}"/>
+              </a:ext>
+            </a:extLst>
+          </p:cNvPr>
+          <p:cNvSpPr/>
+          <p:nvPr/>
+        </p:nvSpPr>
+        <p:spPr>
+          <a:xfrm>
+            <a:off x="7893120" y="3176427"/>
+            <a:ext cx="535970" cy="535970"/>
+          </a:xfrm>
+          <a:prstGeom prst="rect">
+            <a:avLst/>
+          </a:prstGeom>
+          <a:solidFill>
+            <a:schemeClr val="accent6"/>
+          </a:solidFill>
+          <a:ln>
+            <a:noFill/>
+          </a:ln>
+        </p:spPr>
+        <p:style>
+          <a:lnRef idx="2">
+            <a:schemeClr val="accent1">
+              <a:shade val="50000"/>
+            </a:schemeClr>
+          </a:lnRef>
+          <a:fillRef idx="1">
+            <a:schemeClr val="accent1"/>
+          </a:fillRef>
+          <a:effectRef idx="0">
+            <a:schemeClr val="accent1"/>
+          </a:effectRef>
+          <a:fontRef idx="minor">
+            <a:schemeClr val="lt1"/>
+          </a:fontRef>
+        </p:style>
+        <p:txBody>
+          <a:bodyPr rtlCol="0" anchor="ctr"/>
+          <a:lstStyle/>
+          <a:p>
+            <a:endParaRPr lang="en-GB" b="1" dirty="0"/>
+          </a:p>
+        </p:txBody>
+      </p:sp>
+      <p:sp>
+        <p:nvSpPr>
+          <p:cNvPr id="2" name="TextBox 1">
+            <a:extLst>
+              <a:ext uri="{FF2B5EF4-FFF2-40B4-BE49-F238E27FC236}">
+                <a16:creationId xmlns:a16="http://schemas.microsoft.com/office/drawing/2014/main" id="{63C82AAD-C3DE-5849-94C6-21065F403BF8}"/>
+              </a:ext>
+            </a:extLst>
+          </p:cNvPr>
+          <p:cNvSpPr txBox="1"/>
+          <p:nvPr/>
+        </p:nvSpPr>
+        <p:spPr>
+          <a:xfrm>
+            <a:off x="5177319" y="881863"/>
+            <a:ext cx="1837362" cy="523220"/>
+          </a:xfrm>
+          <a:prstGeom prst="rect">
+            <a:avLst/>
+          </a:prstGeom>
+          <a:noFill/>
+        </p:spPr>
+        <p:txBody>
+          <a:bodyPr wrap="none" rtlCol="0">
+            <a:spAutoFit/>
+          </a:bodyPr>
+          <a:lstStyle/>
+          <a:p>
+            <a:r>
+              <a:rPr lang="en-GB" sz="2800" b="1" dirty="0"/>
+              <a:t>C = 1.885m</a:t>
+            </a:r>
+          </a:p>
+        </p:txBody>
+      </p:sp>
+      <p:sp>
+        <p:nvSpPr>
+          <p:cNvPr id="3" name="TextBox 2">
+            <a:extLst>
+              <a:ext uri="{FF2B5EF4-FFF2-40B4-BE49-F238E27FC236}">
+                <a16:creationId xmlns:a16="http://schemas.microsoft.com/office/drawing/2014/main" id="{66FD2AF8-1795-E344-8A43-925739529683}"/>
+              </a:ext>
+            </a:extLst>
+          </p:cNvPr>
+          <p:cNvSpPr txBox="1"/>
+          <p:nvPr/>
+        </p:nvSpPr>
+        <p:spPr>
+          <a:xfrm>
+            <a:off x="5453094" y="4264795"/>
+            <a:ext cx="1675459" cy="523220"/>
+          </a:xfrm>
+          <a:prstGeom prst="rect">
+            <a:avLst/>
+          </a:prstGeom>
+          <a:noFill/>
+        </p:spPr>
+        <p:txBody>
+          <a:bodyPr wrap="none" rtlCol="0">
+            <a:spAutoFit/>
+          </a:bodyPr>
+          <a:lstStyle/>
+          <a:p>
+            <a:r>
+              <a:rPr lang="en-GB" sz="2800" b="1" dirty="0"/>
+              <a:t>T = 0.667s</a:t>
+            </a:r>
+          </a:p>
+        </p:txBody>
+      </p:sp>
+    </p:spTree>
+    <p:extLst>
+      <p:ext uri="{BB962C8B-B14F-4D97-AF65-F5344CB8AC3E}">
+        <p14:creationId xmlns:p14="http://schemas.microsoft.com/office/powerpoint/2010/main" val="3788993708"/>
       </p:ext>
     </p:extLst>
   </p:cSld>

</xml_diff>

<commit_message>
Updates question to be different from Q6
</commit_message>
<xml_diff>
--- a/content/12phy/as91171/assets/figures.pptx
+++ b/content/12phy/as91171/assets/figures.pptx
@@ -213,7 +213,7 @@
           <a:p>
             <a:fld id="{0483D25A-4BAB-E944-807E-86E318F72109}" type="datetimeFigureOut">
               <a:rPr lang="en-GB" smtClean="0"/>
-              <a:t>23/03/2021</a:t>
+              <a:t>24/03/2021</a:t>
             </a:fld>
             <a:endParaRPr lang="en-GB"/>
           </a:p>
@@ -711,7 +711,7 @@
           <a:p>
             <a:fld id="{C8CC8613-2118-1B48-A066-53E091D42CD0}" type="datetimeFigureOut">
               <a:rPr lang="en-GB" smtClean="0"/>
-              <a:t>23/03/2021</a:t>
+              <a:t>24/03/2021</a:t>
             </a:fld>
             <a:endParaRPr lang="en-GB"/>
           </a:p>
@@ -909,7 +909,7 @@
           <a:p>
             <a:fld id="{C8CC8613-2118-1B48-A066-53E091D42CD0}" type="datetimeFigureOut">
               <a:rPr lang="en-GB" smtClean="0"/>
-              <a:t>23/03/2021</a:t>
+              <a:t>24/03/2021</a:t>
             </a:fld>
             <a:endParaRPr lang="en-GB"/>
           </a:p>
@@ -1117,7 +1117,7 @@
           <a:p>
             <a:fld id="{C8CC8613-2118-1B48-A066-53E091D42CD0}" type="datetimeFigureOut">
               <a:rPr lang="en-GB" smtClean="0"/>
-              <a:t>23/03/2021</a:t>
+              <a:t>24/03/2021</a:t>
             </a:fld>
             <a:endParaRPr lang="en-GB"/>
           </a:p>
@@ -1315,7 +1315,7 @@
           <a:p>
             <a:fld id="{C8CC8613-2118-1B48-A066-53E091D42CD0}" type="datetimeFigureOut">
               <a:rPr lang="en-GB" smtClean="0"/>
-              <a:t>23/03/2021</a:t>
+              <a:t>24/03/2021</a:t>
             </a:fld>
             <a:endParaRPr lang="en-GB"/>
           </a:p>
@@ -1590,7 +1590,7 @@
           <a:p>
             <a:fld id="{C8CC8613-2118-1B48-A066-53E091D42CD0}" type="datetimeFigureOut">
               <a:rPr lang="en-GB" smtClean="0"/>
-              <a:t>23/03/2021</a:t>
+              <a:t>24/03/2021</a:t>
             </a:fld>
             <a:endParaRPr lang="en-GB"/>
           </a:p>
@@ -1855,7 +1855,7 @@
           <a:p>
             <a:fld id="{C8CC8613-2118-1B48-A066-53E091D42CD0}" type="datetimeFigureOut">
               <a:rPr lang="en-GB" smtClean="0"/>
-              <a:t>23/03/2021</a:t>
+              <a:t>24/03/2021</a:t>
             </a:fld>
             <a:endParaRPr lang="en-GB"/>
           </a:p>
@@ -2267,7 +2267,7 @@
           <a:p>
             <a:fld id="{C8CC8613-2118-1B48-A066-53E091D42CD0}" type="datetimeFigureOut">
               <a:rPr lang="en-GB" smtClean="0"/>
-              <a:t>23/03/2021</a:t>
+              <a:t>24/03/2021</a:t>
             </a:fld>
             <a:endParaRPr lang="en-GB"/>
           </a:p>
@@ -2408,7 +2408,7 @@
           <a:p>
             <a:fld id="{C8CC8613-2118-1B48-A066-53E091D42CD0}" type="datetimeFigureOut">
               <a:rPr lang="en-GB" smtClean="0"/>
-              <a:t>23/03/2021</a:t>
+              <a:t>24/03/2021</a:t>
             </a:fld>
             <a:endParaRPr lang="en-GB"/>
           </a:p>
@@ -2521,7 +2521,7 @@
           <a:p>
             <a:fld id="{C8CC8613-2118-1B48-A066-53E091D42CD0}" type="datetimeFigureOut">
               <a:rPr lang="en-GB" smtClean="0"/>
-              <a:t>23/03/2021</a:t>
+              <a:t>24/03/2021</a:t>
             </a:fld>
             <a:endParaRPr lang="en-GB"/>
           </a:p>
@@ -2832,7 +2832,7 @@
           <a:p>
             <a:fld id="{C8CC8613-2118-1B48-A066-53E091D42CD0}" type="datetimeFigureOut">
               <a:rPr lang="en-GB" smtClean="0"/>
-              <a:t>23/03/2021</a:t>
+              <a:t>24/03/2021</a:t>
             </a:fld>
             <a:endParaRPr lang="en-GB"/>
           </a:p>
@@ -3120,7 +3120,7 @@
           <a:p>
             <a:fld id="{C8CC8613-2118-1B48-A066-53E091D42CD0}" type="datetimeFigureOut">
               <a:rPr lang="en-GB" smtClean="0"/>
-              <a:t>23/03/2021</a:t>
+              <a:t>24/03/2021</a:t>
             </a:fld>
             <a:endParaRPr lang="en-GB"/>
           </a:p>
@@ -3361,7 +3361,7 @@
           <a:p>
             <a:fld id="{C8CC8613-2118-1B48-A066-53E091D42CD0}" type="datetimeFigureOut">
               <a:rPr lang="en-GB" smtClean="0"/>
-              <a:t>23/03/2021</a:t>
+              <a:t>24/03/2021</a:t>
             </a:fld>
             <a:endParaRPr lang="en-GB"/>
           </a:p>
@@ -6450,7 +6450,7 @@
       </p:grpSpPr>
       <p:sp>
         <p:nvSpPr>
-          <p:cNvPr id="8" name="Rectangle 7">
+          <p:cNvPr id="8" name="Left Arrow 7">
             <a:extLst>
               <a:ext uri="{FF2B5EF4-FFF2-40B4-BE49-F238E27FC236}">
                 <a16:creationId xmlns:a16="http://schemas.microsoft.com/office/drawing/2014/main" id="{16D5C1A2-B54A-9443-A4AC-9C5072BD2217}"/>
@@ -6462,10 +6462,10 @@
         </p:nvSpPr>
         <p:spPr>
           <a:xfrm>
-            <a:off x="6096000" y="3398178"/>
-            <a:ext cx="2065106" cy="82194"/>
-          </a:xfrm>
-          <a:prstGeom prst="rect">
+            <a:off x="6095998" y="3358365"/>
+            <a:ext cx="2065106" cy="172093"/>
+          </a:xfrm>
+          <a:prstGeom prst="leftArrow">
             <a:avLst/>
           </a:prstGeom>
           <a:solidFill>
@@ -6809,9 +6809,47 @@
           <a:bodyPr rtlCol="0" anchor="ctr"/>
           <a:lstStyle/>
           <a:p>
-            <a:r>
-              <a:rPr lang="en-GB" b="1" dirty="0"/>
-              <a:t>7kg</a:t>
+            <a:endParaRPr lang="en-GB" b="1" dirty="0"/>
+          </a:p>
+        </p:txBody>
+      </p:sp>
+      <p:sp>
+        <p:nvSpPr>
+          <p:cNvPr id="2" name="TextBox 1">
+            <a:extLst>
+              <a:ext uri="{FF2B5EF4-FFF2-40B4-BE49-F238E27FC236}">
+                <a16:creationId xmlns:a16="http://schemas.microsoft.com/office/drawing/2014/main" id="{7BF45E22-6F2D-0440-9736-A2879E4EB484}"/>
+              </a:ext>
+            </a:extLst>
+          </p:cNvPr>
+          <p:cNvSpPr txBox="1"/>
+          <p:nvPr/>
+        </p:nvSpPr>
+        <p:spPr>
+          <a:xfrm>
+            <a:off x="6401724" y="3471290"/>
+            <a:ext cx="1223412" cy="461665"/>
+          </a:xfrm>
+          <a:prstGeom prst="rect">
+            <a:avLst/>
+          </a:prstGeom>
+          <a:noFill/>
+        </p:spPr>
+        <p:txBody>
+          <a:bodyPr wrap="none" rtlCol="0">
+            <a:spAutoFit/>
+          </a:bodyPr>
+          <a:lstStyle/>
+          <a:p>
+            <a:r>
+              <a:rPr lang="en-GB" sz="2400" b="1" dirty="0">
+                <a:sym typeface="Wingdings" pitchFamily="2" charset="2"/>
+              </a:rPr>
+              <a:t> </a:t>
+            </a:r>
+            <a:r>
+              <a:rPr lang="en-GB" sz="2400" b="1" dirty="0"/>
+              <a:t>305N</a:t>
             </a:r>
           </a:p>
         </p:txBody>
@@ -7033,8 +7071,8 @@
           </a:p>
         </p:txBody>
       </p:sp>
-      <mc:AlternateContent xmlns:mc="http://schemas.openxmlformats.org/markup-compatibility/2006">
-        <mc:Choice xmlns:a14="http://schemas.microsoft.com/office/drawing/2010/main" Requires="a14">
+      <mc:AlternateContent xmlns:mc="http://schemas.openxmlformats.org/markup-compatibility/2006" xmlns:a14="http://schemas.microsoft.com/office/drawing/2010/main">
+        <mc:Choice Requires="a14">
           <p:sp>
             <p:nvSpPr>
               <p:cNvPr id="12" name="TextBox 11">
@@ -7127,7 +7165,7 @@
             </p:txBody>
           </p:sp>
         </mc:Choice>
-        <mc:Fallback>
+        <mc:Fallback xmlns="">
           <p:sp>
             <p:nvSpPr>
               <p:cNvPr id="12" name="TextBox 11">

</xml_diff>

<commit_message>
Updates and clarifications to forces
</commit_message>
<xml_diff>
--- a/content/12phy/as91171/assets/figures.pptx
+++ b/content/12phy/as91171/assets/figures.pptx
@@ -5,7 +5,7 @@
     <p:sldMasterId id="2147483648" r:id="rId1"/>
   </p:sldMasterIdLst>
   <p:notesMasterIdLst>
-    <p:notesMasterId r:id="rId19"/>
+    <p:notesMasterId r:id="rId20"/>
   </p:notesMasterIdLst>
   <p:sldIdLst>
     <p:sldId id="256" r:id="rId2"/>
@@ -13,18 +13,19 @@
     <p:sldId id="258" r:id="rId4"/>
     <p:sldId id="260" r:id="rId5"/>
     <p:sldId id="261" r:id="rId6"/>
-    <p:sldId id="264" r:id="rId7"/>
-    <p:sldId id="268" r:id="rId8"/>
-    <p:sldId id="267" r:id="rId9"/>
-    <p:sldId id="259" r:id="rId10"/>
-    <p:sldId id="263" r:id="rId11"/>
-    <p:sldId id="262" r:id="rId12"/>
-    <p:sldId id="269" r:id="rId13"/>
-    <p:sldId id="270" r:id="rId14"/>
-    <p:sldId id="271" r:id="rId15"/>
-    <p:sldId id="272" r:id="rId16"/>
-    <p:sldId id="273" r:id="rId17"/>
-    <p:sldId id="274" r:id="rId18"/>
+    <p:sldId id="268" r:id="rId7"/>
+    <p:sldId id="275" r:id="rId8"/>
+    <p:sldId id="276" r:id="rId9"/>
+    <p:sldId id="267" r:id="rId10"/>
+    <p:sldId id="259" r:id="rId11"/>
+    <p:sldId id="263" r:id="rId12"/>
+    <p:sldId id="262" r:id="rId13"/>
+    <p:sldId id="269" r:id="rId14"/>
+    <p:sldId id="270" r:id="rId15"/>
+    <p:sldId id="271" r:id="rId16"/>
+    <p:sldId id="272" r:id="rId17"/>
+    <p:sldId id="273" r:id="rId18"/>
+    <p:sldId id="274" r:id="rId19"/>
   </p:sldIdLst>
   <p:sldSz cx="12192000" cy="6858000"/>
   <p:notesSz cx="6858000" cy="9144000"/>
@@ -213,7 +214,7 @@
           <a:p>
             <a:fld id="{0483D25A-4BAB-E944-807E-86E318F72109}" type="datetimeFigureOut">
               <a:rPr lang="en-GB" smtClean="0"/>
-              <a:t>24/03/2021</a:t>
+              <a:t>08/03/2022</a:t>
             </a:fld>
             <a:endParaRPr lang="en-GB"/>
           </a:p>
@@ -711,7 +712,7 @@
           <a:p>
             <a:fld id="{C8CC8613-2118-1B48-A066-53E091D42CD0}" type="datetimeFigureOut">
               <a:rPr lang="en-GB" smtClean="0"/>
-              <a:t>24/03/2021</a:t>
+              <a:t>08/03/2022</a:t>
             </a:fld>
             <a:endParaRPr lang="en-GB"/>
           </a:p>
@@ -909,7 +910,7 @@
           <a:p>
             <a:fld id="{C8CC8613-2118-1B48-A066-53E091D42CD0}" type="datetimeFigureOut">
               <a:rPr lang="en-GB" smtClean="0"/>
-              <a:t>24/03/2021</a:t>
+              <a:t>08/03/2022</a:t>
             </a:fld>
             <a:endParaRPr lang="en-GB"/>
           </a:p>
@@ -1117,7 +1118,7 @@
           <a:p>
             <a:fld id="{C8CC8613-2118-1B48-A066-53E091D42CD0}" type="datetimeFigureOut">
               <a:rPr lang="en-GB" smtClean="0"/>
-              <a:t>24/03/2021</a:t>
+              <a:t>08/03/2022</a:t>
             </a:fld>
             <a:endParaRPr lang="en-GB"/>
           </a:p>
@@ -1315,7 +1316,7 @@
           <a:p>
             <a:fld id="{C8CC8613-2118-1B48-A066-53E091D42CD0}" type="datetimeFigureOut">
               <a:rPr lang="en-GB" smtClean="0"/>
-              <a:t>24/03/2021</a:t>
+              <a:t>08/03/2022</a:t>
             </a:fld>
             <a:endParaRPr lang="en-GB"/>
           </a:p>
@@ -1590,7 +1591,7 @@
           <a:p>
             <a:fld id="{C8CC8613-2118-1B48-A066-53E091D42CD0}" type="datetimeFigureOut">
               <a:rPr lang="en-GB" smtClean="0"/>
-              <a:t>24/03/2021</a:t>
+              <a:t>08/03/2022</a:t>
             </a:fld>
             <a:endParaRPr lang="en-GB"/>
           </a:p>
@@ -1855,7 +1856,7 @@
           <a:p>
             <a:fld id="{C8CC8613-2118-1B48-A066-53E091D42CD0}" type="datetimeFigureOut">
               <a:rPr lang="en-GB" smtClean="0"/>
-              <a:t>24/03/2021</a:t>
+              <a:t>08/03/2022</a:t>
             </a:fld>
             <a:endParaRPr lang="en-GB"/>
           </a:p>
@@ -2267,7 +2268,7 @@
           <a:p>
             <a:fld id="{C8CC8613-2118-1B48-A066-53E091D42CD0}" type="datetimeFigureOut">
               <a:rPr lang="en-GB" smtClean="0"/>
-              <a:t>24/03/2021</a:t>
+              <a:t>08/03/2022</a:t>
             </a:fld>
             <a:endParaRPr lang="en-GB"/>
           </a:p>
@@ -2408,7 +2409,7 @@
           <a:p>
             <a:fld id="{C8CC8613-2118-1B48-A066-53E091D42CD0}" type="datetimeFigureOut">
               <a:rPr lang="en-GB" smtClean="0"/>
-              <a:t>24/03/2021</a:t>
+              <a:t>08/03/2022</a:t>
             </a:fld>
             <a:endParaRPr lang="en-GB"/>
           </a:p>
@@ -2521,7 +2522,7 @@
           <a:p>
             <a:fld id="{C8CC8613-2118-1B48-A066-53E091D42CD0}" type="datetimeFigureOut">
               <a:rPr lang="en-GB" smtClean="0"/>
-              <a:t>24/03/2021</a:t>
+              <a:t>08/03/2022</a:t>
             </a:fld>
             <a:endParaRPr lang="en-GB"/>
           </a:p>
@@ -2832,7 +2833,7 @@
           <a:p>
             <a:fld id="{C8CC8613-2118-1B48-A066-53E091D42CD0}" type="datetimeFigureOut">
               <a:rPr lang="en-GB" smtClean="0"/>
-              <a:t>24/03/2021</a:t>
+              <a:t>08/03/2022</a:t>
             </a:fld>
             <a:endParaRPr lang="en-GB"/>
           </a:p>
@@ -3120,7 +3121,7 @@
           <a:p>
             <a:fld id="{C8CC8613-2118-1B48-A066-53E091D42CD0}" type="datetimeFigureOut">
               <a:rPr lang="en-GB" smtClean="0"/>
-              <a:t>24/03/2021</a:t>
+              <a:t>08/03/2022</a:t>
             </a:fld>
             <a:endParaRPr lang="en-GB"/>
           </a:p>
@@ -3361,7 +3362,7 @@
           <a:p>
             <a:fld id="{C8CC8613-2118-1B48-A066-53E091D42CD0}" type="datetimeFigureOut">
               <a:rPr lang="en-GB" smtClean="0"/>
-              <a:t>24/03/2021</a:t>
+              <a:t>08/03/2022</a:t>
             </a:fld>
             <a:endParaRPr lang="en-GB"/>
           </a:p>
@@ -4241,52 +4242,6 @@
       </p:sp>
       <p:sp>
         <p:nvSpPr>
-          <p:cNvPr id="9" name="Left Arrow 8">
-            <a:extLst>
-              <a:ext uri="{FF2B5EF4-FFF2-40B4-BE49-F238E27FC236}">
-                <a16:creationId xmlns:a16="http://schemas.microsoft.com/office/drawing/2014/main" id="{4FB34D8C-41AC-3541-A3C0-96FA019E12F5}"/>
-              </a:ext>
-            </a:extLst>
-          </p:cNvPr>
-          <p:cNvSpPr/>
-          <p:nvPr/>
-        </p:nvSpPr>
-        <p:spPr>
-          <a:xfrm rot="16200000">
-            <a:off x="4608252" y="3525385"/>
-            <a:ext cx="2189782" cy="208248"/>
-          </a:xfrm>
-          <a:prstGeom prst="leftArrow">
-            <a:avLst/>
-          </a:prstGeom>
-        </p:spPr>
-        <p:style>
-          <a:lnRef idx="2">
-            <a:schemeClr val="accent6">
-              <a:shade val="50000"/>
-            </a:schemeClr>
-          </a:lnRef>
-          <a:fillRef idx="1">
-            <a:schemeClr val="accent6"/>
-          </a:fillRef>
-          <a:effectRef idx="0">
-            <a:schemeClr val="accent6"/>
-          </a:effectRef>
-          <a:fontRef idx="minor">
-            <a:schemeClr val="lt1"/>
-          </a:fontRef>
-        </p:style>
-        <p:txBody>
-          <a:bodyPr rtlCol="0" anchor="ctr"/>
-          <a:lstStyle/>
-          <a:p>
-            <a:pPr algn="ctr"/>
-            <a:endParaRPr lang="en-GB"/>
-          </a:p>
-        </p:txBody>
-      </p:sp>
-      <p:sp>
-        <p:nvSpPr>
           <p:cNvPr id="10" name="Left Arrow 9">
             <a:extLst>
               <a:ext uri="{FF2B5EF4-FFF2-40B4-BE49-F238E27FC236}">
@@ -4378,146 +4333,10 @@
           </a:p>
         </p:txBody>
       </p:sp>
-      <p:sp>
-        <p:nvSpPr>
-          <p:cNvPr id="12" name="TextBox 11">
-            <a:extLst>
-              <a:ext uri="{FF2B5EF4-FFF2-40B4-BE49-F238E27FC236}">
-                <a16:creationId xmlns:a16="http://schemas.microsoft.com/office/drawing/2014/main" id="{51CA0718-32BE-3843-9840-AB3845CCB3D9}"/>
-              </a:ext>
-            </a:extLst>
-          </p:cNvPr>
-          <p:cNvSpPr txBox="1"/>
-          <p:nvPr/>
-        </p:nvSpPr>
-        <p:spPr>
-          <a:xfrm>
-            <a:off x="5807267" y="3971336"/>
-            <a:ext cx="1437830" cy="646331"/>
-          </a:xfrm>
-          <a:prstGeom prst="rect">
-            <a:avLst/>
-          </a:prstGeom>
-          <a:noFill/>
-        </p:spPr>
-        <p:txBody>
-          <a:bodyPr wrap="none" rtlCol="0">
-            <a:spAutoFit/>
-          </a:bodyPr>
-          <a:lstStyle/>
-          <a:p>
-            <a:pPr algn="ctr"/>
-            <a:r>
-              <a:rPr lang="en-GB" b="1" dirty="0" err="1"/>
-              <a:t>F</a:t>
-            </a:r>
-            <a:r>
-              <a:rPr lang="en-GB" b="1" baseline="-25000" dirty="0" err="1"/>
-              <a:t>w</a:t>
-            </a:r>
-            <a:br>
-              <a:rPr lang="en-GB" b="1" dirty="0"/>
-            </a:br>
-            <a:r>
-              <a:rPr lang="en-GB" b="1" dirty="0"/>
-              <a:t>Weight Force</a:t>
-            </a:r>
-          </a:p>
-        </p:txBody>
-      </p:sp>
-      <p:sp>
-        <p:nvSpPr>
-          <p:cNvPr id="14" name="Left Arrow 13">
-            <a:extLst>
-              <a:ext uri="{FF2B5EF4-FFF2-40B4-BE49-F238E27FC236}">
-                <a16:creationId xmlns:a16="http://schemas.microsoft.com/office/drawing/2014/main" id="{F427DEF5-1E24-854B-9DDF-29A34D1FF15C}"/>
-              </a:ext>
-            </a:extLst>
-          </p:cNvPr>
-          <p:cNvSpPr/>
-          <p:nvPr/>
-        </p:nvSpPr>
-        <p:spPr>
-          <a:xfrm rot="6375292" flipH="1" flipV="1">
-            <a:off x="4809510" y="3125539"/>
-            <a:ext cx="1403584" cy="230019"/>
-          </a:xfrm>
-          <a:prstGeom prst="leftArrow">
-            <a:avLst/>
-          </a:prstGeom>
-        </p:spPr>
-        <p:style>
-          <a:lnRef idx="2">
-            <a:schemeClr val="accent2">
-              <a:shade val="50000"/>
-            </a:schemeClr>
-          </a:lnRef>
-          <a:fillRef idx="1">
-            <a:schemeClr val="accent2"/>
-          </a:fillRef>
-          <a:effectRef idx="0">
-            <a:schemeClr val="accent2"/>
-          </a:effectRef>
-          <a:fontRef idx="minor">
-            <a:schemeClr val="lt1"/>
-          </a:fontRef>
-        </p:style>
-        <p:txBody>
-          <a:bodyPr rtlCol="0" anchor="ctr"/>
-          <a:lstStyle/>
-          <a:p>
-            <a:pPr algn="ctr"/>
-            <a:endParaRPr lang="en-GB"/>
-          </a:p>
-        </p:txBody>
-      </p:sp>
-      <p:sp>
-        <p:nvSpPr>
-          <p:cNvPr id="15" name="TextBox 14">
-            <a:extLst>
-              <a:ext uri="{FF2B5EF4-FFF2-40B4-BE49-F238E27FC236}">
-                <a16:creationId xmlns:a16="http://schemas.microsoft.com/office/drawing/2014/main" id="{027E2B9F-AFBB-F44A-AE61-CFF0677AEFE3}"/>
-              </a:ext>
-            </a:extLst>
-          </p:cNvPr>
-          <p:cNvSpPr txBox="1"/>
-          <p:nvPr/>
-        </p:nvSpPr>
-        <p:spPr>
-          <a:xfrm>
-            <a:off x="3905970" y="2812870"/>
-            <a:ext cx="1490728" cy="646331"/>
-          </a:xfrm>
-          <a:prstGeom prst="rect">
-            <a:avLst/>
-          </a:prstGeom>
-          <a:noFill/>
-        </p:spPr>
-        <p:txBody>
-          <a:bodyPr wrap="none" rtlCol="0">
-            <a:spAutoFit/>
-          </a:bodyPr>
-          <a:lstStyle/>
-          <a:p>
-            <a:pPr algn="ctr"/>
-            <a:r>
-              <a:rPr lang="en-GB" b="1" dirty="0"/>
-              <a:t>Experienced</a:t>
-            </a:r>
-            <a:br>
-              <a:rPr lang="en-GB" b="1" dirty="0"/>
-            </a:br>
-            <a:r>
-              <a:rPr lang="en-GB" b="1" dirty="0"/>
-              <a:t>Weight Force </a:t>
-            </a:r>
-          </a:p>
-        </p:txBody>
-      </p:sp>
     </p:spTree>
     <p:extLst>
       <p:ext uri="{BB962C8B-B14F-4D97-AF65-F5344CB8AC3E}">
-        <p14:creationId xmlns:p14="http://schemas.microsoft.com/office/powerpoint/2010/main" val="1039295403"/>
+        <p14:creationId xmlns:p14="http://schemas.microsoft.com/office/powerpoint/2010/main" val="301955601"/>
       </p:ext>
     </p:extLst>
   </p:cSld>
@@ -4557,7 +4376,7 @@
           <p:nvPr/>
         </p:nvSpPr>
         <p:spPr>
-          <a:xfrm flipH="1">
+          <a:xfrm>
             <a:off x="3472543" y="2231572"/>
             <a:ext cx="4974771" cy="1436914"/>
           </a:xfrm>
@@ -4611,8 +4430,8 @@
           <p:nvPr/>
         </p:nvSpPr>
         <p:spPr>
-          <a:xfrm rot="20599305" flipH="1">
-            <a:off x="5340453" y="2362142"/>
+          <a:xfrm rot="951516">
+            <a:off x="5181600" y="2296888"/>
             <a:ext cx="1208314" cy="566057"/>
           </a:xfrm>
           <a:prstGeom prst="rect">
@@ -4646,10 +4465,10 @@
       </p:sp>
       <p:sp>
         <p:nvSpPr>
-          <p:cNvPr id="6" name="Left Arrow 5">
-            <a:extLst>
-              <a:ext uri="{FF2B5EF4-FFF2-40B4-BE49-F238E27FC236}">
-                <a16:creationId xmlns:a16="http://schemas.microsoft.com/office/drawing/2014/main" id="{D0E40191-2765-864C-AE39-23E55D1DCE88}"/>
+          <p:cNvPr id="9" name="Left Arrow 8">
+            <a:extLst>
+              <a:ext uri="{FF2B5EF4-FFF2-40B4-BE49-F238E27FC236}">
+                <a16:creationId xmlns:a16="http://schemas.microsoft.com/office/drawing/2014/main" id="{4FB34D8C-41AC-3541-A3C0-96FA019E12F5}"/>
               </a:ext>
             </a:extLst>
           </p:cNvPr>
@@ -4657,54 +4476,8 @@
           <p:nvPr/>
         </p:nvSpPr>
         <p:spPr>
-          <a:xfrm rot="20563443" flipH="1">
-            <a:off x="5880746" y="2486482"/>
-            <a:ext cx="469059" cy="225122"/>
-          </a:xfrm>
-          <a:prstGeom prst="leftArrow">
-            <a:avLst/>
-          </a:prstGeom>
-        </p:spPr>
-        <p:style>
-          <a:lnRef idx="2">
-            <a:schemeClr val="accent4">
-              <a:shade val="50000"/>
-            </a:schemeClr>
-          </a:lnRef>
-          <a:fillRef idx="1">
-            <a:schemeClr val="accent4"/>
-          </a:fillRef>
-          <a:effectRef idx="0">
-            <a:schemeClr val="accent4"/>
-          </a:effectRef>
-          <a:fontRef idx="minor">
-            <a:schemeClr val="lt1"/>
-          </a:fontRef>
-        </p:style>
-        <p:txBody>
-          <a:bodyPr rtlCol="0" anchor="ctr"/>
-          <a:lstStyle/>
-          <a:p>
-            <a:pPr algn="ctr"/>
-            <a:endParaRPr lang="en-GB"/>
-          </a:p>
-        </p:txBody>
-      </p:sp>
-      <p:sp>
-        <p:nvSpPr>
-          <p:cNvPr id="9" name="Left Arrow 8">
-            <a:extLst>
-              <a:ext uri="{FF2B5EF4-FFF2-40B4-BE49-F238E27FC236}">
-                <a16:creationId xmlns:a16="http://schemas.microsoft.com/office/drawing/2014/main" id="{4FB34D8C-41AC-3541-A3C0-96FA019E12F5}"/>
-              </a:ext>
-            </a:extLst>
-          </p:cNvPr>
-          <p:cNvSpPr/>
-          <p:nvPr/>
-        </p:nvSpPr>
-        <p:spPr>
-          <a:xfrm rot="5400000" flipH="1">
-            <a:off x="4818928" y="3589810"/>
+          <a:xfrm rot="16200000">
+            <a:off x="4608252" y="3525385"/>
             <a:ext cx="2189782" cy="208248"/>
           </a:xfrm>
           <a:prstGeom prst="leftArrow">
@@ -4749,8 +4522,8 @@
           <p:nvPr/>
         </p:nvSpPr>
         <p:spPr>
-          <a:xfrm rot="4500000" flipV="1">
-            <a:off x="5040620" y="1894884"/>
+          <a:xfrm rot="6375292">
+            <a:off x="5200841" y="1779419"/>
             <a:ext cx="1403584" cy="230019"/>
           </a:xfrm>
           <a:prstGeom prst="leftArrow">
@@ -4784,10 +4557,10 @@
       </p:sp>
       <p:sp>
         <p:nvSpPr>
-          <p:cNvPr id="2" name="TextBox 1">
-            <a:extLst>
-              <a:ext uri="{FF2B5EF4-FFF2-40B4-BE49-F238E27FC236}">
-                <a16:creationId xmlns:a16="http://schemas.microsoft.com/office/drawing/2014/main" id="{D830D89E-4CA1-0244-BFB4-91D4DE76A003}"/>
+          <p:cNvPr id="11" name="TextBox 10">
+            <a:extLst>
+              <a:ext uri="{FF2B5EF4-FFF2-40B4-BE49-F238E27FC236}">
+                <a16:creationId xmlns:a16="http://schemas.microsoft.com/office/drawing/2014/main" id="{23405AF7-6EEA-D04E-9375-D0E0CF38BBA5}"/>
               </a:ext>
             </a:extLst>
           </p:cNvPr>
@@ -4796,8 +4569,8 @@
         </p:nvSpPr>
         <p:spPr>
           <a:xfrm>
-            <a:off x="5736461" y="1490096"/>
-            <a:ext cx="934871" cy="369332"/>
+            <a:off x="6096000" y="1471547"/>
+            <a:ext cx="1468992" cy="646331"/>
           </a:xfrm>
           <a:prstGeom prst="rect">
             <a:avLst/>
@@ -4810,19 +4583,31 @@
           </a:bodyPr>
           <a:lstStyle/>
           <a:p>
-            <a:r>
-              <a:rPr lang="en-GB" dirty="0"/>
-              <a:t>Support</a:t>
-            </a:r>
-          </a:p>
-        </p:txBody>
-      </p:sp>
-      <p:sp>
-        <p:nvSpPr>
-          <p:cNvPr id="3" name="TextBox 2">
-            <a:extLst>
-              <a:ext uri="{FF2B5EF4-FFF2-40B4-BE49-F238E27FC236}">
-                <a16:creationId xmlns:a16="http://schemas.microsoft.com/office/drawing/2014/main" id="{01D2AFD2-A3FE-D04A-8C66-6DDD957002E0}"/>
+            <a:pPr algn="ctr"/>
+            <a:r>
+              <a:rPr lang="en-GB" b="1" dirty="0" err="1"/>
+              <a:t>F</a:t>
+            </a:r>
+            <a:r>
+              <a:rPr lang="en-GB" b="1" baseline="-25000" dirty="0" err="1"/>
+              <a:t>n</a:t>
+            </a:r>
+            <a:br>
+              <a:rPr lang="en-GB" b="1" dirty="0"/>
+            </a:br>
+            <a:r>
+              <a:rPr lang="en-GB" b="1" dirty="0"/>
+              <a:t>Normal Force</a:t>
+            </a:r>
+          </a:p>
+        </p:txBody>
+      </p:sp>
+      <p:sp>
+        <p:nvSpPr>
+          <p:cNvPr id="12" name="TextBox 11">
+            <a:extLst>
+              <a:ext uri="{FF2B5EF4-FFF2-40B4-BE49-F238E27FC236}">
+                <a16:creationId xmlns:a16="http://schemas.microsoft.com/office/drawing/2014/main" id="{51CA0718-32BE-3843-9840-AB3845CCB3D9}"/>
               </a:ext>
             </a:extLst>
           </p:cNvPr>
@@ -4831,8 +4616,8 @@
         </p:nvSpPr>
         <p:spPr>
           <a:xfrm>
-            <a:off x="6604580" y="2200657"/>
-            <a:ext cx="894797" cy="369332"/>
+            <a:off x="5807267" y="3971336"/>
+            <a:ext cx="1437830" cy="646331"/>
           </a:xfrm>
           <a:prstGeom prst="rect">
             <a:avLst/>
@@ -4845,19 +4630,77 @@
           </a:bodyPr>
           <a:lstStyle/>
           <a:p>
-            <a:r>
-              <a:rPr lang="en-GB" dirty="0"/>
-              <a:t>Friction</a:t>
-            </a:r>
-          </a:p>
-        </p:txBody>
-      </p:sp>
-      <p:sp>
-        <p:nvSpPr>
-          <p:cNvPr id="7" name="TextBox 6">
-            <a:extLst>
-              <a:ext uri="{FF2B5EF4-FFF2-40B4-BE49-F238E27FC236}">
-                <a16:creationId xmlns:a16="http://schemas.microsoft.com/office/drawing/2014/main" id="{280255DB-5152-4D49-B7C3-B6B7BF09EE93}"/>
+            <a:pPr algn="ctr"/>
+            <a:r>
+              <a:rPr lang="en-GB" b="1" dirty="0" err="1"/>
+              <a:t>F</a:t>
+            </a:r>
+            <a:r>
+              <a:rPr lang="en-GB" b="1" baseline="-25000" dirty="0" err="1"/>
+              <a:t>w</a:t>
+            </a:r>
+            <a:br>
+              <a:rPr lang="en-GB" b="1" dirty="0"/>
+            </a:br>
+            <a:r>
+              <a:rPr lang="en-GB" b="1" dirty="0"/>
+              <a:t>Weight Force</a:t>
+            </a:r>
+          </a:p>
+        </p:txBody>
+      </p:sp>
+      <p:sp>
+        <p:nvSpPr>
+          <p:cNvPr id="14" name="Left Arrow 13">
+            <a:extLst>
+              <a:ext uri="{FF2B5EF4-FFF2-40B4-BE49-F238E27FC236}">
+                <a16:creationId xmlns:a16="http://schemas.microsoft.com/office/drawing/2014/main" id="{F427DEF5-1E24-854B-9DDF-29A34D1FF15C}"/>
+              </a:ext>
+            </a:extLst>
+          </p:cNvPr>
+          <p:cNvSpPr/>
+          <p:nvPr/>
+        </p:nvSpPr>
+        <p:spPr>
+          <a:xfrm rot="6375292" flipH="1" flipV="1">
+            <a:off x="4809510" y="3125539"/>
+            <a:ext cx="1403584" cy="230019"/>
+          </a:xfrm>
+          <a:prstGeom prst="leftArrow">
+            <a:avLst/>
+          </a:prstGeom>
+        </p:spPr>
+        <p:style>
+          <a:lnRef idx="2">
+            <a:schemeClr val="accent2">
+              <a:shade val="50000"/>
+            </a:schemeClr>
+          </a:lnRef>
+          <a:fillRef idx="1">
+            <a:schemeClr val="accent2"/>
+          </a:fillRef>
+          <a:effectRef idx="0">
+            <a:schemeClr val="accent2"/>
+          </a:effectRef>
+          <a:fontRef idx="minor">
+            <a:schemeClr val="lt1"/>
+          </a:fontRef>
+        </p:style>
+        <p:txBody>
+          <a:bodyPr rtlCol="0" anchor="ctr"/>
+          <a:lstStyle/>
+          <a:p>
+            <a:pPr algn="ctr"/>
+            <a:endParaRPr lang="en-GB"/>
+          </a:p>
+        </p:txBody>
+      </p:sp>
+      <p:sp>
+        <p:nvSpPr>
+          <p:cNvPr id="15" name="TextBox 14">
+            <a:extLst>
+              <a:ext uri="{FF2B5EF4-FFF2-40B4-BE49-F238E27FC236}">
+                <a16:creationId xmlns:a16="http://schemas.microsoft.com/office/drawing/2014/main" id="{027E2B9F-AFBB-F44A-AE61-CFF0677AEFE3}"/>
               </a:ext>
             </a:extLst>
           </p:cNvPr>
@@ -4866,8 +4709,8 @@
         </p:nvSpPr>
         <p:spPr>
           <a:xfrm>
-            <a:off x="5959928" y="4298867"/>
-            <a:ext cx="855362" cy="369332"/>
+            <a:off x="3905970" y="2812870"/>
+            <a:ext cx="1490728" cy="646331"/>
           </a:xfrm>
           <a:prstGeom prst="rect">
             <a:avLst/>
@@ -4880,9 +4723,17 @@
           </a:bodyPr>
           <a:lstStyle/>
           <a:p>
-            <a:r>
-              <a:rPr lang="en-GB" dirty="0"/>
-              <a:t>Weight</a:t>
+            <a:pPr algn="ctr"/>
+            <a:r>
+              <a:rPr lang="en-GB" b="1" dirty="0"/>
+              <a:t>Experienced</a:t>
+            </a:r>
+            <a:br>
+              <a:rPr lang="en-GB" b="1" dirty="0"/>
+            </a:br>
+            <a:r>
+              <a:rPr lang="en-GB" b="1" dirty="0"/>
+              <a:t>Weight Force </a:t>
             </a:r>
           </a:p>
         </p:txBody>
@@ -4890,7 +4741,7 @@
     </p:spTree>
     <p:extLst>
       <p:ext uri="{BB962C8B-B14F-4D97-AF65-F5344CB8AC3E}">
-        <p14:creationId xmlns:p14="http://schemas.microsoft.com/office/powerpoint/2010/main" val="1243252161"/>
+        <p14:creationId xmlns:p14="http://schemas.microsoft.com/office/powerpoint/2010/main" val="1039295403"/>
       </p:ext>
     </p:extLst>
   </p:cSld>
@@ -4917,46 +4768,12 @@
           <a:chExt cx="0" cy="0"/>
         </a:xfrm>
       </p:grpSpPr>
-      <p:pic>
-        <p:nvPicPr>
-          <p:cNvPr id="4" name="Picture 3" descr="A small toy car&#10;&#10;Description automatically generated with low confidence">
-            <a:extLst>
-              <a:ext uri="{FF2B5EF4-FFF2-40B4-BE49-F238E27FC236}">
-                <a16:creationId xmlns:a16="http://schemas.microsoft.com/office/drawing/2014/main" id="{78D9C909-CA27-6949-BA35-B0C232EEBE3C}"/>
-              </a:ext>
-            </a:extLst>
-          </p:cNvPr>
-          <p:cNvPicPr/>
-          <p:nvPr/>
-        </p:nvPicPr>
-        <p:blipFill>
-          <a:blip r:embed="rId2">
-            <a:extLst>
-              <a:ext uri="{28A0092B-C50C-407E-A947-70E740481C1C}">
-                <a14:useLocalDpi xmlns:a14="http://schemas.microsoft.com/office/drawing/2010/main" val="0"/>
-              </a:ext>
-            </a:extLst>
-          </a:blip>
-          <a:stretch>
-            <a:fillRect/>
-          </a:stretch>
-        </p:blipFill>
-        <p:spPr>
-          <a:xfrm>
-            <a:off x="2533108" y="1964268"/>
-            <a:ext cx="7418400" cy="2341562"/>
-          </a:xfrm>
-          <a:prstGeom prst="rect">
-            <a:avLst/>
-          </a:prstGeom>
-        </p:spPr>
-      </p:pic>
-      <p:sp>
-        <p:nvSpPr>
-          <p:cNvPr id="5" name="Rectangle 4">
-            <a:extLst>
-              <a:ext uri="{FF2B5EF4-FFF2-40B4-BE49-F238E27FC236}">
-                <a16:creationId xmlns:a16="http://schemas.microsoft.com/office/drawing/2014/main" id="{EB86DADB-9ADE-8249-875D-54FD4C2CF9EB}"/>
+      <p:sp>
+        <p:nvSpPr>
+          <p:cNvPr id="4" name="Right Triangle 3">
+            <a:extLst>
+              <a:ext uri="{FF2B5EF4-FFF2-40B4-BE49-F238E27FC236}">
+                <a16:creationId xmlns:a16="http://schemas.microsoft.com/office/drawing/2014/main" id="{47CBC37A-8823-0640-A9BB-233322540E5E}"/>
               </a:ext>
             </a:extLst>
           </p:cNvPr>
@@ -4964,13 +4781,21 @@
           <p:nvPr/>
         </p:nvSpPr>
         <p:spPr>
-          <a:xfrm rot="20853447">
-            <a:off x="5795159" y="2541319"/>
-            <a:ext cx="1151906" cy="685800"/>
-          </a:xfrm>
-          <a:prstGeom prst="rect">
-            <a:avLst/>
-          </a:prstGeom>
+          <a:xfrm flipH="1">
+            <a:off x="3472543" y="2231572"/>
+            <a:ext cx="4974771" cy="1436914"/>
+          </a:xfrm>
+          <a:prstGeom prst="rtTriangle">
+            <a:avLst/>
+          </a:prstGeom>
+          <a:solidFill>
+            <a:schemeClr val="bg2"/>
+          </a:solidFill>
+          <a:ln w="38100">
+            <a:solidFill>
+              <a:schemeClr val="tx1"/>
+            </a:solidFill>
+          </a:ln>
         </p:spPr>
         <p:style>
           <a:lnRef idx="2">
@@ -4999,10 +4824,56 @@
       </p:sp>
       <p:sp>
         <p:nvSpPr>
+          <p:cNvPr id="5" name="Rectangle 4">
+            <a:extLst>
+              <a:ext uri="{FF2B5EF4-FFF2-40B4-BE49-F238E27FC236}">
+                <a16:creationId xmlns:a16="http://schemas.microsoft.com/office/drawing/2014/main" id="{25FD9150-F037-6649-B6B2-8EDCD9E7DF01}"/>
+              </a:ext>
+            </a:extLst>
+          </p:cNvPr>
+          <p:cNvSpPr/>
+          <p:nvPr/>
+        </p:nvSpPr>
+        <p:spPr>
+          <a:xfrm rot="20599305" flipH="1">
+            <a:off x="5340453" y="2362142"/>
+            <a:ext cx="1208314" cy="566057"/>
+          </a:xfrm>
+          <a:prstGeom prst="rect">
+            <a:avLst/>
+          </a:prstGeom>
+        </p:spPr>
+        <p:style>
+          <a:lnRef idx="2">
+            <a:schemeClr val="accent1">
+              <a:shade val="50000"/>
+            </a:schemeClr>
+          </a:lnRef>
+          <a:fillRef idx="1">
+            <a:schemeClr val="accent1"/>
+          </a:fillRef>
+          <a:effectRef idx="0">
+            <a:schemeClr val="accent1"/>
+          </a:effectRef>
+          <a:fontRef idx="minor">
+            <a:schemeClr val="lt1"/>
+          </a:fontRef>
+        </p:style>
+        <p:txBody>
+          <a:bodyPr rtlCol="0" anchor="ctr"/>
+          <a:lstStyle/>
+          <a:p>
+            <a:pPr algn="ctr"/>
+            <a:endParaRPr lang="en-GB" sz="3600" b="1" dirty="0"/>
+          </a:p>
+        </p:txBody>
+      </p:sp>
+      <p:sp>
+        <p:nvSpPr>
           <p:cNvPr id="6" name="Left Arrow 5">
             <a:extLst>
               <a:ext uri="{FF2B5EF4-FFF2-40B4-BE49-F238E27FC236}">
-                <a16:creationId xmlns:a16="http://schemas.microsoft.com/office/drawing/2014/main" id="{F733898A-1283-7E46-B94C-7EBDE83301CC}"/>
+                <a16:creationId xmlns:a16="http://schemas.microsoft.com/office/drawing/2014/main" id="{D0E40191-2765-864C-AE39-23E55D1DCE88}"/>
               </a:ext>
             </a:extLst>
           </p:cNvPr>
@@ -5011,7 +4882,7 @@
         </p:nvSpPr>
         <p:spPr>
           <a:xfrm rot="20563443" flipH="1">
-            <a:off x="6305585" y="2735864"/>
+            <a:off x="5880746" y="2486482"/>
             <a:ext cx="469059" cy="225122"/>
           </a:xfrm>
           <a:prstGeom prst="leftArrow">
@@ -5045,10 +4916,10 @@
       </p:sp>
       <p:sp>
         <p:nvSpPr>
-          <p:cNvPr id="7" name="Left Arrow 6">
-            <a:extLst>
-              <a:ext uri="{FF2B5EF4-FFF2-40B4-BE49-F238E27FC236}">
-                <a16:creationId xmlns:a16="http://schemas.microsoft.com/office/drawing/2014/main" id="{52008AA1-5A00-C549-9D09-33BD3DF268A6}"/>
+          <p:cNvPr id="9" name="Left Arrow 8">
+            <a:extLst>
+              <a:ext uri="{FF2B5EF4-FFF2-40B4-BE49-F238E27FC236}">
+                <a16:creationId xmlns:a16="http://schemas.microsoft.com/office/drawing/2014/main" id="{4FB34D8C-41AC-3541-A3C0-96FA019E12F5}"/>
               </a:ext>
             </a:extLst>
           </p:cNvPr>
@@ -5057,7 +4928,7 @@
         </p:nvSpPr>
         <p:spPr>
           <a:xfrm rot="5400000" flipH="1">
-            <a:off x="5243767" y="3839192"/>
+            <a:off x="4818928" y="3589810"/>
             <a:ext cx="2189782" cy="208248"/>
           </a:xfrm>
           <a:prstGeom prst="leftArrow">
@@ -5091,10 +4962,10 @@
       </p:sp>
       <p:sp>
         <p:nvSpPr>
-          <p:cNvPr id="8" name="Left Arrow 7">
-            <a:extLst>
-              <a:ext uri="{FF2B5EF4-FFF2-40B4-BE49-F238E27FC236}">
-                <a16:creationId xmlns:a16="http://schemas.microsoft.com/office/drawing/2014/main" id="{16BD35A5-FB0A-2F43-B544-C0723B1C1AFE}"/>
+          <p:cNvPr id="10" name="Left Arrow 9">
+            <a:extLst>
+              <a:ext uri="{FF2B5EF4-FFF2-40B4-BE49-F238E27FC236}">
+                <a16:creationId xmlns:a16="http://schemas.microsoft.com/office/drawing/2014/main" id="{D7FB9F4D-2012-A94A-943A-CA4AD98EFE98}"/>
               </a:ext>
             </a:extLst>
           </p:cNvPr>
@@ -5103,7 +4974,7 @@
         </p:nvSpPr>
         <p:spPr>
           <a:xfrm rot="4500000" flipV="1">
-            <a:off x="5465459" y="2144266"/>
+            <a:off x="5040620" y="1894884"/>
             <a:ext cx="1403584" cy="230019"/>
           </a:xfrm>
           <a:prstGeom prst="leftArrow">
@@ -5137,10 +5008,10 @@
       </p:sp>
       <p:sp>
         <p:nvSpPr>
-          <p:cNvPr id="9" name="TextBox 8">
-            <a:extLst>
-              <a:ext uri="{FF2B5EF4-FFF2-40B4-BE49-F238E27FC236}">
-                <a16:creationId xmlns:a16="http://schemas.microsoft.com/office/drawing/2014/main" id="{95D2F71E-1D06-3B4D-A8A6-4402AEBD402A}"/>
+          <p:cNvPr id="2" name="TextBox 1">
+            <a:extLst>
+              <a:ext uri="{FF2B5EF4-FFF2-40B4-BE49-F238E27FC236}">
+                <a16:creationId xmlns:a16="http://schemas.microsoft.com/office/drawing/2014/main" id="{D830D89E-4CA1-0244-BFB4-91D4DE76A003}"/>
               </a:ext>
             </a:extLst>
           </p:cNvPr>
@@ -5149,7 +5020,7 @@
         </p:nvSpPr>
         <p:spPr>
           <a:xfrm>
-            <a:off x="6352554" y="1551629"/>
+            <a:off x="5736461" y="1490096"/>
             <a:ext cx="934871" cy="369332"/>
           </a:xfrm>
           <a:prstGeom prst="rect">
@@ -5172,10 +5043,10 @@
       </p:sp>
       <p:sp>
         <p:nvSpPr>
-          <p:cNvPr id="10" name="TextBox 9">
-            <a:extLst>
-              <a:ext uri="{FF2B5EF4-FFF2-40B4-BE49-F238E27FC236}">
-                <a16:creationId xmlns:a16="http://schemas.microsoft.com/office/drawing/2014/main" id="{31B089C9-2E32-D042-AA35-F9CAD44A8D7A}"/>
+          <p:cNvPr id="3" name="TextBox 2">
+            <a:extLst>
+              <a:ext uri="{FF2B5EF4-FFF2-40B4-BE49-F238E27FC236}">
+                <a16:creationId xmlns:a16="http://schemas.microsoft.com/office/drawing/2014/main" id="{01D2AFD2-A3FE-D04A-8C66-6DDD957002E0}"/>
               </a:ext>
             </a:extLst>
           </p:cNvPr>
@@ -5184,7 +5055,7 @@
         </p:nvSpPr>
         <p:spPr>
           <a:xfrm>
-            <a:off x="7220673" y="2262190"/>
+            <a:off x="6604580" y="2200657"/>
             <a:ext cx="894797" cy="369332"/>
           </a:xfrm>
           <a:prstGeom prst="rect">
@@ -5207,10 +5078,10 @@
       </p:sp>
       <p:sp>
         <p:nvSpPr>
-          <p:cNvPr id="11" name="TextBox 10">
-            <a:extLst>
-              <a:ext uri="{FF2B5EF4-FFF2-40B4-BE49-F238E27FC236}">
-                <a16:creationId xmlns:a16="http://schemas.microsoft.com/office/drawing/2014/main" id="{F23041CA-17E8-A044-944B-A1A0D085EF70}"/>
+          <p:cNvPr id="7" name="TextBox 6">
+            <a:extLst>
+              <a:ext uri="{FF2B5EF4-FFF2-40B4-BE49-F238E27FC236}">
+                <a16:creationId xmlns:a16="http://schemas.microsoft.com/office/drawing/2014/main" id="{280255DB-5152-4D49-B7C3-B6B7BF09EE93}"/>
               </a:ext>
             </a:extLst>
           </p:cNvPr>
@@ -5219,7 +5090,7 @@
         </p:nvSpPr>
         <p:spPr>
           <a:xfrm>
-            <a:off x="6576021" y="4360400"/>
+            <a:off x="5959928" y="4298867"/>
             <a:ext cx="855362" cy="369332"/>
           </a:xfrm>
           <a:prstGeom prst="rect">
@@ -5243,7 +5114,7 @@
     </p:spTree>
     <p:extLst>
       <p:ext uri="{BB962C8B-B14F-4D97-AF65-F5344CB8AC3E}">
-        <p14:creationId xmlns:p14="http://schemas.microsoft.com/office/powerpoint/2010/main" val="2870301566"/>
+        <p14:creationId xmlns:p14="http://schemas.microsoft.com/office/powerpoint/2010/main" val="1243252161"/>
       </p:ext>
     </p:extLst>
   </p:cSld>
@@ -5270,117 +5141,92 @@
           <a:chExt cx="0" cy="0"/>
         </a:xfrm>
       </p:grpSpPr>
-      <p:cxnSp>
-        <p:nvCxnSpPr>
-          <p:cNvPr id="16" name="Straight Connector 15">
-            <a:extLst>
-              <a:ext uri="{FF2B5EF4-FFF2-40B4-BE49-F238E27FC236}">
-                <a16:creationId xmlns:a16="http://schemas.microsoft.com/office/drawing/2014/main" id="{0C0C574D-8B27-B44B-B7B4-4D1C881D0DC6}"/>
-              </a:ext>
-            </a:extLst>
-          </p:cNvPr>
-          <p:cNvCxnSpPr>
-            <a:cxnSpLocks/>
-          </p:cNvCxnSpPr>
-          <p:nvPr/>
-        </p:nvCxnSpPr>
-        <p:spPr>
-          <a:xfrm>
-            <a:off x="6349789" y="6140095"/>
-            <a:ext cx="43994" cy="182833"/>
-          </a:xfrm>
-          <a:prstGeom prst="line">
+      <p:pic>
+        <p:nvPicPr>
+          <p:cNvPr id="4" name="Picture 3" descr="A small toy car&#10;&#10;Description automatically generated with low confidence">
+            <a:extLst>
+              <a:ext uri="{FF2B5EF4-FFF2-40B4-BE49-F238E27FC236}">
+                <a16:creationId xmlns:a16="http://schemas.microsoft.com/office/drawing/2014/main" id="{78D9C909-CA27-6949-BA35-B0C232EEBE3C}"/>
+              </a:ext>
+            </a:extLst>
+          </p:cNvPr>
+          <p:cNvPicPr/>
+          <p:nvPr/>
+        </p:nvPicPr>
+        <p:blipFill>
+          <a:blip r:embed="rId2">
+            <a:extLst>
+              <a:ext uri="{28A0092B-C50C-407E-A947-70E740481C1C}">
+                <a14:useLocalDpi xmlns:a14="http://schemas.microsoft.com/office/drawing/2010/main" val="0"/>
+              </a:ext>
+            </a:extLst>
+          </a:blip>
+          <a:stretch>
+            <a:fillRect/>
+          </a:stretch>
+        </p:blipFill>
+        <p:spPr>
+          <a:xfrm>
+            <a:off x="2533108" y="1964268"/>
+            <a:ext cx="7418400" cy="2341562"/>
+          </a:xfrm>
+          <a:prstGeom prst="rect">
+            <a:avLst/>
+          </a:prstGeom>
+        </p:spPr>
+      </p:pic>
+      <p:sp>
+        <p:nvSpPr>
+          <p:cNvPr id="5" name="Rectangle 4">
+            <a:extLst>
+              <a:ext uri="{FF2B5EF4-FFF2-40B4-BE49-F238E27FC236}">
+                <a16:creationId xmlns:a16="http://schemas.microsoft.com/office/drawing/2014/main" id="{EB86DADB-9ADE-8249-875D-54FD4C2CF9EB}"/>
+              </a:ext>
+            </a:extLst>
+          </p:cNvPr>
+          <p:cNvSpPr/>
+          <p:nvPr/>
+        </p:nvSpPr>
+        <p:spPr>
+          <a:xfrm rot="20853447">
+            <a:off x="5795159" y="2541319"/>
+            <a:ext cx="1151906" cy="685800"/>
+          </a:xfrm>
+          <a:prstGeom prst="rect">
             <a:avLst/>
           </a:prstGeom>
         </p:spPr>
         <p:style>
-          <a:lnRef idx="1">
-            <a:schemeClr val="accent1"/>
+          <a:lnRef idx="2">
+            <a:schemeClr val="accent1">
+              <a:shade val="50000"/>
+            </a:schemeClr>
           </a:lnRef>
-          <a:fillRef idx="0">
+          <a:fillRef idx="1">
             <a:schemeClr val="accent1"/>
           </a:fillRef>
           <a:effectRef idx="0">
             <a:schemeClr val="accent1"/>
           </a:effectRef>
           <a:fontRef idx="minor">
-            <a:schemeClr val="tx1"/>
+            <a:schemeClr val="lt1"/>
           </a:fontRef>
         </p:style>
-      </p:cxnSp>
-      <p:cxnSp>
-        <p:nvCxnSpPr>
-          <p:cNvPr id="13" name="Straight Connector 12">
-            <a:extLst>
-              <a:ext uri="{FF2B5EF4-FFF2-40B4-BE49-F238E27FC236}">
-                <a16:creationId xmlns:a16="http://schemas.microsoft.com/office/drawing/2014/main" id="{2B0C1ADA-A502-3948-AFC7-D359F728EEEE}"/>
-              </a:ext>
-            </a:extLst>
-          </p:cNvPr>
-          <p:cNvCxnSpPr>
-            <a:cxnSpLocks/>
-          </p:cNvCxnSpPr>
-          <p:nvPr/>
-        </p:nvCxnSpPr>
-        <p:spPr>
-          <a:xfrm flipV="1">
-            <a:off x="6342429" y="6101923"/>
-            <a:ext cx="143726" cy="47180"/>
-          </a:xfrm>
-          <a:prstGeom prst="line">
-            <a:avLst/>
-          </a:prstGeom>
-        </p:spPr>
-        <p:style>
-          <a:lnRef idx="1">
-            <a:schemeClr val="accent1"/>
-          </a:lnRef>
-          <a:fillRef idx="0">
-            <a:schemeClr val="accent1"/>
-          </a:fillRef>
-          <a:effectRef idx="0">
-            <a:schemeClr val="accent1"/>
-          </a:effectRef>
-          <a:fontRef idx="minor">
-            <a:schemeClr val="tx1"/>
-          </a:fontRef>
-        </p:style>
-      </p:cxnSp>
-      <p:pic>
-        <p:nvPicPr>
-          <p:cNvPr id="5" name="Content Placeholder 4" descr="Diagram&#10;&#10;Description automatically generated">
-            <a:extLst>
-              <a:ext uri="{FF2B5EF4-FFF2-40B4-BE49-F238E27FC236}">
-                <a16:creationId xmlns:a16="http://schemas.microsoft.com/office/drawing/2014/main" id="{62C233A3-64F3-B540-9692-82EE8AC21D0F}"/>
-              </a:ext>
-            </a:extLst>
-          </p:cNvPr>
-          <p:cNvPicPr>
-            <a:picLocks noGrp="1" noChangeAspect="1"/>
-          </p:cNvPicPr>
-          <p:nvPr>
-            <p:ph idx="1"/>
-          </p:nvPr>
-        </p:nvPicPr>
-        <p:blipFill>
-          <a:blip r:embed="rId2"/>
-          <a:stretch>
-            <a:fillRect/>
-          </a:stretch>
-        </p:blipFill>
-        <p:spPr>
-          <a:xfrm>
-            <a:off x="3252626" y="183092"/>
-            <a:ext cx="5686748" cy="4351338"/>
-          </a:xfrm>
-        </p:spPr>
-      </p:pic>
+        <p:txBody>
+          <a:bodyPr rtlCol="0" anchor="ctr"/>
+          <a:lstStyle/>
+          <a:p>
+            <a:pPr algn="ctr"/>
+            <a:endParaRPr lang="en-GB"/>
+          </a:p>
+        </p:txBody>
+      </p:sp>
       <p:sp>
         <p:nvSpPr>
           <p:cNvPr id="6" name="Left Arrow 5">
             <a:extLst>
               <a:ext uri="{FF2B5EF4-FFF2-40B4-BE49-F238E27FC236}">
-                <a16:creationId xmlns:a16="http://schemas.microsoft.com/office/drawing/2014/main" id="{7A6688D7-76B2-E94D-95CD-F27EC07A2751}"/>
+                <a16:creationId xmlns:a16="http://schemas.microsoft.com/office/drawing/2014/main" id="{F733898A-1283-7E46-B94C-7EBDE83301CC}"/>
               </a:ext>
             </a:extLst>
           </p:cNvPr>
@@ -5389,7 +5235,7 @@
         </p:nvSpPr>
         <p:spPr>
           <a:xfrm rot="20563443" flipH="1">
-            <a:off x="6172353" y="6213675"/>
+            <a:off x="6305585" y="2735864"/>
             <a:ext cx="469059" cy="225122"/>
           </a:xfrm>
           <a:prstGeom prst="leftArrow">
@@ -5426,7 +5272,7 @@
           <p:cNvPr id="7" name="Left Arrow 6">
             <a:extLst>
               <a:ext uri="{FF2B5EF4-FFF2-40B4-BE49-F238E27FC236}">
-                <a16:creationId xmlns:a16="http://schemas.microsoft.com/office/drawing/2014/main" id="{3E3F52DB-1793-E34C-A778-17CE4F7D2D99}"/>
+                <a16:creationId xmlns:a16="http://schemas.microsoft.com/office/drawing/2014/main" id="{52008AA1-5A00-C549-9D09-33BD3DF268A6}"/>
               </a:ext>
             </a:extLst>
           </p:cNvPr>
@@ -5435,8 +5281,8 @@
         </p:nvSpPr>
         <p:spPr>
           <a:xfrm rot="5400000" flipH="1">
-            <a:off x="5418187" y="5610695"/>
-            <a:ext cx="1555759" cy="200133"/>
+            <a:off x="5243767" y="3839192"/>
+            <a:ext cx="2189782" cy="208248"/>
           </a:xfrm>
           <a:prstGeom prst="leftArrow">
             <a:avLst/>
@@ -5472,7 +5318,7 @@
           <p:cNvPr id="8" name="Left Arrow 7">
             <a:extLst>
               <a:ext uri="{FF2B5EF4-FFF2-40B4-BE49-F238E27FC236}">
-                <a16:creationId xmlns:a16="http://schemas.microsoft.com/office/drawing/2014/main" id="{617072C0-A4DE-1445-80EB-D869C45F39F9}"/>
+                <a16:creationId xmlns:a16="http://schemas.microsoft.com/office/drawing/2014/main" id="{16BD35A5-FB0A-2F43-B544-C0723B1C1AFE}"/>
               </a:ext>
             </a:extLst>
           </p:cNvPr>
@@ -5481,7 +5327,7 @@
         </p:nvSpPr>
         <p:spPr>
           <a:xfrm rot="4500000" flipV="1">
-            <a:off x="5686936" y="5525520"/>
+            <a:off x="5465459" y="2144266"/>
             <a:ext cx="1403584" cy="230019"/>
           </a:xfrm>
           <a:prstGeom prst="leftArrow">
@@ -5518,7 +5364,7 @@
           <p:cNvPr id="9" name="TextBox 8">
             <a:extLst>
               <a:ext uri="{FF2B5EF4-FFF2-40B4-BE49-F238E27FC236}">
-                <a16:creationId xmlns:a16="http://schemas.microsoft.com/office/drawing/2014/main" id="{CD139FE7-4979-2543-9DBE-2F5FAE7D39D4}"/>
+                <a16:creationId xmlns:a16="http://schemas.microsoft.com/office/drawing/2014/main" id="{95D2F71E-1D06-3B4D-A8A6-4402AEBD402A}"/>
               </a:ext>
             </a:extLst>
           </p:cNvPr>
@@ -5527,7 +5373,7 @@
         </p:nvSpPr>
         <p:spPr>
           <a:xfrm>
-            <a:off x="6664260" y="5526095"/>
+            <a:off x="6352554" y="1551629"/>
             <a:ext cx="934871" cy="369332"/>
           </a:xfrm>
           <a:prstGeom prst="rect">
@@ -5553,7 +5399,7 @@
           <p:cNvPr id="10" name="TextBox 9">
             <a:extLst>
               <a:ext uri="{FF2B5EF4-FFF2-40B4-BE49-F238E27FC236}">
-                <a16:creationId xmlns:a16="http://schemas.microsoft.com/office/drawing/2014/main" id="{7BCC6A7D-12E8-B34A-A8B2-542849C788E0}"/>
+                <a16:creationId xmlns:a16="http://schemas.microsoft.com/office/drawing/2014/main" id="{31B089C9-2E32-D042-AA35-F9CAD44A8D7A}"/>
               </a:ext>
             </a:extLst>
           </p:cNvPr>
@@ -5562,7 +5408,7 @@
         </p:nvSpPr>
         <p:spPr>
           <a:xfrm>
-            <a:off x="5959483" y="6453538"/>
+            <a:off x="7220673" y="2262190"/>
             <a:ext cx="894797" cy="369332"/>
           </a:xfrm>
           <a:prstGeom prst="rect">
@@ -5588,7 +5434,7 @@
           <p:cNvPr id="11" name="TextBox 10">
             <a:extLst>
               <a:ext uri="{FF2B5EF4-FFF2-40B4-BE49-F238E27FC236}">
-                <a16:creationId xmlns:a16="http://schemas.microsoft.com/office/drawing/2014/main" id="{6EF5F33B-1FA2-AA47-B087-E96602425DE8}"/>
+                <a16:creationId xmlns:a16="http://schemas.microsoft.com/office/drawing/2014/main" id="{F23041CA-17E8-A044-944B-A1A0D085EF70}"/>
               </a:ext>
             </a:extLst>
           </p:cNvPr>
@@ -5597,7 +5443,7 @@
         </p:nvSpPr>
         <p:spPr>
           <a:xfrm>
-            <a:off x="5152162" y="5589729"/>
+            <a:off x="6576021" y="4360400"/>
             <a:ext cx="855362" cy="369332"/>
           </a:xfrm>
           <a:prstGeom prst="rect">
@@ -5621,7 +5467,7 @@
     </p:spTree>
     <p:extLst>
       <p:ext uri="{BB962C8B-B14F-4D97-AF65-F5344CB8AC3E}">
-        <p14:creationId xmlns:p14="http://schemas.microsoft.com/office/powerpoint/2010/main" val="5451330"/>
+        <p14:creationId xmlns:p14="http://schemas.microsoft.com/office/powerpoint/2010/main" val="2870301566"/>
       </p:ext>
     </p:extLst>
   </p:cSld>
@@ -5664,7 +5510,7 @@
         </p:nvCxnSpPr>
         <p:spPr>
           <a:xfrm>
-            <a:off x="6349789" y="5913182"/>
+            <a:off x="6349789" y="6140095"/>
             <a:ext cx="43994" cy="182833"/>
           </a:xfrm>
           <a:prstGeom prst="line">
@@ -5702,7 +5548,7 @@
         </p:nvCxnSpPr>
         <p:spPr>
           <a:xfrm flipV="1">
-            <a:off x="6342429" y="5875010"/>
+            <a:off x="6342429" y="6101923"/>
             <a:ext cx="143726" cy="47180"/>
           </a:xfrm>
           <a:prstGeom prst="line">
@@ -5724,6 +5570,35 @@
           </a:fontRef>
         </p:style>
       </p:cxnSp>
+      <p:pic>
+        <p:nvPicPr>
+          <p:cNvPr id="5" name="Content Placeholder 4" descr="Diagram&#10;&#10;Description automatically generated">
+            <a:extLst>
+              <a:ext uri="{FF2B5EF4-FFF2-40B4-BE49-F238E27FC236}">
+                <a16:creationId xmlns:a16="http://schemas.microsoft.com/office/drawing/2014/main" id="{62C233A3-64F3-B540-9692-82EE8AC21D0F}"/>
+              </a:ext>
+            </a:extLst>
+          </p:cNvPr>
+          <p:cNvPicPr>
+            <a:picLocks noGrp="1" noChangeAspect="1"/>
+          </p:cNvPicPr>
+          <p:nvPr>
+            <p:ph idx="1"/>
+          </p:nvPr>
+        </p:nvPicPr>
+        <p:blipFill>
+          <a:blip r:embed="rId2"/>
+          <a:stretch>
+            <a:fillRect/>
+          </a:stretch>
+        </p:blipFill>
+        <p:spPr>
+          <a:xfrm>
+            <a:off x="3252626" y="183092"/>
+            <a:ext cx="5686748" cy="4351338"/>
+          </a:xfrm>
+        </p:spPr>
+      </p:pic>
       <p:sp>
         <p:nvSpPr>
           <p:cNvPr id="6" name="Left Arrow 5">
@@ -5738,7 +5613,7 @@
         </p:nvSpPr>
         <p:spPr>
           <a:xfrm rot="20563443" flipH="1">
-            <a:off x="6172353" y="5986762"/>
+            <a:off x="6172353" y="6213675"/>
             <a:ext cx="469059" cy="225122"/>
           </a:xfrm>
           <a:prstGeom prst="leftArrow">
@@ -5784,7 +5659,7 @@
         </p:nvSpPr>
         <p:spPr>
           <a:xfrm rot="5400000" flipH="1">
-            <a:off x="5418187" y="5383782"/>
+            <a:off x="5418187" y="5610695"/>
             <a:ext cx="1555759" cy="200133"/>
           </a:xfrm>
           <a:prstGeom prst="leftArrow">
@@ -5830,7 +5705,7 @@
         </p:nvSpPr>
         <p:spPr>
           <a:xfrm rot="4500000" flipV="1">
-            <a:off x="5686936" y="5298607"/>
+            <a:off x="5686936" y="5525520"/>
             <a:ext cx="1403584" cy="230019"/>
           </a:xfrm>
           <a:prstGeom prst="leftArrow">
@@ -5876,6 +5751,355 @@
         </p:nvSpPr>
         <p:spPr>
           <a:xfrm>
+            <a:off x="6664260" y="5526095"/>
+            <a:ext cx="934871" cy="369332"/>
+          </a:xfrm>
+          <a:prstGeom prst="rect">
+            <a:avLst/>
+          </a:prstGeom>
+          <a:noFill/>
+        </p:spPr>
+        <p:txBody>
+          <a:bodyPr wrap="none" rtlCol="0">
+            <a:spAutoFit/>
+          </a:bodyPr>
+          <a:lstStyle/>
+          <a:p>
+            <a:r>
+              <a:rPr lang="en-GB" dirty="0"/>
+              <a:t>Support</a:t>
+            </a:r>
+          </a:p>
+        </p:txBody>
+      </p:sp>
+      <p:sp>
+        <p:nvSpPr>
+          <p:cNvPr id="10" name="TextBox 9">
+            <a:extLst>
+              <a:ext uri="{FF2B5EF4-FFF2-40B4-BE49-F238E27FC236}">
+                <a16:creationId xmlns:a16="http://schemas.microsoft.com/office/drawing/2014/main" id="{7BCC6A7D-12E8-B34A-A8B2-542849C788E0}"/>
+              </a:ext>
+            </a:extLst>
+          </p:cNvPr>
+          <p:cNvSpPr txBox="1"/>
+          <p:nvPr/>
+        </p:nvSpPr>
+        <p:spPr>
+          <a:xfrm>
+            <a:off x="5959483" y="6453538"/>
+            <a:ext cx="894797" cy="369332"/>
+          </a:xfrm>
+          <a:prstGeom prst="rect">
+            <a:avLst/>
+          </a:prstGeom>
+          <a:noFill/>
+        </p:spPr>
+        <p:txBody>
+          <a:bodyPr wrap="none" rtlCol="0">
+            <a:spAutoFit/>
+          </a:bodyPr>
+          <a:lstStyle/>
+          <a:p>
+            <a:r>
+              <a:rPr lang="en-GB" dirty="0"/>
+              <a:t>Friction</a:t>
+            </a:r>
+          </a:p>
+        </p:txBody>
+      </p:sp>
+      <p:sp>
+        <p:nvSpPr>
+          <p:cNvPr id="11" name="TextBox 10">
+            <a:extLst>
+              <a:ext uri="{FF2B5EF4-FFF2-40B4-BE49-F238E27FC236}">
+                <a16:creationId xmlns:a16="http://schemas.microsoft.com/office/drawing/2014/main" id="{6EF5F33B-1FA2-AA47-B087-E96602425DE8}"/>
+              </a:ext>
+            </a:extLst>
+          </p:cNvPr>
+          <p:cNvSpPr txBox="1"/>
+          <p:nvPr/>
+        </p:nvSpPr>
+        <p:spPr>
+          <a:xfrm>
+            <a:off x="5152162" y="5589729"/>
+            <a:ext cx="855362" cy="369332"/>
+          </a:xfrm>
+          <a:prstGeom prst="rect">
+            <a:avLst/>
+          </a:prstGeom>
+          <a:noFill/>
+        </p:spPr>
+        <p:txBody>
+          <a:bodyPr wrap="none" rtlCol="0">
+            <a:spAutoFit/>
+          </a:bodyPr>
+          <a:lstStyle/>
+          <a:p>
+            <a:r>
+              <a:rPr lang="en-GB" dirty="0"/>
+              <a:t>Weight</a:t>
+            </a:r>
+          </a:p>
+        </p:txBody>
+      </p:sp>
+    </p:spTree>
+    <p:extLst>
+      <p:ext uri="{BB962C8B-B14F-4D97-AF65-F5344CB8AC3E}">
+        <p14:creationId xmlns:p14="http://schemas.microsoft.com/office/powerpoint/2010/main" val="5451330"/>
+      </p:ext>
+    </p:extLst>
+  </p:cSld>
+  <p:clrMapOvr>
+    <a:masterClrMapping/>
+  </p:clrMapOvr>
+</p:sld>
+</file>
+
+<file path=ppt/slides/slide15.xml><?xml version="1.0" encoding="utf-8"?>
+<p:sld xmlns:a="http://schemas.openxmlformats.org/drawingml/2006/main" xmlns:r="http://schemas.openxmlformats.org/officeDocument/2006/relationships" xmlns:p="http://schemas.openxmlformats.org/presentationml/2006/main">
+  <p:cSld>
+    <p:spTree>
+      <p:nvGrpSpPr>
+        <p:cNvPr id="1" name=""/>
+        <p:cNvGrpSpPr/>
+        <p:nvPr/>
+      </p:nvGrpSpPr>
+      <p:grpSpPr>
+        <a:xfrm>
+          <a:off x="0" y="0"/>
+          <a:ext cx="0" cy="0"/>
+          <a:chOff x="0" y="0"/>
+          <a:chExt cx="0" cy="0"/>
+        </a:xfrm>
+      </p:grpSpPr>
+      <p:cxnSp>
+        <p:nvCxnSpPr>
+          <p:cNvPr id="16" name="Straight Connector 15">
+            <a:extLst>
+              <a:ext uri="{FF2B5EF4-FFF2-40B4-BE49-F238E27FC236}">
+                <a16:creationId xmlns:a16="http://schemas.microsoft.com/office/drawing/2014/main" id="{0C0C574D-8B27-B44B-B7B4-4D1C881D0DC6}"/>
+              </a:ext>
+            </a:extLst>
+          </p:cNvPr>
+          <p:cNvCxnSpPr>
+            <a:cxnSpLocks/>
+          </p:cNvCxnSpPr>
+          <p:nvPr/>
+        </p:nvCxnSpPr>
+        <p:spPr>
+          <a:xfrm>
+            <a:off x="6349789" y="5913182"/>
+            <a:ext cx="43994" cy="182833"/>
+          </a:xfrm>
+          <a:prstGeom prst="line">
+            <a:avLst/>
+          </a:prstGeom>
+        </p:spPr>
+        <p:style>
+          <a:lnRef idx="1">
+            <a:schemeClr val="accent1"/>
+          </a:lnRef>
+          <a:fillRef idx="0">
+            <a:schemeClr val="accent1"/>
+          </a:fillRef>
+          <a:effectRef idx="0">
+            <a:schemeClr val="accent1"/>
+          </a:effectRef>
+          <a:fontRef idx="minor">
+            <a:schemeClr val="tx1"/>
+          </a:fontRef>
+        </p:style>
+      </p:cxnSp>
+      <p:cxnSp>
+        <p:nvCxnSpPr>
+          <p:cNvPr id="13" name="Straight Connector 12">
+            <a:extLst>
+              <a:ext uri="{FF2B5EF4-FFF2-40B4-BE49-F238E27FC236}">
+                <a16:creationId xmlns:a16="http://schemas.microsoft.com/office/drawing/2014/main" id="{2B0C1ADA-A502-3948-AFC7-D359F728EEEE}"/>
+              </a:ext>
+            </a:extLst>
+          </p:cNvPr>
+          <p:cNvCxnSpPr>
+            <a:cxnSpLocks/>
+          </p:cNvCxnSpPr>
+          <p:nvPr/>
+        </p:nvCxnSpPr>
+        <p:spPr>
+          <a:xfrm flipV="1">
+            <a:off x="6342429" y="5875010"/>
+            <a:ext cx="143726" cy="47180"/>
+          </a:xfrm>
+          <a:prstGeom prst="line">
+            <a:avLst/>
+          </a:prstGeom>
+        </p:spPr>
+        <p:style>
+          <a:lnRef idx="1">
+            <a:schemeClr val="accent1"/>
+          </a:lnRef>
+          <a:fillRef idx="0">
+            <a:schemeClr val="accent1"/>
+          </a:fillRef>
+          <a:effectRef idx="0">
+            <a:schemeClr val="accent1"/>
+          </a:effectRef>
+          <a:fontRef idx="minor">
+            <a:schemeClr val="tx1"/>
+          </a:fontRef>
+        </p:style>
+      </p:cxnSp>
+      <p:sp>
+        <p:nvSpPr>
+          <p:cNvPr id="6" name="Left Arrow 5">
+            <a:extLst>
+              <a:ext uri="{FF2B5EF4-FFF2-40B4-BE49-F238E27FC236}">
+                <a16:creationId xmlns:a16="http://schemas.microsoft.com/office/drawing/2014/main" id="{7A6688D7-76B2-E94D-95CD-F27EC07A2751}"/>
+              </a:ext>
+            </a:extLst>
+          </p:cNvPr>
+          <p:cNvSpPr/>
+          <p:nvPr/>
+        </p:nvSpPr>
+        <p:spPr>
+          <a:xfrm rot="20563443" flipH="1">
+            <a:off x="6172353" y="5986762"/>
+            <a:ext cx="469059" cy="225122"/>
+          </a:xfrm>
+          <a:prstGeom prst="leftArrow">
+            <a:avLst/>
+          </a:prstGeom>
+        </p:spPr>
+        <p:style>
+          <a:lnRef idx="2">
+            <a:schemeClr val="accent4">
+              <a:shade val="50000"/>
+            </a:schemeClr>
+          </a:lnRef>
+          <a:fillRef idx="1">
+            <a:schemeClr val="accent4"/>
+          </a:fillRef>
+          <a:effectRef idx="0">
+            <a:schemeClr val="accent4"/>
+          </a:effectRef>
+          <a:fontRef idx="minor">
+            <a:schemeClr val="lt1"/>
+          </a:fontRef>
+        </p:style>
+        <p:txBody>
+          <a:bodyPr rtlCol="0" anchor="ctr"/>
+          <a:lstStyle/>
+          <a:p>
+            <a:pPr algn="ctr"/>
+            <a:endParaRPr lang="en-GB"/>
+          </a:p>
+        </p:txBody>
+      </p:sp>
+      <p:sp>
+        <p:nvSpPr>
+          <p:cNvPr id="7" name="Left Arrow 6">
+            <a:extLst>
+              <a:ext uri="{FF2B5EF4-FFF2-40B4-BE49-F238E27FC236}">
+                <a16:creationId xmlns:a16="http://schemas.microsoft.com/office/drawing/2014/main" id="{3E3F52DB-1793-E34C-A778-17CE4F7D2D99}"/>
+              </a:ext>
+            </a:extLst>
+          </p:cNvPr>
+          <p:cNvSpPr/>
+          <p:nvPr/>
+        </p:nvSpPr>
+        <p:spPr>
+          <a:xfrm rot="5400000" flipH="1">
+            <a:off x="5418187" y="5383782"/>
+            <a:ext cx="1555759" cy="200133"/>
+          </a:xfrm>
+          <a:prstGeom prst="leftArrow">
+            <a:avLst/>
+          </a:prstGeom>
+        </p:spPr>
+        <p:style>
+          <a:lnRef idx="2">
+            <a:schemeClr val="accent6">
+              <a:shade val="50000"/>
+            </a:schemeClr>
+          </a:lnRef>
+          <a:fillRef idx="1">
+            <a:schemeClr val="accent6"/>
+          </a:fillRef>
+          <a:effectRef idx="0">
+            <a:schemeClr val="accent6"/>
+          </a:effectRef>
+          <a:fontRef idx="minor">
+            <a:schemeClr val="lt1"/>
+          </a:fontRef>
+        </p:style>
+        <p:txBody>
+          <a:bodyPr rtlCol="0" anchor="ctr"/>
+          <a:lstStyle/>
+          <a:p>
+            <a:pPr algn="ctr"/>
+            <a:endParaRPr lang="en-GB"/>
+          </a:p>
+        </p:txBody>
+      </p:sp>
+      <p:sp>
+        <p:nvSpPr>
+          <p:cNvPr id="8" name="Left Arrow 7">
+            <a:extLst>
+              <a:ext uri="{FF2B5EF4-FFF2-40B4-BE49-F238E27FC236}">
+                <a16:creationId xmlns:a16="http://schemas.microsoft.com/office/drawing/2014/main" id="{617072C0-A4DE-1445-80EB-D869C45F39F9}"/>
+              </a:ext>
+            </a:extLst>
+          </p:cNvPr>
+          <p:cNvSpPr/>
+          <p:nvPr/>
+        </p:nvSpPr>
+        <p:spPr>
+          <a:xfrm rot="4500000" flipV="1">
+            <a:off x="5686936" y="5298607"/>
+            <a:ext cx="1403584" cy="230019"/>
+          </a:xfrm>
+          <a:prstGeom prst="leftArrow">
+            <a:avLst/>
+          </a:prstGeom>
+        </p:spPr>
+        <p:style>
+          <a:lnRef idx="2">
+            <a:schemeClr val="accent2">
+              <a:shade val="50000"/>
+            </a:schemeClr>
+          </a:lnRef>
+          <a:fillRef idx="1">
+            <a:schemeClr val="accent2"/>
+          </a:fillRef>
+          <a:effectRef idx="0">
+            <a:schemeClr val="accent2"/>
+          </a:effectRef>
+          <a:fontRef idx="minor">
+            <a:schemeClr val="lt1"/>
+          </a:fontRef>
+        </p:style>
+        <p:txBody>
+          <a:bodyPr rtlCol="0" anchor="ctr"/>
+          <a:lstStyle/>
+          <a:p>
+            <a:pPr algn="ctr"/>
+            <a:endParaRPr lang="en-GB"/>
+          </a:p>
+        </p:txBody>
+      </p:sp>
+      <p:sp>
+        <p:nvSpPr>
+          <p:cNvPr id="9" name="TextBox 8">
+            <a:extLst>
+              <a:ext uri="{FF2B5EF4-FFF2-40B4-BE49-F238E27FC236}">
+                <a16:creationId xmlns:a16="http://schemas.microsoft.com/office/drawing/2014/main" id="{CD139FE7-4979-2543-9DBE-2F5FAE7D39D4}"/>
+              </a:ext>
+            </a:extLst>
+          </p:cNvPr>
+          <p:cNvSpPr txBox="1"/>
+          <p:nvPr/>
+        </p:nvSpPr>
+        <p:spPr>
+          <a:xfrm>
             <a:off x="6664260" y="5299182"/>
             <a:ext cx="934871" cy="646331"/>
           </a:xfrm>
@@ -6033,7 +6257,7 @@
 </p:sld>
 </file>
 
-<file path=ppt/slides/slide15.xml><?xml version="1.0" encoding="utf-8"?>
+<file path=ppt/slides/slide16.xml><?xml version="1.0" encoding="utf-8"?>
 <p:sld xmlns:a="http://schemas.openxmlformats.org/drawingml/2006/main" xmlns:r="http://schemas.openxmlformats.org/officeDocument/2006/relationships" xmlns:p="http://schemas.openxmlformats.org/presentationml/2006/main">
   <p:cSld>
     <p:spTree>
@@ -6431,7 +6655,7 @@
 </p:sld>
 </file>
 
-<file path=ppt/slides/slide16.xml><?xml version="1.0" encoding="utf-8"?>
+<file path=ppt/slides/slide17.xml><?xml version="1.0" encoding="utf-8"?>
 <p:sld xmlns:a="http://schemas.openxmlformats.org/drawingml/2006/main" xmlns:r="http://schemas.openxmlformats.org/officeDocument/2006/relationships" xmlns:p="http://schemas.openxmlformats.org/presentationml/2006/main">
   <p:cSld>
     <p:spTree>
@@ -6867,7 +7091,7 @@
 </p:sld>
 </file>
 
-<file path=ppt/slides/slide17.xml><?xml version="1.0" encoding="utf-8"?>
+<file path=ppt/slides/slide18.xml><?xml version="1.0" encoding="utf-8"?>
 <p:sld xmlns:a="http://schemas.openxmlformats.org/drawingml/2006/main" xmlns:r="http://schemas.openxmlformats.org/officeDocument/2006/relationships" xmlns:p="http://schemas.openxmlformats.org/presentationml/2006/main">
   <p:cSld>
     <p:spTree>
@@ -9501,8 +9725,8 @@
         </p:nvSpPr>
         <p:spPr>
           <a:xfrm>
-            <a:off x="4047318" y="3874016"/>
-            <a:ext cx="4005943" cy="174172"/>
+            <a:off x="3992104" y="3901276"/>
+            <a:ext cx="4005943" cy="99309"/>
           </a:xfrm>
           <a:prstGeom prst="rect">
             <a:avLst/>
@@ -9546,9 +9770,9 @@
           <p:nvPr/>
         </p:nvSpPr>
         <p:spPr>
-          <a:xfrm rot="900000">
-            <a:off x="4093028" y="3341914"/>
-            <a:ext cx="4005943" cy="174172"/>
+          <a:xfrm rot="1800000">
+            <a:off x="4282051" y="2909861"/>
+            <a:ext cx="4005943" cy="81245"/>
           </a:xfrm>
           <a:prstGeom prst="rect">
             <a:avLst/>
@@ -9592,8 +9816,8 @@
           <p:nvPr/>
         </p:nvSpPr>
         <p:spPr>
-          <a:xfrm rot="900000">
-            <a:off x="5687784" y="2525485"/>
+          <a:xfrm rot="1800000">
+            <a:off x="6232413" y="2218605"/>
             <a:ext cx="816429" cy="816429"/>
           </a:xfrm>
           <a:prstGeom prst="rect">
@@ -9639,8 +9863,8 @@
         </p:nvSpPr>
         <p:spPr>
           <a:xfrm rot="10800000">
-            <a:off x="5954482" y="2991644"/>
-            <a:ext cx="283031" cy="1567543"/>
+            <a:off x="6528832" y="2664547"/>
+            <a:ext cx="184901" cy="1567543"/>
           </a:xfrm>
           <a:prstGeom prst="upArrow">
             <a:avLst/>
@@ -9716,10 +9940,88 @@
       </p:sp>
       <p:sp>
         <p:nvSpPr>
-          <p:cNvPr id="11" name="Up Arrow 10">
-            <a:extLst>
-              <a:ext uri="{FF2B5EF4-FFF2-40B4-BE49-F238E27FC236}">
-                <a16:creationId xmlns:a16="http://schemas.microsoft.com/office/drawing/2014/main" id="{794FD326-7BF3-B04E-AC8C-AA26E2518192}"/>
+          <p:cNvPr id="12" name="TextBox 11">
+            <a:extLst>
+              <a:ext uri="{FF2B5EF4-FFF2-40B4-BE49-F238E27FC236}">
+                <a16:creationId xmlns:a16="http://schemas.microsoft.com/office/drawing/2014/main" id="{A6CCFD9A-142D-094E-9AC6-6641FEC74639}"/>
+              </a:ext>
+            </a:extLst>
+          </p:cNvPr>
+          <p:cNvSpPr txBox="1"/>
+          <p:nvPr/>
+        </p:nvSpPr>
+        <p:spPr>
+          <a:xfrm>
+            <a:off x="5357406" y="1029520"/>
+            <a:ext cx="2333011" cy="646331"/>
+          </a:xfrm>
+          <a:prstGeom prst="rect">
+            <a:avLst/>
+          </a:prstGeom>
+          <a:noFill/>
+        </p:spPr>
+        <p:txBody>
+          <a:bodyPr wrap="square" rtlCol="0">
+            <a:spAutoFit/>
+          </a:bodyPr>
+          <a:lstStyle/>
+          <a:p>
+            <a:pPr algn="ctr"/>
+            <a:r>
+              <a:rPr lang="en-GB" b="1" dirty="0"/>
+              <a:t>Support/Normal Force</a:t>
+            </a:r>
+            <a:br>
+              <a:rPr lang="en-GB" b="1" dirty="0"/>
+            </a:br>
+            <a:r>
+              <a:rPr lang="en-GB" b="1" dirty="0"/>
+              <a:t>8.22N</a:t>
+            </a:r>
+          </a:p>
+        </p:txBody>
+      </p:sp>
+      <p:sp>
+        <p:nvSpPr>
+          <p:cNvPr id="3" name="TextBox 2">
+            <a:extLst>
+              <a:ext uri="{FF2B5EF4-FFF2-40B4-BE49-F238E27FC236}">
+                <a16:creationId xmlns:a16="http://schemas.microsoft.com/office/drawing/2014/main" id="{8EEBBAEC-86CF-C745-9937-0FC3208564A6}"/>
+              </a:ext>
+            </a:extLst>
+          </p:cNvPr>
+          <p:cNvSpPr txBox="1"/>
+          <p:nvPr/>
+        </p:nvSpPr>
+        <p:spPr>
+          <a:xfrm>
+            <a:off x="6737927" y="3489265"/>
+            <a:ext cx="679399" cy="461665"/>
+          </a:xfrm>
+          <a:prstGeom prst="rect">
+            <a:avLst/>
+          </a:prstGeom>
+          <a:noFill/>
+        </p:spPr>
+        <p:txBody>
+          <a:bodyPr wrap="square" rtlCol="0">
+            <a:spAutoFit/>
+          </a:bodyPr>
+          <a:lstStyle/>
+          <a:p>
+            <a:r>
+              <a:rPr lang="en-GB" sz="2400" b="1" dirty="0"/>
+              <a:t>30°</a:t>
+            </a:r>
+          </a:p>
+        </p:txBody>
+      </p:sp>
+      <p:sp>
+        <p:nvSpPr>
+          <p:cNvPr id="16" name="Up Arrow 15">
+            <a:extLst>
+              <a:ext uri="{FF2B5EF4-FFF2-40B4-BE49-F238E27FC236}">
+                <a16:creationId xmlns:a16="http://schemas.microsoft.com/office/drawing/2014/main" id="{4D0DB17B-517B-854C-8834-DDB546847825}"/>
               </a:ext>
             </a:extLst>
           </p:cNvPr>
@@ -9727,9 +10029,9 @@
           <p:nvPr/>
         </p:nvSpPr>
         <p:spPr>
-          <a:xfrm rot="900000">
-            <a:off x="6130781" y="1670441"/>
-            <a:ext cx="283031" cy="1399604"/>
+          <a:xfrm rot="12600000" flipH="1" flipV="1">
+            <a:off x="6867348" y="1367820"/>
+            <a:ext cx="202451" cy="1420497"/>
           </a:xfrm>
           <a:prstGeom prst="upArrow">
             <a:avLst/>
@@ -9756,92 +10058,14 @@
           <a:lstStyle/>
           <a:p>
             <a:pPr algn="ctr"/>
-            <a:endParaRPr lang="en-GB"/>
-          </a:p>
-        </p:txBody>
-      </p:sp>
-      <p:sp>
-        <p:nvSpPr>
-          <p:cNvPr id="12" name="TextBox 11">
-            <a:extLst>
-              <a:ext uri="{FF2B5EF4-FFF2-40B4-BE49-F238E27FC236}">
-                <a16:creationId xmlns:a16="http://schemas.microsoft.com/office/drawing/2014/main" id="{A6CCFD9A-142D-094E-9AC6-6641FEC74639}"/>
-              </a:ext>
-            </a:extLst>
-          </p:cNvPr>
-          <p:cNvSpPr txBox="1"/>
-          <p:nvPr/>
-        </p:nvSpPr>
-        <p:spPr>
-          <a:xfrm>
-            <a:off x="5357406" y="1029520"/>
-            <a:ext cx="2333011" cy="646331"/>
-          </a:xfrm>
-          <a:prstGeom prst="rect">
-            <a:avLst/>
-          </a:prstGeom>
-          <a:noFill/>
-        </p:spPr>
-        <p:txBody>
-          <a:bodyPr wrap="square" rtlCol="0">
-            <a:spAutoFit/>
-          </a:bodyPr>
-          <a:lstStyle/>
-          <a:p>
-            <a:pPr algn="ctr"/>
-            <a:r>
-              <a:rPr lang="en-GB" b="1" dirty="0"/>
-              <a:t>Support/Normal Force</a:t>
-            </a:r>
-            <a:br>
-              <a:rPr lang="en-GB" b="1" dirty="0"/>
-            </a:br>
-            <a:r>
-              <a:rPr lang="en-GB" b="1" dirty="0"/>
-              <a:t>8.5N</a:t>
-            </a:r>
-          </a:p>
-        </p:txBody>
-      </p:sp>
-      <p:sp>
-        <p:nvSpPr>
-          <p:cNvPr id="3" name="TextBox 2">
-            <a:extLst>
-              <a:ext uri="{FF2B5EF4-FFF2-40B4-BE49-F238E27FC236}">
-                <a16:creationId xmlns:a16="http://schemas.microsoft.com/office/drawing/2014/main" id="{8EEBBAEC-86CF-C745-9937-0FC3208564A6}"/>
-              </a:ext>
-            </a:extLst>
-          </p:cNvPr>
-          <p:cNvSpPr txBox="1"/>
-          <p:nvPr/>
-        </p:nvSpPr>
-        <p:spPr>
-          <a:xfrm>
-            <a:off x="6257120" y="3529678"/>
-            <a:ext cx="357790" cy="461665"/>
-          </a:xfrm>
-          <a:prstGeom prst="rect">
-            <a:avLst/>
-          </a:prstGeom>
-          <a:noFill/>
-        </p:spPr>
-        <p:txBody>
-          <a:bodyPr wrap="square" rtlCol="0">
-            <a:spAutoFit/>
-          </a:bodyPr>
-          <a:lstStyle/>
-          <a:p>
-            <a:r>
-              <a:rPr lang="en-GB" sz="2400" b="1" dirty="0"/>
-              <a:t>𝜃</a:t>
-            </a:r>
+            <a:endParaRPr lang="en-GB" dirty="0"/>
           </a:p>
         </p:txBody>
       </p:sp>
     </p:spTree>
     <p:extLst>
       <p:ext uri="{BB962C8B-B14F-4D97-AF65-F5344CB8AC3E}">
-        <p14:creationId xmlns:p14="http://schemas.microsoft.com/office/powerpoint/2010/main" val="3100545052"/>
+        <p14:creationId xmlns:p14="http://schemas.microsoft.com/office/powerpoint/2010/main" val="871834089"/>
       </p:ext>
     </p:extLst>
   </p:cSld>
@@ -9882,8 +10106,8 @@
         </p:nvSpPr>
         <p:spPr>
           <a:xfrm>
-            <a:off x="4047318" y="3874016"/>
-            <a:ext cx="4005943" cy="174172"/>
+            <a:off x="3992104" y="3901276"/>
+            <a:ext cx="4005943" cy="99309"/>
           </a:xfrm>
           <a:prstGeom prst="rect">
             <a:avLst/>
@@ -9927,9 +10151,9 @@
           <p:nvPr/>
         </p:nvSpPr>
         <p:spPr>
-          <a:xfrm rot="900000">
-            <a:off x="4093028" y="3341914"/>
-            <a:ext cx="4005943" cy="174172"/>
+          <a:xfrm rot="1800000">
+            <a:off x="4282051" y="2909861"/>
+            <a:ext cx="4005943" cy="81245"/>
           </a:xfrm>
           <a:prstGeom prst="rect">
             <a:avLst/>
@@ -9973,8 +10197,8 @@
           <p:nvPr/>
         </p:nvSpPr>
         <p:spPr>
-          <a:xfrm rot="900000">
-            <a:off x="5687784" y="2525485"/>
+          <a:xfrm rot="1800000">
+            <a:off x="6232413" y="2218605"/>
             <a:ext cx="816429" cy="816429"/>
           </a:xfrm>
           <a:prstGeom prst="rect">
@@ -10020,8 +10244,8 @@
         </p:nvSpPr>
         <p:spPr>
           <a:xfrm rot="10800000">
-            <a:off x="5954482" y="2991644"/>
-            <a:ext cx="283031" cy="1567543"/>
+            <a:off x="6528832" y="2664547"/>
+            <a:ext cx="184901" cy="1567543"/>
           </a:xfrm>
           <a:prstGeom prst="upArrow">
             <a:avLst/>
@@ -10097,10 +10321,53 @@
       </p:sp>
       <p:sp>
         <p:nvSpPr>
-          <p:cNvPr id="11" name="Up Arrow 10">
-            <a:extLst>
-              <a:ext uri="{FF2B5EF4-FFF2-40B4-BE49-F238E27FC236}">
-                <a16:creationId xmlns:a16="http://schemas.microsoft.com/office/drawing/2014/main" id="{794FD326-7BF3-B04E-AC8C-AA26E2518192}"/>
+          <p:cNvPr id="12" name="TextBox 11">
+            <a:extLst>
+              <a:ext uri="{FF2B5EF4-FFF2-40B4-BE49-F238E27FC236}">
+                <a16:creationId xmlns:a16="http://schemas.microsoft.com/office/drawing/2014/main" id="{A6CCFD9A-142D-094E-9AC6-6641FEC74639}"/>
+              </a:ext>
+            </a:extLst>
+          </p:cNvPr>
+          <p:cNvSpPr txBox="1"/>
+          <p:nvPr/>
+        </p:nvSpPr>
+        <p:spPr>
+          <a:xfrm>
+            <a:off x="5357406" y="1029520"/>
+            <a:ext cx="2333011" cy="646331"/>
+          </a:xfrm>
+          <a:prstGeom prst="rect">
+            <a:avLst/>
+          </a:prstGeom>
+          <a:noFill/>
+        </p:spPr>
+        <p:txBody>
+          <a:bodyPr wrap="square" rtlCol="0">
+            <a:spAutoFit/>
+          </a:bodyPr>
+          <a:lstStyle/>
+          <a:p>
+            <a:pPr algn="ctr"/>
+            <a:r>
+              <a:rPr lang="en-GB" b="1" dirty="0"/>
+              <a:t>Support/Normal Force</a:t>
+            </a:r>
+            <a:br>
+              <a:rPr lang="en-GB" b="1" dirty="0"/>
+            </a:br>
+            <a:r>
+              <a:rPr lang="en-GB" b="1" dirty="0"/>
+              <a:t>8.5N</a:t>
+            </a:r>
+          </a:p>
+        </p:txBody>
+      </p:sp>
+      <p:sp>
+        <p:nvSpPr>
+          <p:cNvPr id="14" name="Up Arrow 13">
+            <a:extLst>
+              <a:ext uri="{FF2B5EF4-FFF2-40B4-BE49-F238E27FC236}">
+                <a16:creationId xmlns:a16="http://schemas.microsoft.com/office/drawing/2014/main" id="{3453C1B3-E070-504F-85D6-3A597EDDA9B8}"/>
               </a:ext>
             </a:extLst>
           </p:cNvPr>
@@ -10108,9 +10375,9 @@
           <p:nvPr/>
         </p:nvSpPr>
         <p:spPr>
-          <a:xfrm rot="900000">
-            <a:off x="6130781" y="1670441"/>
-            <a:ext cx="283031" cy="1399604"/>
+          <a:xfrm rot="1800000" flipH="1" flipV="1">
+            <a:off x="6163548" y="2586100"/>
+            <a:ext cx="202451" cy="1420497"/>
           </a:xfrm>
           <a:prstGeom prst="upArrow">
             <a:avLst/>
@@ -10137,16 +10404,16 @@
           <a:lstStyle/>
           <a:p>
             <a:pPr algn="ctr"/>
-            <a:endParaRPr lang="en-GB"/>
-          </a:p>
-        </p:txBody>
-      </p:sp>
-      <p:sp>
-        <p:nvSpPr>
-          <p:cNvPr id="12" name="TextBox 11">
-            <a:extLst>
-              <a:ext uri="{FF2B5EF4-FFF2-40B4-BE49-F238E27FC236}">
-                <a16:creationId xmlns:a16="http://schemas.microsoft.com/office/drawing/2014/main" id="{A6CCFD9A-142D-094E-9AC6-6641FEC74639}"/>
+            <a:endParaRPr lang="en-GB" dirty="0"/>
+          </a:p>
+        </p:txBody>
+      </p:sp>
+      <p:sp>
+        <p:nvSpPr>
+          <p:cNvPr id="4" name="TextBox 3">
+            <a:extLst>
+              <a:ext uri="{FF2B5EF4-FFF2-40B4-BE49-F238E27FC236}">
+                <a16:creationId xmlns:a16="http://schemas.microsoft.com/office/drawing/2014/main" id="{9956D32B-6FB5-7A4A-9DCD-2CACD054905B}"/>
               </a:ext>
             </a:extLst>
           </p:cNvPr>
@@ -10155,8 +10422,8 @@
         </p:nvSpPr>
         <p:spPr>
           <a:xfrm>
-            <a:off x="5357406" y="1029520"/>
-            <a:ext cx="2333011" cy="646331"/>
+            <a:off x="3034708" y="2593317"/>
+            <a:ext cx="1499128" cy="923330"/>
           </a:xfrm>
           <a:prstGeom prst="rect">
             <a:avLst/>
@@ -10164,32 +10431,79 @@
           <a:noFill/>
         </p:spPr>
         <p:txBody>
-          <a:bodyPr wrap="square" rtlCol="0">
+          <a:bodyPr wrap="none" rtlCol="0">
             <a:spAutoFit/>
           </a:bodyPr>
           <a:lstStyle/>
           <a:p>
-            <a:pPr algn="ctr"/>
-            <a:r>
-              <a:rPr lang="en-GB" b="1" dirty="0"/>
-              <a:t>Support/Normal Force</a:t>
+            <a:r>
+              <a:rPr lang="en-GB" dirty="0"/>
+              <a:t>Weight force</a:t>
             </a:r>
             <a:br>
-              <a:rPr lang="en-GB" b="1" dirty="0"/>
+              <a:rPr lang="en-GB" dirty="0"/>
             </a:br>
             <a:r>
-              <a:rPr lang="en-GB" b="1" dirty="0"/>
-              <a:t>8.5N</a:t>
-            </a:r>
-          </a:p>
-        </p:txBody>
-      </p:sp>
-      <p:sp>
-        <p:nvSpPr>
-          <p:cNvPr id="14" name="Up Arrow 13">
-            <a:extLst>
-              <a:ext uri="{FF2B5EF4-FFF2-40B4-BE49-F238E27FC236}">
-                <a16:creationId xmlns:a16="http://schemas.microsoft.com/office/drawing/2014/main" id="{3453C1B3-E070-504F-85D6-3A597EDDA9B8}"/>
+              <a:rPr lang="en-GB" dirty="0"/>
+              <a:t>perpendicular</a:t>
+            </a:r>
+            <a:br>
+              <a:rPr lang="en-GB" dirty="0"/>
+            </a:br>
+            <a:r>
+              <a:rPr lang="en-GB" dirty="0"/>
+              <a:t>to the surface</a:t>
+            </a:r>
+          </a:p>
+        </p:txBody>
+      </p:sp>
+      <p:cxnSp>
+        <p:nvCxnSpPr>
+          <p:cNvPr id="13" name="Straight Arrow Connector 12">
+            <a:extLst>
+              <a:ext uri="{FF2B5EF4-FFF2-40B4-BE49-F238E27FC236}">
+                <a16:creationId xmlns:a16="http://schemas.microsoft.com/office/drawing/2014/main" id="{85018EB6-DB65-7446-A621-6CB642717197}"/>
+              </a:ext>
+            </a:extLst>
+          </p:cNvPr>
+          <p:cNvCxnSpPr>
+            <a:cxnSpLocks/>
+          </p:cNvCxnSpPr>
+          <p:nvPr/>
+        </p:nvCxnSpPr>
+        <p:spPr>
+          <a:xfrm>
+            <a:off x="4495897" y="3054982"/>
+            <a:ext cx="1499179" cy="253914"/>
+          </a:xfrm>
+          <a:prstGeom prst="straightConnector1">
+            <a:avLst/>
+          </a:prstGeom>
+          <a:ln>
+            <a:tailEnd type="triangle"/>
+          </a:ln>
+        </p:spPr>
+        <p:style>
+          <a:lnRef idx="1">
+            <a:schemeClr val="accent1"/>
+          </a:lnRef>
+          <a:fillRef idx="0">
+            <a:schemeClr val="accent1"/>
+          </a:fillRef>
+          <a:effectRef idx="0">
+            <a:schemeClr val="accent1"/>
+          </a:effectRef>
+          <a:fontRef idx="minor">
+            <a:schemeClr val="tx1"/>
+          </a:fontRef>
+        </p:style>
+      </p:cxnSp>
+      <p:sp>
+        <p:nvSpPr>
+          <p:cNvPr id="16" name="Up Arrow 15">
+            <a:extLst>
+              <a:ext uri="{FF2B5EF4-FFF2-40B4-BE49-F238E27FC236}">
+                <a16:creationId xmlns:a16="http://schemas.microsoft.com/office/drawing/2014/main" id="{4D0DB17B-517B-854C-8834-DDB546847825}"/>
               </a:ext>
             </a:extLst>
           </p:cNvPr>
@@ -10197,9 +10511,9 @@
           <p:nvPr/>
         </p:nvSpPr>
         <p:spPr>
-          <a:xfrm rot="900000" flipH="1" flipV="1">
-            <a:off x="5756473" y="3015880"/>
-            <a:ext cx="283031" cy="1495413"/>
+          <a:xfrm rot="12600000" flipH="1" flipV="1">
+            <a:off x="6867348" y="1367820"/>
+            <a:ext cx="202451" cy="1420497"/>
           </a:xfrm>
           <a:prstGeom prst="upArrow">
             <a:avLst/>
@@ -10232,133 +10546,147 @@
       </p:sp>
       <p:sp>
         <p:nvSpPr>
-          <p:cNvPr id="3" name="TextBox 2">
-            <a:extLst>
-              <a:ext uri="{FF2B5EF4-FFF2-40B4-BE49-F238E27FC236}">
-                <a16:creationId xmlns:a16="http://schemas.microsoft.com/office/drawing/2014/main" id="{8EEBBAEC-86CF-C745-9937-0FC3208564A6}"/>
-              </a:ext>
-            </a:extLst>
-          </p:cNvPr>
-          <p:cNvSpPr txBox="1"/>
-          <p:nvPr/>
-        </p:nvSpPr>
-        <p:spPr>
-          <a:xfrm>
-            <a:off x="6257120" y="3529678"/>
-            <a:ext cx="357790" cy="461665"/>
+          <p:cNvPr id="7" name="Rectangle 6">
+            <a:extLst>
+              <a:ext uri="{FF2B5EF4-FFF2-40B4-BE49-F238E27FC236}">
+                <a16:creationId xmlns:a16="http://schemas.microsoft.com/office/drawing/2014/main" id="{ED64E402-EF45-5349-B014-2BE0144A0334}"/>
+              </a:ext>
+            </a:extLst>
+          </p:cNvPr>
+          <p:cNvSpPr/>
+          <p:nvPr/>
+        </p:nvSpPr>
+        <p:spPr>
+          <a:xfrm rot="1800000">
+            <a:off x="6817029" y="1968643"/>
+            <a:ext cx="490584" cy="45719"/>
           </a:xfrm>
           <a:prstGeom prst="rect">
             <a:avLst/>
           </a:prstGeom>
-          <a:noFill/>
-        </p:spPr>
-        <p:txBody>
-          <a:bodyPr wrap="square" rtlCol="0">
-            <a:spAutoFit/>
-          </a:bodyPr>
-          <a:lstStyle/>
-          <a:p>
-            <a:r>
-              <a:rPr lang="en-GB" sz="2400" b="1" dirty="0"/>
-              <a:t>𝜃</a:t>
-            </a:r>
-          </a:p>
-        </p:txBody>
-      </p:sp>
-      <p:sp>
-        <p:nvSpPr>
-          <p:cNvPr id="4" name="TextBox 3">
-            <a:extLst>
-              <a:ext uri="{FF2B5EF4-FFF2-40B4-BE49-F238E27FC236}">
-                <a16:creationId xmlns:a16="http://schemas.microsoft.com/office/drawing/2014/main" id="{9956D32B-6FB5-7A4A-9DCD-2CACD054905B}"/>
-              </a:ext>
-            </a:extLst>
-          </p:cNvPr>
-          <p:cNvSpPr txBox="1"/>
-          <p:nvPr/>
-        </p:nvSpPr>
-        <p:spPr>
-          <a:xfrm>
-            <a:off x="2680766" y="2991644"/>
-            <a:ext cx="1499128" cy="923330"/>
-          </a:xfrm>
-          <a:prstGeom prst="rect">
-            <a:avLst/>
-          </a:prstGeom>
-          <a:noFill/>
-        </p:spPr>
-        <p:txBody>
-          <a:bodyPr wrap="none" rtlCol="0">
-            <a:spAutoFit/>
-          </a:bodyPr>
-          <a:lstStyle/>
-          <a:p>
-            <a:r>
-              <a:rPr lang="en-GB" dirty="0"/>
-              <a:t>Weight force</a:t>
-            </a:r>
-            <a:br>
-              <a:rPr lang="en-GB" dirty="0"/>
-            </a:br>
-            <a:r>
-              <a:rPr lang="en-GB" dirty="0"/>
-              <a:t>perpendicular</a:t>
-            </a:r>
-            <a:br>
-              <a:rPr lang="en-GB" dirty="0"/>
-            </a:br>
-            <a:r>
-              <a:rPr lang="en-GB" dirty="0"/>
-              <a:t>to the surface</a:t>
-            </a:r>
-          </a:p>
-        </p:txBody>
-      </p:sp>
-      <p:cxnSp>
-        <p:nvCxnSpPr>
-          <p:cNvPr id="13" name="Straight Arrow Connector 12">
-            <a:extLst>
-              <a:ext uri="{FF2B5EF4-FFF2-40B4-BE49-F238E27FC236}">
-                <a16:creationId xmlns:a16="http://schemas.microsoft.com/office/drawing/2014/main" id="{85018EB6-DB65-7446-A621-6CB642717197}"/>
-              </a:ext>
-            </a:extLst>
-          </p:cNvPr>
-          <p:cNvCxnSpPr>
-            <a:stCxn id="4" idx="3"/>
-          </p:cNvCxnSpPr>
-          <p:nvPr/>
-        </p:nvCxnSpPr>
-        <p:spPr>
-          <a:xfrm>
-            <a:off x="4179894" y="3453309"/>
-            <a:ext cx="1499179" cy="253914"/>
-          </a:xfrm>
-          <a:prstGeom prst="straightConnector1">
-            <a:avLst/>
-          </a:prstGeom>
+          <a:solidFill>
+            <a:schemeClr val="accent4"/>
+          </a:solidFill>
           <a:ln>
-            <a:tailEnd type="triangle"/>
+            <a:noFill/>
           </a:ln>
         </p:spPr>
         <p:style>
-          <a:lnRef idx="1">
-            <a:schemeClr val="accent1"/>
+          <a:lnRef idx="2">
+            <a:schemeClr val="accent1">
+              <a:shade val="50000"/>
+            </a:schemeClr>
           </a:lnRef>
-          <a:fillRef idx="0">
+          <a:fillRef idx="1">
             <a:schemeClr val="accent1"/>
           </a:fillRef>
           <a:effectRef idx="0">
             <a:schemeClr val="accent1"/>
           </a:effectRef>
           <a:fontRef idx="minor">
-            <a:schemeClr val="tx1"/>
+            <a:schemeClr val="lt1"/>
           </a:fontRef>
         </p:style>
-      </p:cxnSp>
+        <p:txBody>
+          <a:bodyPr rtlCol="0" anchor="ctr"/>
+          <a:lstStyle/>
+          <a:p>
+            <a:pPr algn="ctr"/>
+            <a:endParaRPr lang="en-GB"/>
+          </a:p>
+        </p:txBody>
+      </p:sp>
+      <p:sp>
+        <p:nvSpPr>
+          <p:cNvPr id="17" name="Rectangle 16">
+            <a:extLst>
+              <a:ext uri="{FF2B5EF4-FFF2-40B4-BE49-F238E27FC236}">
+                <a16:creationId xmlns:a16="http://schemas.microsoft.com/office/drawing/2014/main" id="{9669F944-A8E5-9247-A350-3338FF72D899}"/>
+              </a:ext>
+            </a:extLst>
+          </p:cNvPr>
+          <p:cNvSpPr/>
+          <p:nvPr/>
+        </p:nvSpPr>
+        <p:spPr>
+          <a:xfrm rot="1800000">
+            <a:off x="5965179" y="3292083"/>
+            <a:ext cx="490584" cy="45719"/>
+          </a:xfrm>
+          <a:prstGeom prst="rect">
+            <a:avLst/>
+          </a:prstGeom>
+          <a:solidFill>
+            <a:schemeClr val="accent4"/>
+          </a:solidFill>
+          <a:ln>
+            <a:noFill/>
+          </a:ln>
+        </p:spPr>
+        <p:style>
+          <a:lnRef idx="2">
+            <a:schemeClr val="accent1">
+              <a:shade val="50000"/>
+            </a:schemeClr>
+          </a:lnRef>
+          <a:fillRef idx="1">
+            <a:schemeClr val="accent1"/>
+          </a:fillRef>
+          <a:effectRef idx="0">
+            <a:schemeClr val="accent1"/>
+          </a:effectRef>
+          <a:fontRef idx="minor">
+            <a:schemeClr val="lt1"/>
+          </a:fontRef>
+        </p:style>
+        <p:txBody>
+          <a:bodyPr rtlCol="0" anchor="ctr"/>
+          <a:lstStyle/>
+          <a:p>
+            <a:pPr algn="ctr"/>
+            <a:endParaRPr lang="en-GB"/>
+          </a:p>
+        </p:txBody>
+      </p:sp>
+      <p:sp>
+        <p:nvSpPr>
+          <p:cNvPr id="18" name="TextBox 17">
+            <a:extLst>
+              <a:ext uri="{FF2B5EF4-FFF2-40B4-BE49-F238E27FC236}">
+                <a16:creationId xmlns:a16="http://schemas.microsoft.com/office/drawing/2014/main" id="{153C037E-7595-5748-A93C-40DDE85227D3}"/>
+              </a:ext>
+            </a:extLst>
+          </p:cNvPr>
+          <p:cNvSpPr txBox="1"/>
+          <p:nvPr/>
+        </p:nvSpPr>
+        <p:spPr>
+          <a:xfrm>
+            <a:off x="6737927" y="3489265"/>
+            <a:ext cx="679399" cy="461665"/>
+          </a:xfrm>
+          <a:prstGeom prst="rect">
+            <a:avLst/>
+          </a:prstGeom>
+          <a:noFill/>
+        </p:spPr>
+        <p:txBody>
+          <a:bodyPr wrap="square" rtlCol="0">
+            <a:spAutoFit/>
+          </a:bodyPr>
+          <a:lstStyle/>
+          <a:p>
+            <a:r>
+              <a:rPr lang="en-GB" sz="2400" b="1" dirty="0"/>
+              <a:t>30°</a:t>
+            </a:r>
+          </a:p>
+        </p:txBody>
+      </p:sp>
     </p:spTree>
     <p:extLst>
       <p:ext uri="{BB962C8B-B14F-4D97-AF65-F5344CB8AC3E}">
-        <p14:creationId xmlns:p14="http://schemas.microsoft.com/office/powerpoint/2010/main" val="871834089"/>
+        <p14:creationId xmlns:p14="http://schemas.microsoft.com/office/powerpoint/2010/main" val="1401118108"/>
       </p:ext>
     </p:extLst>
   </p:cSld>
@@ -10387,6 +10715,144 @@
       </p:grpSpPr>
       <p:sp>
         <p:nvSpPr>
+          <p:cNvPr id="15" name="Rectangle 14">
+            <a:extLst>
+              <a:ext uri="{FF2B5EF4-FFF2-40B4-BE49-F238E27FC236}">
+                <a16:creationId xmlns:a16="http://schemas.microsoft.com/office/drawing/2014/main" id="{80FA7AC8-5C29-B24F-A373-461DC8510842}"/>
+              </a:ext>
+            </a:extLst>
+          </p:cNvPr>
+          <p:cNvSpPr/>
+          <p:nvPr/>
+        </p:nvSpPr>
+        <p:spPr>
+          <a:xfrm>
+            <a:off x="3992104" y="3901276"/>
+            <a:ext cx="4005943" cy="99309"/>
+          </a:xfrm>
+          <a:prstGeom prst="rect">
+            <a:avLst/>
+          </a:prstGeom>
+        </p:spPr>
+        <p:style>
+          <a:lnRef idx="2">
+            <a:schemeClr val="dk1">
+              <a:shade val="50000"/>
+            </a:schemeClr>
+          </a:lnRef>
+          <a:fillRef idx="1">
+            <a:schemeClr val="dk1"/>
+          </a:fillRef>
+          <a:effectRef idx="0">
+            <a:schemeClr val="dk1"/>
+          </a:effectRef>
+          <a:fontRef idx="minor">
+            <a:schemeClr val="lt1"/>
+          </a:fontRef>
+        </p:style>
+        <p:txBody>
+          <a:bodyPr rtlCol="0" anchor="ctr"/>
+          <a:lstStyle/>
+          <a:p>
+            <a:pPr algn="ctr"/>
+            <a:endParaRPr lang="en-GB"/>
+          </a:p>
+        </p:txBody>
+      </p:sp>
+      <p:sp>
+        <p:nvSpPr>
+          <p:cNvPr id="6" name="Rectangle 5">
+            <a:extLst>
+              <a:ext uri="{FF2B5EF4-FFF2-40B4-BE49-F238E27FC236}">
+                <a16:creationId xmlns:a16="http://schemas.microsoft.com/office/drawing/2014/main" id="{EC2AC7E1-1B24-754F-ACC2-EC8C3C89293E}"/>
+              </a:ext>
+            </a:extLst>
+          </p:cNvPr>
+          <p:cNvSpPr/>
+          <p:nvPr/>
+        </p:nvSpPr>
+        <p:spPr>
+          <a:xfrm rot="1800000">
+            <a:off x="4282051" y="2909861"/>
+            <a:ext cx="4005943" cy="81245"/>
+          </a:xfrm>
+          <a:prstGeom prst="rect">
+            <a:avLst/>
+          </a:prstGeom>
+        </p:spPr>
+        <p:style>
+          <a:lnRef idx="2">
+            <a:schemeClr val="dk1">
+              <a:shade val="50000"/>
+            </a:schemeClr>
+          </a:lnRef>
+          <a:fillRef idx="1">
+            <a:schemeClr val="dk1"/>
+          </a:fillRef>
+          <a:effectRef idx="0">
+            <a:schemeClr val="dk1"/>
+          </a:effectRef>
+          <a:fontRef idx="minor">
+            <a:schemeClr val="lt1"/>
+          </a:fontRef>
+        </p:style>
+        <p:txBody>
+          <a:bodyPr rtlCol="0" anchor="ctr"/>
+          <a:lstStyle/>
+          <a:p>
+            <a:pPr algn="ctr"/>
+            <a:endParaRPr lang="en-GB"/>
+          </a:p>
+        </p:txBody>
+      </p:sp>
+      <p:sp>
+        <p:nvSpPr>
+          <p:cNvPr id="8" name="Rectangle 7">
+            <a:extLst>
+              <a:ext uri="{FF2B5EF4-FFF2-40B4-BE49-F238E27FC236}">
+                <a16:creationId xmlns:a16="http://schemas.microsoft.com/office/drawing/2014/main" id="{8A643539-9234-AD40-BAFC-04647DDAA901}"/>
+              </a:ext>
+            </a:extLst>
+          </p:cNvPr>
+          <p:cNvSpPr/>
+          <p:nvPr/>
+        </p:nvSpPr>
+        <p:spPr>
+          <a:xfrm rot="1800000">
+            <a:off x="6232413" y="2218605"/>
+            <a:ext cx="816429" cy="816429"/>
+          </a:xfrm>
+          <a:prstGeom prst="rect">
+            <a:avLst/>
+          </a:prstGeom>
+        </p:spPr>
+        <p:style>
+          <a:lnRef idx="2">
+            <a:schemeClr val="accent1">
+              <a:shade val="50000"/>
+            </a:schemeClr>
+          </a:lnRef>
+          <a:fillRef idx="1">
+            <a:schemeClr val="accent1"/>
+          </a:fillRef>
+          <a:effectRef idx="0">
+            <a:schemeClr val="accent1"/>
+          </a:effectRef>
+          <a:fontRef idx="minor">
+            <a:schemeClr val="lt1"/>
+          </a:fontRef>
+        </p:style>
+        <p:txBody>
+          <a:bodyPr rtlCol="0" anchor="ctr"/>
+          <a:lstStyle/>
+          <a:p>
+            <a:pPr algn="ctr"/>
+            <a:endParaRPr lang="en-GB" b="1" dirty="0"/>
+          </a:p>
+        </p:txBody>
+      </p:sp>
+      <p:sp>
+        <p:nvSpPr>
           <p:cNvPr id="9" name="Up Arrow 8">
             <a:extLst>
               <a:ext uri="{FF2B5EF4-FFF2-40B4-BE49-F238E27FC236}">
@@ -10399,8 +10865,8 @@
         </p:nvSpPr>
         <p:spPr>
           <a:xfrm rot="10800000">
-            <a:off x="1987963" y="3399417"/>
-            <a:ext cx="283031" cy="1567543"/>
+            <a:off x="6528832" y="2664547"/>
+            <a:ext cx="184901" cy="1567543"/>
           </a:xfrm>
           <a:prstGeom prst="upArrow">
             <a:avLst/>
@@ -10445,7 +10911,7 @@
         </p:nvSpPr>
         <p:spPr>
           <a:xfrm>
-            <a:off x="1969939" y="4349584"/>
+            <a:off x="6215828" y="4322911"/>
             <a:ext cx="1437830" cy="646331"/>
           </a:xfrm>
           <a:prstGeom prst="rect">
@@ -10462,7 +10928,7 @@
             <a:pPr algn="ctr"/>
             <a:r>
               <a:rPr lang="en-GB" b="1" dirty="0"/>
-              <a:t>Weight</a:t>
+              <a:t>Weight Force</a:t>
             </a:r>
             <a:br>
               <a:rPr lang="en-GB" b="1" dirty="0"/>
@@ -10476,10 +10942,143 @@
       </p:sp>
       <p:sp>
         <p:nvSpPr>
-          <p:cNvPr id="11" name="Up Arrow 10">
-            <a:extLst>
-              <a:ext uri="{FF2B5EF4-FFF2-40B4-BE49-F238E27FC236}">
-                <a16:creationId xmlns:a16="http://schemas.microsoft.com/office/drawing/2014/main" id="{794FD326-7BF3-B04E-AC8C-AA26E2518192}"/>
+          <p:cNvPr id="12" name="TextBox 11">
+            <a:extLst>
+              <a:ext uri="{FF2B5EF4-FFF2-40B4-BE49-F238E27FC236}">
+                <a16:creationId xmlns:a16="http://schemas.microsoft.com/office/drawing/2014/main" id="{A6CCFD9A-142D-094E-9AC6-6641FEC74639}"/>
+              </a:ext>
+            </a:extLst>
+          </p:cNvPr>
+          <p:cNvSpPr txBox="1"/>
+          <p:nvPr/>
+        </p:nvSpPr>
+        <p:spPr>
+          <a:xfrm>
+            <a:off x="5357406" y="1029520"/>
+            <a:ext cx="2333011" cy="646331"/>
+          </a:xfrm>
+          <a:prstGeom prst="rect">
+            <a:avLst/>
+          </a:prstGeom>
+          <a:noFill/>
+        </p:spPr>
+        <p:txBody>
+          <a:bodyPr wrap="square" rtlCol="0">
+            <a:spAutoFit/>
+          </a:bodyPr>
+          <a:lstStyle/>
+          <a:p>
+            <a:pPr algn="ctr"/>
+            <a:r>
+              <a:rPr lang="en-GB" b="1" dirty="0"/>
+              <a:t>Support/Normal Force</a:t>
+            </a:r>
+            <a:br>
+              <a:rPr lang="en-GB" b="1" dirty="0"/>
+            </a:br>
+            <a:r>
+              <a:rPr lang="en-GB" b="1" dirty="0"/>
+              <a:t>8.5N</a:t>
+            </a:r>
+          </a:p>
+        </p:txBody>
+      </p:sp>
+      <p:sp>
+        <p:nvSpPr>
+          <p:cNvPr id="4" name="TextBox 3">
+            <a:extLst>
+              <a:ext uri="{FF2B5EF4-FFF2-40B4-BE49-F238E27FC236}">
+                <a16:creationId xmlns:a16="http://schemas.microsoft.com/office/drawing/2014/main" id="{9956D32B-6FB5-7A4A-9DCD-2CACD054905B}"/>
+              </a:ext>
+            </a:extLst>
+          </p:cNvPr>
+          <p:cNvSpPr txBox="1"/>
+          <p:nvPr/>
+        </p:nvSpPr>
+        <p:spPr>
+          <a:xfrm>
+            <a:off x="3034708" y="2593317"/>
+            <a:ext cx="1499128" cy="923330"/>
+          </a:xfrm>
+          <a:prstGeom prst="rect">
+            <a:avLst/>
+          </a:prstGeom>
+          <a:noFill/>
+        </p:spPr>
+        <p:txBody>
+          <a:bodyPr wrap="none" rtlCol="0">
+            <a:spAutoFit/>
+          </a:bodyPr>
+          <a:lstStyle/>
+          <a:p>
+            <a:r>
+              <a:rPr lang="en-GB" dirty="0"/>
+              <a:t>Weight force</a:t>
+            </a:r>
+            <a:br>
+              <a:rPr lang="en-GB" dirty="0"/>
+            </a:br>
+            <a:r>
+              <a:rPr lang="en-GB" dirty="0"/>
+              <a:t>perpendicular</a:t>
+            </a:r>
+            <a:br>
+              <a:rPr lang="en-GB" dirty="0"/>
+            </a:br>
+            <a:r>
+              <a:rPr lang="en-GB" dirty="0"/>
+              <a:t>to the surface</a:t>
+            </a:r>
+          </a:p>
+        </p:txBody>
+      </p:sp>
+      <p:cxnSp>
+        <p:nvCxnSpPr>
+          <p:cNvPr id="13" name="Straight Arrow Connector 12">
+            <a:extLst>
+              <a:ext uri="{FF2B5EF4-FFF2-40B4-BE49-F238E27FC236}">
+                <a16:creationId xmlns:a16="http://schemas.microsoft.com/office/drawing/2014/main" id="{85018EB6-DB65-7446-A621-6CB642717197}"/>
+              </a:ext>
+            </a:extLst>
+          </p:cNvPr>
+          <p:cNvCxnSpPr>
+            <a:cxnSpLocks/>
+          </p:cNvCxnSpPr>
+          <p:nvPr/>
+        </p:nvCxnSpPr>
+        <p:spPr>
+          <a:xfrm>
+            <a:off x="4495897" y="3054982"/>
+            <a:ext cx="1499179" cy="253914"/>
+          </a:xfrm>
+          <a:prstGeom prst="straightConnector1">
+            <a:avLst/>
+          </a:prstGeom>
+          <a:ln>
+            <a:tailEnd type="triangle"/>
+          </a:ln>
+        </p:spPr>
+        <p:style>
+          <a:lnRef idx="1">
+            <a:schemeClr val="accent1"/>
+          </a:lnRef>
+          <a:fillRef idx="0">
+            <a:schemeClr val="accent1"/>
+          </a:fillRef>
+          <a:effectRef idx="0">
+            <a:schemeClr val="accent1"/>
+          </a:effectRef>
+          <a:fontRef idx="minor">
+            <a:schemeClr val="tx1"/>
+          </a:fontRef>
+        </p:style>
+      </p:cxnSp>
+      <p:sp>
+        <p:nvSpPr>
+          <p:cNvPr id="16" name="Up Arrow 15">
+            <a:extLst>
+              <a:ext uri="{FF2B5EF4-FFF2-40B4-BE49-F238E27FC236}">
+                <a16:creationId xmlns:a16="http://schemas.microsoft.com/office/drawing/2014/main" id="{4D0DB17B-517B-854C-8834-DDB546847825}"/>
               </a:ext>
             </a:extLst>
           </p:cNvPr>
@@ -10487,9 +11086,9 @@
           <p:nvPr/>
         </p:nvSpPr>
         <p:spPr>
-          <a:xfrm rot="900000">
-            <a:off x="2158510" y="2121914"/>
-            <a:ext cx="231088" cy="1348308"/>
+          <a:xfrm rot="12600000" flipH="1" flipV="1">
+            <a:off x="6867348" y="1367820"/>
+            <a:ext cx="202451" cy="1420497"/>
           </a:xfrm>
           <a:prstGeom prst="upArrow">
             <a:avLst/>
@@ -10516,59 +11115,16 @@
           <a:lstStyle/>
           <a:p>
             <a:pPr algn="ctr"/>
-            <a:endParaRPr lang="en-GB"/>
-          </a:p>
-        </p:txBody>
-      </p:sp>
-      <p:sp>
-        <p:nvSpPr>
-          <p:cNvPr id="12" name="TextBox 11">
-            <a:extLst>
-              <a:ext uri="{FF2B5EF4-FFF2-40B4-BE49-F238E27FC236}">
-                <a16:creationId xmlns:a16="http://schemas.microsoft.com/office/drawing/2014/main" id="{A6CCFD9A-142D-094E-9AC6-6641FEC74639}"/>
-              </a:ext>
-            </a:extLst>
-          </p:cNvPr>
-          <p:cNvSpPr txBox="1"/>
-          <p:nvPr/>
-        </p:nvSpPr>
-        <p:spPr>
-          <a:xfrm>
-            <a:off x="1738174" y="1791825"/>
-            <a:ext cx="2333011" cy="646331"/>
-          </a:xfrm>
-          <a:prstGeom prst="rect">
-            <a:avLst/>
-          </a:prstGeom>
-          <a:noFill/>
-        </p:spPr>
-        <p:txBody>
-          <a:bodyPr wrap="square" rtlCol="0">
-            <a:spAutoFit/>
-          </a:bodyPr>
-          <a:lstStyle/>
-          <a:p>
-            <a:pPr algn="ctr"/>
-            <a:r>
-              <a:rPr lang="en-GB" b="1" dirty="0"/>
-              <a:t>Support/Normal</a:t>
-            </a:r>
-            <a:br>
-              <a:rPr lang="en-GB" b="1" dirty="0"/>
-            </a:br>
-            <a:r>
-              <a:rPr lang="en-GB" b="1" dirty="0"/>
-              <a:t>8.5N</a:t>
-            </a:r>
-          </a:p>
-        </p:txBody>
-      </p:sp>
-      <p:sp>
-        <p:nvSpPr>
-          <p:cNvPr id="16" name="Up Arrow 15">
-            <a:extLst>
-              <a:ext uri="{FF2B5EF4-FFF2-40B4-BE49-F238E27FC236}">
-                <a16:creationId xmlns:a16="http://schemas.microsoft.com/office/drawing/2014/main" id="{BEF63A54-DEC5-1B49-8F59-F678DF59F806}"/>
+            <a:endParaRPr lang="en-GB" dirty="0"/>
+          </a:p>
+        </p:txBody>
+      </p:sp>
+      <p:sp>
+        <p:nvSpPr>
+          <p:cNvPr id="19" name="Up Arrow 18">
+            <a:extLst>
+              <a:ext uri="{FF2B5EF4-FFF2-40B4-BE49-F238E27FC236}">
+                <a16:creationId xmlns:a16="http://schemas.microsoft.com/office/drawing/2014/main" id="{262C1208-BFA1-4E44-AA2D-ECD6DC5C06FA}"/>
               </a:ext>
             </a:extLst>
           </p:cNvPr>
@@ -10576,307 +11132,23 @@
           <p:nvPr/>
         </p:nvSpPr>
         <p:spPr>
-          <a:xfrm rot="17100000">
-            <a:off x="1835235" y="3130197"/>
-            <a:ext cx="269408" cy="407690"/>
+          <a:xfrm rot="7200000" flipH="1" flipV="1">
+            <a:off x="6193953" y="2107462"/>
+            <a:ext cx="220876" cy="788576"/>
           </a:xfrm>
           <a:prstGeom prst="upArrow">
             <a:avLst/>
           </a:prstGeom>
-        </p:spPr>
-        <p:style>
-          <a:lnRef idx="2">
-            <a:schemeClr val="accent6">
-              <a:shade val="50000"/>
-            </a:schemeClr>
-          </a:lnRef>
-          <a:fillRef idx="1">
+          <a:solidFill>
             <a:schemeClr val="accent6"/>
-          </a:fillRef>
-          <a:effectRef idx="0">
-            <a:schemeClr val="accent6"/>
-          </a:effectRef>
-          <a:fontRef idx="minor">
-            <a:schemeClr val="lt1"/>
-          </a:fontRef>
-        </p:style>
-        <p:txBody>
-          <a:bodyPr rtlCol="0" anchor="ctr"/>
-          <a:lstStyle/>
-          <a:p>
-            <a:pPr algn="ctr"/>
-            <a:endParaRPr lang="en-GB"/>
-          </a:p>
-        </p:txBody>
-      </p:sp>
-      <p:sp>
-        <p:nvSpPr>
-          <p:cNvPr id="4" name="TextBox 3">
-            <a:extLst>
-              <a:ext uri="{FF2B5EF4-FFF2-40B4-BE49-F238E27FC236}">
-                <a16:creationId xmlns:a16="http://schemas.microsoft.com/office/drawing/2014/main" id="{0F1B847D-24B2-6143-9EF8-418FC41EE72D}"/>
-              </a:ext>
-            </a:extLst>
-          </p:cNvPr>
-          <p:cNvSpPr txBox="1"/>
-          <p:nvPr/>
-        </p:nvSpPr>
-        <p:spPr>
-          <a:xfrm>
-            <a:off x="830553" y="3070949"/>
-            <a:ext cx="907621" cy="369332"/>
-          </a:xfrm>
-          <a:prstGeom prst="rect">
-            <a:avLst/>
-          </a:prstGeom>
-          <a:noFill/>
-        </p:spPr>
-        <p:txBody>
-          <a:bodyPr wrap="none" rtlCol="0">
-            <a:spAutoFit/>
-          </a:bodyPr>
-          <a:lstStyle/>
-          <a:p>
-            <a:r>
-              <a:rPr lang="en-GB" b="1" dirty="0"/>
-              <a:t>Friction</a:t>
-            </a:r>
-          </a:p>
-        </p:txBody>
-      </p:sp>
-      <p:sp>
-        <p:nvSpPr>
-          <p:cNvPr id="19" name="Up Arrow 18">
-            <a:extLst>
-              <a:ext uri="{FF2B5EF4-FFF2-40B4-BE49-F238E27FC236}">
-                <a16:creationId xmlns:a16="http://schemas.microsoft.com/office/drawing/2014/main" id="{BDCFC87B-234F-AF43-93CE-6F388A6F46B3}"/>
-              </a:ext>
-            </a:extLst>
-          </p:cNvPr>
-          <p:cNvSpPr/>
-          <p:nvPr/>
-        </p:nvSpPr>
-        <p:spPr>
-          <a:xfrm rot="10800000">
-            <a:off x="7696799" y="2695567"/>
-            <a:ext cx="283031" cy="1567543"/>
-          </a:xfrm>
-          <a:prstGeom prst="upArrow">
-            <a:avLst/>
-          </a:prstGeom>
-        </p:spPr>
-        <p:style>
-          <a:lnRef idx="2">
-            <a:schemeClr val="accent2">
-              <a:shade val="50000"/>
-            </a:schemeClr>
-          </a:lnRef>
-          <a:fillRef idx="1">
-            <a:schemeClr val="accent2"/>
-          </a:fillRef>
-          <a:effectRef idx="0">
-            <a:schemeClr val="accent2"/>
-          </a:effectRef>
-          <a:fontRef idx="minor">
-            <a:schemeClr val="lt1"/>
-          </a:fontRef>
-        </p:style>
-        <p:txBody>
-          <a:bodyPr rtlCol="0" anchor="ctr"/>
-          <a:lstStyle/>
-          <a:p>
-            <a:pPr algn="ctr"/>
-            <a:endParaRPr lang="en-GB"/>
-          </a:p>
-        </p:txBody>
-      </p:sp>
-      <p:sp>
-        <p:nvSpPr>
-          <p:cNvPr id="20" name="TextBox 19">
-            <a:extLst>
-              <a:ext uri="{FF2B5EF4-FFF2-40B4-BE49-F238E27FC236}">
-                <a16:creationId xmlns:a16="http://schemas.microsoft.com/office/drawing/2014/main" id="{4CCC1CD0-7F82-0A47-BD14-DF21122A5755}"/>
-              </a:ext>
-            </a:extLst>
-          </p:cNvPr>
-          <p:cNvSpPr txBox="1"/>
-          <p:nvPr/>
-        </p:nvSpPr>
-        <p:spPr>
-          <a:xfrm>
-            <a:off x="6542000" y="3027801"/>
-            <a:ext cx="1437830" cy="646331"/>
-          </a:xfrm>
-          <a:prstGeom prst="rect">
-            <a:avLst/>
-          </a:prstGeom>
-          <a:noFill/>
-        </p:spPr>
-        <p:txBody>
-          <a:bodyPr wrap="square" rtlCol="0">
-            <a:spAutoFit/>
-          </a:bodyPr>
-          <a:lstStyle/>
-          <a:p>
-            <a:pPr algn="ctr"/>
-            <a:r>
-              <a:rPr lang="en-GB" b="1" dirty="0"/>
-              <a:t>Weight</a:t>
-            </a:r>
-            <a:br>
-              <a:rPr lang="en-GB" b="1" dirty="0"/>
-            </a:br>
-            <a:r>
-              <a:rPr lang="en-GB" b="1" dirty="0"/>
-              <a:t>9.8N</a:t>
-            </a:r>
-          </a:p>
-        </p:txBody>
-      </p:sp>
-      <p:sp>
-        <p:nvSpPr>
-          <p:cNvPr id="22" name="TextBox 21">
-            <a:extLst>
-              <a:ext uri="{FF2B5EF4-FFF2-40B4-BE49-F238E27FC236}">
-                <a16:creationId xmlns:a16="http://schemas.microsoft.com/office/drawing/2014/main" id="{33AC81C0-1DCC-0144-891F-9501EDDE9A18}"/>
-              </a:ext>
-            </a:extLst>
-          </p:cNvPr>
-          <p:cNvSpPr txBox="1"/>
-          <p:nvPr/>
-        </p:nvSpPr>
-        <p:spPr>
-          <a:xfrm>
-            <a:off x="7823479" y="3351526"/>
-            <a:ext cx="2333011" cy="646331"/>
-          </a:xfrm>
-          <a:prstGeom prst="rect">
-            <a:avLst/>
-          </a:prstGeom>
-          <a:noFill/>
-        </p:spPr>
-        <p:txBody>
-          <a:bodyPr wrap="square" rtlCol="0">
-            <a:spAutoFit/>
-          </a:bodyPr>
-          <a:lstStyle/>
-          <a:p>
-            <a:pPr algn="ctr"/>
-            <a:r>
-              <a:rPr lang="en-GB" b="1" dirty="0"/>
-              <a:t>Support/Normal</a:t>
-            </a:r>
-            <a:br>
-              <a:rPr lang="en-GB" b="1" dirty="0"/>
-            </a:br>
-            <a:r>
-              <a:rPr lang="en-GB" b="1" dirty="0"/>
-              <a:t>8.5N</a:t>
-            </a:r>
-          </a:p>
-        </p:txBody>
-      </p:sp>
-      <p:sp>
-        <p:nvSpPr>
-          <p:cNvPr id="23" name="Up Arrow 22">
-            <a:extLst>
-              <a:ext uri="{FF2B5EF4-FFF2-40B4-BE49-F238E27FC236}">
-                <a16:creationId xmlns:a16="http://schemas.microsoft.com/office/drawing/2014/main" id="{3BAE4365-E807-E747-80BD-07F5912C04C9}"/>
-              </a:ext>
-            </a:extLst>
-          </p:cNvPr>
-          <p:cNvSpPr/>
-          <p:nvPr/>
-        </p:nvSpPr>
-        <p:spPr>
-          <a:xfrm rot="17100000">
-            <a:off x="7920539" y="2622349"/>
-            <a:ext cx="269408" cy="407690"/>
-          </a:xfrm>
-          <a:prstGeom prst="upArrow">
-            <a:avLst/>
-          </a:prstGeom>
-        </p:spPr>
-        <p:style>
-          <a:lnRef idx="2">
-            <a:schemeClr val="accent6">
-              <a:shade val="50000"/>
-            </a:schemeClr>
-          </a:lnRef>
-          <a:fillRef idx="1">
-            <a:schemeClr val="accent6"/>
-          </a:fillRef>
-          <a:effectRef idx="0">
-            <a:schemeClr val="accent6"/>
-          </a:effectRef>
-          <a:fontRef idx="minor">
-            <a:schemeClr val="lt1"/>
-          </a:fontRef>
-        </p:style>
-        <p:txBody>
-          <a:bodyPr rtlCol="0" anchor="ctr"/>
-          <a:lstStyle/>
-          <a:p>
-            <a:pPr algn="ctr"/>
-            <a:endParaRPr lang="en-GB"/>
-          </a:p>
-        </p:txBody>
-      </p:sp>
-      <p:sp>
-        <p:nvSpPr>
-          <p:cNvPr id="24" name="TextBox 23">
-            <a:extLst>
-              <a:ext uri="{FF2B5EF4-FFF2-40B4-BE49-F238E27FC236}">
-                <a16:creationId xmlns:a16="http://schemas.microsoft.com/office/drawing/2014/main" id="{9534671A-03B3-FE46-BB42-5211ADEDA82B}"/>
-              </a:ext>
-            </a:extLst>
-          </p:cNvPr>
-          <p:cNvSpPr txBox="1"/>
-          <p:nvPr/>
-        </p:nvSpPr>
-        <p:spPr>
-          <a:xfrm>
-            <a:off x="7749469" y="2273988"/>
-            <a:ext cx="907621" cy="369332"/>
-          </a:xfrm>
-          <a:prstGeom prst="rect">
-            <a:avLst/>
-          </a:prstGeom>
-          <a:noFill/>
-        </p:spPr>
-        <p:txBody>
-          <a:bodyPr wrap="none" rtlCol="0">
-            <a:spAutoFit/>
-          </a:bodyPr>
-          <a:lstStyle/>
-          <a:p>
-            <a:r>
-              <a:rPr lang="en-GB" b="1" dirty="0"/>
-              <a:t>Friction</a:t>
-            </a:r>
-          </a:p>
-        </p:txBody>
-      </p:sp>
-      <p:sp>
-        <p:nvSpPr>
-          <p:cNvPr id="25" name="Up Arrow 24">
-            <a:extLst>
-              <a:ext uri="{FF2B5EF4-FFF2-40B4-BE49-F238E27FC236}">
-                <a16:creationId xmlns:a16="http://schemas.microsoft.com/office/drawing/2014/main" id="{0CE4E102-EA0C-C348-B525-D4B926791F52}"/>
-              </a:ext>
-            </a:extLst>
-          </p:cNvPr>
-          <p:cNvSpPr/>
-          <p:nvPr/>
-        </p:nvSpPr>
-        <p:spPr>
-          <a:xfrm rot="900000">
-            <a:off x="7920016" y="2833128"/>
-            <a:ext cx="231088" cy="1348308"/>
-          </a:xfrm>
-          <a:prstGeom prst="upArrow">
-            <a:avLst/>
-          </a:prstGeom>
+          </a:solidFill>
+          <a:ln>
+            <a:solidFill>
+              <a:schemeClr val="accent6">
+                <a:lumMod val="75000"/>
+              </a:schemeClr>
+            </a:solidFill>
+          </a:ln>
         </p:spPr>
         <p:style>
           <a:lnRef idx="2">
@@ -10899,58 +11171,49 @@
           <a:lstStyle/>
           <a:p>
             <a:pPr algn="ctr"/>
-            <a:endParaRPr lang="en-GB"/>
-          </a:p>
-        </p:txBody>
-      </p:sp>
-      <p:sp>
-        <p:nvSpPr>
-          <p:cNvPr id="7" name="Striped Right Arrow 6">
-            <a:extLst>
-              <a:ext uri="{FF2B5EF4-FFF2-40B4-BE49-F238E27FC236}">
-                <a16:creationId xmlns:a16="http://schemas.microsoft.com/office/drawing/2014/main" id="{73461A66-EE2A-0644-9EA2-23AA77346604}"/>
-              </a:ext>
-            </a:extLst>
-          </p:cNvPr>
-          <p:cNvSpPr/>
-          <p:nvPr/>
-        </p:nvSpPr>
-        <p:spPr>
-          <a:xfrm>
-            <a:off x="4038308" y="3027801"/>
-            <a:ext cx="2145250" cy="641242"/>
-          </a:xfrm>
-          <a:prstGeom prst="stripedRightArrow">
-            <a:avLst/>
-          </a:prstGeom>
-        </p:spPr>
-        <p:style>
-          <a:lnRef idx="3">
-            <a:schemeClr val="lt1"/>
-          </a:lnRef>
-          <a:fillRef idx="1">
-            <a:schemeClr val="accent3"/>
-          </a:fillRef>
-          <a:effectRef idx="1">
-            <a:schemeClr val="accent3"/>
-          </a:effectRef>
-          <a:fontRef idx="minor">
-            <a:schemeClr val="lt1"/>
-          </a:fontRef>
-        </p:style>
-        <p:txBody>
-          <a:bodyPr rtlCol="0" anchor="ctr"/>
-          <a:lstStyle/>
-          <a:p>
-            <a:pPr algn="ctr"/>
-            <a:endParaRPr lang="en-GB"/>
+            <a:endParaRPr lang="en-GB" dirty="0"/>
+          </a:p>
+        </p:txBody>
+      </p:sp>
+      <p:sp>
+        <p:nvSpPr>
+          <p:cNvPr id="20" name="TextBox 19">
+            <a:extLst>
+              <a:ext uri="{FF2B5EF4-FFF2-40B4-BE49-F238E27FC236}">
+                <a16:creationId xmlns:a16="http://schemas.microsoft.com/office/drawing/2014/main" id="{4BF45160-0F04-2846-B7BE-0CCE08956F65}"/>
+              </a:ext>
+            </a:extLst>
+          </p:cNvPr>
+          <p:cNvSpPr txBox="1"/>
+          <p:nvPr/>
+        </p:nvSpPr>
+        <p:spPr>
+          <a:xfrm>
+            <a:off x="6737927" y="3489265"/>
+            <a:ext cx="679399" cy="461665"/>
+          </a:xfrm>
+          <a:prstGeom prst="rect">
+            <a:avLst/>
+          </a:prstGeom>
+          <a:noFill/>
+        </p:spPr>
+        <p:txBody>
+          <a:bodyPr wrap="square" rtlCol="0">
+            <a:spAutoFit/>
+          </a:bodyPr>
+          <a:lstStyle/>
+          <a:p>
+            <a:r>
+              <a:rPr lang="en-GB" sz="2400" b="1" dirty="0"/>
+              <a:t>30°</a:t>
+            </a:r>
           </a:p>
         </p:txBody>
       </p:sp>
     </p:spTree>
     <p:extLst>
       <p:ext uri="{BB962C8B-B14F-4D97-AF65-F5344CB8AC3E}">
-        <p14:creationId xmlns:p14="http://schemas.microsoft.com/office/powerpoint/2010/main" val="92818312"/>
+        <p14:creationId xmlns:p14="http://schemas.microsoft.com/office/powerpoint/2010/main" val="3347241201"/>
       </p:ext>
     </p:extLst>
   </p:cSld>
@@ -10979,10 +11242,252 @@
       </p:grpSpPr>
       <p:sp>
         <p:nvSpPr>
-          <p:cNvPr id="4" name="Right Triangle 3">
-            <a:extLst>
-              <a:ext uri="{FF2B5EF4-FFF2-40B4-BE49-F238E27FC236}">
-                <a16:creationId xmlns:a16="http://schemas.microsoft.com/office/drawing/2014/main" id="{47CBC37A-8823-0640-A9BB-233322540E5E}"/>
+          <p:cNvPr id="10" name="TextBox 9">
+            <a:extLst>
+              <a:ext uri="{FF2B5EF4-FFF2-40B4-BE49-F238E27FC236}">
+                <a16:creationId xmlns:a16="http://schemas.microsoft.com/office/drawing/2014/main" id="{ACAE37C3-8282-204F-A3BA-A1D1A38E3681}"/>
+              </a:ext>
+            </a:extLst>
+          </p:cNvPr>
+          <p:cNvSpPr txBox="1"/>
+          <p:nvPr/>
+        </p:nvSpPr>
+        <p:spPr>
+          <a:xfrm>
+            <a:off x="1969939" y="4349584"/>
+            <a:ext cx="1437830" cy="646331"/>
+          </a:xfrm>
+          <a:prstGeom prst="rect">
+            <a:avLst/>
+          </a:prstGeom>
+          <a:noFill/>
+        </p:spPr>
+        <p:txBody>
+          <a:bodyPr wrap="square" rtlCol="0">
+            <a:spAutoFit/>
+          </a:bodyPr>
+          <a:lstStyle/>
+          <a:p>
+            <a:pPr algn="ctr"/>
+            <a:r>
+              <a:rPr lang="en-GB" b="1" dirty="0"/>
+              <a:t>Weight</a:t>
+            </a:r>
+            <a:br>
+              <a:rPr lang="en-GB" b="1" dirty="0"/>
+            </a:br>
+            <a:r>
+              <a:rPr lang="en-GB" b="1" dirty="0"/>
+              <a:t>9.8N</a:t>
+            </a:r>
+          </a:p>
+        </p:txBody>
+      </p:sp>
+      <p:sp>
+        <p:nvSpPr>
+          <p:cNvPr id="12" name="TextBox 11">
+            <a:extLst>
+              <a:ext uri="{FF2B5EF4-FFF2-40B4-BE49-F238E27FC236}">
+                <a16:creationId xmlns:a16="http://schemas.microsoft.com/office/drawing/2014/main" id="{A6CCFD9A-142D-094E-9AC6-6641FEC74639}"/>
+              </a:ext>
+            </a:extLst>
+          </p:cNvPr>
+          <p:cNvSpPr txBox="1"/>
+          <p:nvPr/>
+        </p:nvSpPr>
+        <p:spPr>
+          <a:xfrm>
+            <a:off x="1738174" y="1791825"/>
+            <a:ext cx="2333011" cy="646331"/>
+          </a:xfrm>
+          <a:prstGeom prst="rect">
+            <a:avLst/>
+          </a:prstGeom>
+          <a:noFill/>
+        </p:spPr>
+        <p:txBody>
+          <a:bodyPr wrap="square" rtlCol="0">
+            <a:spAutoFit/>
+          </a:bodyPr>
+          <a:lstStyle/>
+          <a:p>
+            <a:pPr algn="ctr"/>
+            <a:r>
+              <a:rPr lang="en-GB" b="1" dirty="0"/>
+              <a:t>Support/Normal</a:t>
+            </a:r>
+            <a:br>
+              <a:rPr lang="en-GB" b="1" dirty="0"/>
+            </a:br>
+            <a:r>
+              <a:rPr lang="en-GB" b="1" dirty="0"/>
+              <a:t>8.5N</a:t>
+            </a:r>
+          </a:p>
+        </p:txBody>
+      </p:sp>
+      <p:sp>
+        <p:nvSpPr>
+          <p:cNvPr id="4" name="TextBox 3">
+            <a:extLst>
+              <a:ext uri="{FF2B5EF4-FFF2-40B4-BE49-F238E27FC236}">
+                <a16:creationId xmlns:a16="http://schemas.microsoft.com/office/drawing/2014/main" id="{0F1B847D-24B2-6143-9EF8-418FC41EE72D}"/>
+              </a:ext>
+            </a:extLst>
+          </p:cNvPr>
+          <p:cNvSpPr txBox="1"/>
+          <p:nvPr/>
+        </p:nvSpPr>
+        <p:spPr>
+          <a:xfrm>
+            <a:off x="573662" y="2956784"/>
+            <a:ext cx="907621" cy="369332"/>
+          </a:xfrm>
+          <a:prstGeom prst="rect">
+            <a:avLst/>
+          </a:prstGeom>
+          <a:noFill/>
+        </p:spPr>
+        <p:txBody>
+          <a:bodyPr wrap="none" rtlCol="0">
+            <a:spAutoFit/>
+          </a:bodyPr>
+          <a:lstStyle/>
+          <a:p>
+            <a:r>
+              <a:rPr lang="en-GB" b="1" dirty="0"/>
+              <a:t>Friction</a:t>
+            </a:r>
+          </a:p>
+        </p:txBody>
+      </p:sp>
+      <p:sp>
+        <p:nvSpPr>
+          <p:cNvPr id="20" name="TextBox 19">
+            <a:extLst>
+              <a:ext uri="{FF2B5EF4-FFF2-40B4-BE49-F238E27FC236}">
+                <a16:creationId xmlns:a16="http://schemas.microsoft.com/office/drawing/2014/main" id="{4CCC1CD0-7F82-0A47-BD14-DF21122A5755}"/>
+              </a:ext>
+            </a:extLst>
+          </p:cNvPr>
+          <p:cNvSpPr txBox="1"/>
+          <p:nvPr/>
+        </p:nvSpPr>
+        <p:spPr>
+          <a:xfrm>
+            <a:off x="6542000" y="3027801"/>
+            <a:ext cx="1437830" cy="646331"/>
+          </a:xfrm>
+          <a:prstGeom prst="rect">
+            <a:avLst/>
+          </a:prstGeom>
+          <a:noFill/>
+        </p:spPr>
+        <p:txBody>
+          <a:bodyPr wrap="square" rtlCol="0">
+            <a:spAutoFit/>
+          </a:bodyPr>
+          <a:lstStyle/>
+          <a:p>
+            <a:pPr algn="ctr"/>
+            <a:r>
+              <a:rPr lang="en-GB" b="1" dirty="0"/>
+              <a:t>Weight</a:t>
+            </a:r>
+            <a:br>
+              <a:rPr lang="en-GB" b="1" dirty="0"/>
+            </a:br>
+            <a:r>
+              <a:rPr lang="en-GB" b="1" dirty="0"/>
+              <a:t>9.8N</a:t>
+            </a:r>
+          </a:p>
+        </p:txBody>
+      </p:sp>
+      <p:sp>
+        <p:nvSpPr>
+          <p:cNvPr id="22" name="TextBox 21">
+            <a:extLst>
+              <a:ext uri="{FF2B5EF4-FFF2-40B4-BE49-F238E27FC236}">
+                <a16:creationId xmlns:a16="http://schemas.microsoft.com/office/drawing/2014/main" id="{33AC81C0-1DCC-0144-891F-9501EDDE9A18}"/>
+              </a:ext>
+            </a:extLst>
+          </p:cNvPr>
+          <p:cNvSpPr txBox="1"/>
+          <p:nvPr/>
+        </p:nvSpPr>
+        <p:spPr>
+          <a:xfrm>
+            <a:off x="7890137" y="3450480"/>
+            <a:ext cx="2333011" cy="646331"/>
+          </a:xfrm>
+          <a:prstGeom prst="rect">
+            <a:avLst/>
+          </a:prstGeom>
+          <a:noFill/>
+        </p:spPr>
+        <p:txBody>
+          <a:bodyPr wrap="square" rtlCol="0">
+            <a:spAutoFit/>
+          </a:bodyPr>
+          <a:lstStyle/>
+          <a:p>
+            <a:pPr algn="ctr"/>
+            <a:r>
+              <a:rPr lang="en-GB" b="1" dirty="0"/>
+              <a:t>Support/Normal</a:t>
+            </a:r>
+            <a:br>
+              <a:rPr lang="en-GB" b="1" dirty="0"/>
+            </a:br>
+            <a:r>
+              <a:rPr lang="en-GB" b="1" dirty="0"/>
+              <a:t>8.5N</a:t>
+            </a:r>
+          </a:p>
+        </p:txBody>
+      </p:sp>
+      <p:sp>
+        <p:nvSpPr>
+          <p:cNvPr id="24" name="TextBox 23">
+            <a:extLst>
+              <a:ext uri="{FF2B5EF4-FFF2-40B4-BE49-F238E27FC236}">
+                <a16:creationId xmlns:a16="http://schemas.microsoft.com/office/drawing/2014/main" id="{9534671A-03B3-FE46-BB42-5211ADEDA82B}"/>
+              </a:ext>
+            </a:extLst>
+          </p:cNvPr>
+          <p:cNvSpPr txBox="1"/>
+          <p:nvPr/>
+        </p:nvSpPr>
+        <p:spPr>
+          <a:xfrm>
+            <a:off x="8068803" y="2308670"/>
+            <a:ext cx="907621" cy="369332"/>
+          </a:xfrm>
+          <a:prstGeom prst="rect">
+            <a:avLst/>
+          </a:prstGeom>
+          <a:noFill/>
+        </p:spPr>
+        <p:txBody>
+          <a:bodyPr wrap="none" rtlCol="0">
+            <a:spAutoFit/>
+          </a:bodyPr>
+          <a:lstStyle/>
+          <a:p>
+            <a:r>
+              <a:rPr lang="en-GB" b="1" dirty="0"/>
+              <a:t>Friction</a:t>
+            </a:r>
+          </a:p>
+        </p:txBody>
+      </p:sp>
+      <p:sp>
+        <p:nvSpPr>
+          <p:cNvPr id="7" name="Striped Right Arrow 6">
+            <a:extLst>
+              <a:ext uri="{FF2B5EF4-FFF2-40B4-BE49-F238E27FC236}">
+                <a16:creationId xmlns:a16="http://schemas.microsoft.com/office/drawing/2014/main" id="{73461A66-EE2A-0644-9EA2-23AA77346604}"/>
               </a:ext>
             </a:extLst>
           </p:cNvPr>
@@ -10991,32 +11496,22 @@
         </p:nvSpPr>
         <p:spPr>
           <a:xfrm>
-            <a:off x="3472543" y="2231572"/>
-            <a:ext cx="4974771" cy="1436914"/>
-          </a:xfrm>
-          <a:prstGeom prst="rtTriangle">
-            <a:avLst/>
-          </a:prstGeom>
-          <a:solidFill>
-            <a:schemeClr val="bg2"/>
-          </a:solidFill>
-          <a:ln w="38100">
-            <a:solidFill>
-              <a:schemeClr val="tx1"/>
-            </a:solidFill>
-          </a:ln>
+            <a:off x="4038308" y="3027801"/>
+            <a:ext cx="2145250" cy="641242"/>
+          </a:xfrm>
+          <a:prstGeom prst="stripedRightArrow">
+            <a:avLst/>
+          </a:prstGeom>
         </p:spPr>
         <p:style>
-          <a:lnRef idx="2">
-            <a:schemeClr val="accent1">
-              <a:shade val="50000"/>
-            </a:schemeClr>
+          <a:lnRef idx="3">
+            <a:schemeClr val="lt1"/>
           </a:lnRef>
           <a:fillRef idx="1">
-            <a:schemeClr val="accent1"/>
+            <a:schemeClr val="accent3"/>
           </a:fillRef>
-          <a:effectRef idx="0">
-            <a:schemeClr val="accent1"/>
+          <a:effectRef idx="1">
+            <a:schemeClr val="accent3"/>
           </a:effectRef>
           <a:fontRef idx="minor">
             <a:schemeClr val="lt1"/>
@@ -11033,10 +11528,80 @@
       </p:sp>
       <p:sp>
         <p:nvSpPr>
-          <p:cNvPr id="5" name="Rectangle 4">
-            <a:extLst>
-              <a:ext uri="{FF2B5EF4-FFF2-40B4-BE49-F238E27FC236}">
-                <a16:creationId xmlns:a16="http://schemas.microsoft.com/office/drawing/2014/main" id="{25FD9150-F037-6649-B6B2-8EDCD9E7DF01}"/>
+          <p:cNvPr id="2" name="TextBox 1">
+            <a:extLst>
+              <a:ext uri="{FF2B5EF4-FFF2-40B4-BE49-F238E27FC236}">
+                <a16:creationId xmlns:a16="http://schemas.microsoft.com/office/drawing/2014/main" id="{09498AD5-4721-114E-8151-1DD59D5ECD11}"/>
+              </a:ext>
+            </a:extLst>
+          </p:cNvPr>
+          <p:cNvSpPr txBox="1"/>
+          <p:nvPr/>
+        </p:nvSpPr>
+        <p:spPr>
+          <a:xfrm>
+            <a:off x="3978824" y="2796068"/>
+            <a:ext cx="2351965" cy="369332"/>
+          </a:xfrm>
+          <a:prstGeom prst="rect">
+            <a:avLst/>
+          </a:prstGeom>
+          <a:noFill/>
+        </p:spPr>
+        <p:txBody>
+          <a:bodyPr wrap="square" rtlCol="0">
+            <a:spAutoFit/>
+          </a:bodyPr>
+          <a:lstStyle/>
+          <a:p>
+            <a:r>
+              <a:rPr lang="en-GB" dirty="0"/>
+              <a:t>Draw a vector diagram</a:t>
+            </a:r>
+          </a:p>
+        </p:txBody>
+      </p:sp>
+      <p:sp>
+        <p:nvSpPr>
+          <p:cNvPr id="17" name="TextBox 16">
+            <a:extLst>
+              <a:ext uri="{FF2B5EF4-FFF2-40B4-BE49-F238E27FC236}">
+                <a16:creationId xmlns:a16="http://schemas.microsoft.com/office/drawing/2014/main" id="{42039DC0-D193-7C4A-BC21-FECF46355140}"/>
+              </a:ext>
+            </a:extLst>
+          </p:cNvPr>
+          <p:cNvSpPr txBox="1"/>
+          <p:nvPr/>
+        </p:nvSpPr>
+        <p:spPr>
+          <a:xfrm>
+            <a:off x="3793652" y="3531444"/>
+            <a:ext cx="2711343" cy="369332"/>
+          </a:xfrm>
+          <a:prstGeom prst="rect">
+            <a:avLst/>
+          </a:prstGeom>
+          <a:noFill/>
+        </p:spPr>
+        <p:txBody>
+          <a:bodyPr wrap="square" rtlCol="0">
+            <a:spAutoFit/>
+          </a:bodyPr>
+          <a:lstStyle/>
+          <a:p>
+            <a:r>
+              <a:rPr lang="en-GB" dirty="0"/>
+              <a:t>Put the vectors head to tail</a:t>
+            </a:r>
+          </a:p>
+        </p:txBody>
+      </p:sp>
+      <p:sp>
+        <p:nvSpPr>
+          <p:cNvPr id="18" name="Up Arrow 17">
+            <a:extLst>
+              <a:ext uri="{FF2B5EF4-FFF2-40B4-BE49-F238E27FC236}">
+                <a16:creationId xmlns:a16="http://schemas.microsoft.com/office/drawing/2014/main" id="{6F7D7AAB-F106-BB40-B616-5E6FC098A581}"/>
               </a:ext>
             </a:extLst>
           </p:cNvPr>
@@ -11044,57 +11609,11 @@
           <p:nvPr/>
         </p:nvSpPr>
         <p:spPr>
-          <a:xfrm rot="951516">
-            <a:off x="5181600" y="2296888"/>
-            <a:ext cx="1208314" cy="566057"/>
-          </a:xfrm>
-          <a:prstGeom prst="rect">
-            <a:avLst/>
-          </a:prstGeom>
-        </p:spPr>
-        <p:style>
-          <a:lnRef idx="2">
-            <a:schemeClr val="accent1">
-              <a:shade val="50000"/>
-            </a:schemeClr>
-          </a:lnRef>
-          <a:fillRef idx="1">
-            <a:schemeClr val="accent1"/>
-          </a:fillRef>
-          <a:effectRef idx="0">
-            <a:schemeClr val="accent1"/>
-          </a:effectRef>
-          <a:fontRef idx="minor">
-            <a:schemeClr val="lt1"/>
-          </a:fontRef>
-        </p:style>
-        <p:txBody>
-          <a:bodyPr rtlCol="0" anchor="ctr"/>
-          <a:lstStyle/>
-          <a:p>
-            <a:pPr algn="ctr"/>
-            <a:endParaRPr lang="en-GB" sz="3600" b="1" dirty="0"/>
-          </a:p>
-        </p:txBody>
-      </p:sp>
-      <p:sp>
-        <p:nvSpPr>
-          <p:cNvPr id="10" name="Left Arrow 9">
-            <a:extLst>
-              <a:ext uri="{FF2B5EF4-FFF2-40B4-BE49-F238E27FC236}">
-                <a16:creationId xmlns:a16="http://schemas.microsoft.com/office/drawing/2014/main" id="{D7FB9F4D-2012-A94A-943A-CA4AD98EFE98}"/>
-              </a:ext>
-            </a:extLst>
-          </p:cNvPr>
-          <p:cNvSpPr/>
-          <p:nvPr/>
-        </p:nvSpPr>
-        <p:spPr>
-          <a:xfrm rot="6375292">
-            <a:off x="5200841" y="1779419"/>
-            <a:ext cx="1403584" cy="230019"/>
-          </a:xfrm>
-          <a:prstGeom prst="leftArrow">
+          <a:xfrm rot="10800000">
+            <a:off x="2031867" y="3614279"/>
+            <a:ext cx="184901" cy="1567543"/>
+          </a:xfrm>
+          <a:prstGeom prst="upArrow">
             <a:avLst/>
           </a:prstGeom>
         </p:spPr>
@@ -11125,10 +11644,260 @@
       </p:sp>
       <p:sp>
         <p:nvSpPr>
-          <p:cNvPr id="11" name="TextBox 10">
-            <a:extLst>
-              <a:ext uri="{FF2B5EF4-FFF2-40B4-BE49-F238E27FC236}">
-                <a16:creationId xmlns:a16="http://schemas.microsoft.com/office/drawing/2014/main" id="{23405AF7-6EEA-D04E-9375-D0E0CF38BBA5}"/>
+          <p:cNvPr id="21" name="Up Arrow 20">
+            <a:extLst>
+              <a:ext uri="{FF2B5EF4-FFF2-40B4-BE49-F238E27FC236}">
+                <a16:creationId xmlns:a16="http://schemas.microsoft.com/office/drawing/2014/main" id="{DE133AE0-C799-E94D-BB66-D4663A704A6C}"/>
+              </a:ext>
+            </a:extLst>
+          </p:cNvPr>
+          <p:cNvSpPr/>
+          <p:nvPr/>
+        </p:nvSpPr>
+        <p:spPr>
+          <a:xfrm rot="12600000" flipH="1" flipV="1">
+            <a:off x="2370383" y="2317552"/>
+            <a:ext cx="202451" cy="1420497"/>
+          </a:xfrm>
+          <a:prstGeom prst="upArrow">
+            <a:avLst/>
+          </a:prstGeom>
+        </p:spPr>
+        <p:style>
+          <a:lnRef idx="2">
+            <a:schemeClr val="accent4">
+              <a:shade val="50000"/>
+            </a:schemeClr>
+          </a:lnRef>
+          <a:fillRef idx="1">
+            <a:schemeClr val="accent4"/>
+          </a:fillRef>
+          <a:effectRef idx="0">
+            <a:schemeClr val="accent4"/>
+          </a:effectRef>
+          <a:fontRef idx="minor">
+            <a:schemeClr val="lt1"/>
+          </a:fontRef>
+        </p:style>
+        <p:txBody>
+          <a:bodyPr rtlCol="0" anchor="ctr"/>
+          <a:lstStyle/>
+          <a:p>
+            <a:pPr algn="ctr"/>
+            <a:endParaRPr lang="en-GB" dirty="0"/>
+          </a:p>
+        </p:txBody>
+      </p:sp>
+      <p:sp>
+        <p:nvSpPr>
+          <p:cNvPr id="27" name="Up Arrow 26">
+            <a:extLst>
+              <a:ext uri="{FF2B5EF4-FFF2-40B4-BE49-F238E27FC236}">
+                <a16:creationId xmlns:a16="http://schemas.microsoft.com/office/drawing/2014/main" id="{75F0E17B-D7C2-4846-B3BA-9D149EF3DE2F}"/>
+              </a:ext>
+            </a:extLst>
+          </p:cNvPr>
+          <p:cNvSpPr/>
+          <p:nvPr/>
+        </p:nvSpPr>
+        <p:spPr>
+          <a:xfrm rot="10800000">
+            <a:off x="7715932" y="2559937"/>
+            <a:ext cx="184901" cy="1567543"/>
+          </a:xfrm>
+          <a:prstGeom prst="upArrow">
+            <a:avLst/>
+          </a:prstGeom>
+        </p:spPr>
+        <p:style>
+          <a:lnRef idx="2">
+            <a:schemeClr val="accent2">
+              <a:shade val="50000"/>
+            </a:schemeClr>
+          </a:lnRef>
+          <a:fillRef idx="1">
+            <a:schemeClr val="accent2"/>
+          </a:fillRef>
+          <a:effectRef idx="0">
+            <a:schemeClr val="accent2"/>
+          </a:effectRef>
+          <a:fontRef idx="minor">
+            <a:schemeClr val="lt1"/>
+          </a:fontRef>
+        </p:style>
+        <p:txBody>
+          <a:bodyPr rtlCol="0" anchor="ctr"/>
+          <a:lstStyle/>
+          <a:p>
+            <a:pPr algn="ctr"/>
+            <a:endParaRPr lang="en-GB"/>
+          </a:p>
+        </p:txBody>
+      </p:sp>
+      <p:sp>
+        <p:nvSpPr>
+          <p:cNvPr id="28" name="Up Arrow 27">
+            <a:extLst>
+              <a:ext uri="{FF2B5EF4-FFF2-40B4-BE49-F238E27FC236}">
+                <a16:creationId xmlns:a16="http://schemas.microsoft.com/office/drawing/2014/main" id="{3BC405B7-49E1-6249-BBD9-D4F4386C9708}"/>
+              </a:ext>
+            </a:extLst>
+          </p:cNvPr>
+          <p:cNvSpPr/>
+          <p:nvPr/>
+        </p:nvSpPr>
+        <p:spPr>
+          <a:xfrm rot="12600000" flipH="1" flipV="1">
+            <a:off x="8072830" y="2751525"/>
+            <a:ext cx="202451" cy="1420497"/>
+          </a:xfrm>
+          <a:prstGeom prst="upArrow">
+            <a:avLst/>
+          </a:prstGeom>
+        </p:spPr>
+        <p:style>
+          <a:lnRef idx="2">
+            <a:schemeClr val="accent4">
+              <a:shade val="50000"/>
+            </a:schemeClr>
+          </a:lnRef>
+          <a:fillRef idx="1">
+            <a:schemeClr val="accent4"/>
+          </a:fillRef>
+          <a:effectRef idx="0">
+            <a:schemeClr val="accent4"/>
+          </a:effectRef>
+          <a:fontRef idx="minor">
+            <a:schemeClr val="lt1"/>
+          </a:fontRef>
+        </p:style>
+        <p:txBody>
+          <a:bodyPr rtlCol="0" anchor="ctr"/>
+          <a:lstStyle/>
+          <a:p>
+            <a:pPr algn="ctr"/>
+            <a:endParaRPr lang="en-GB" dirty="0"/>
+          </a:p>
+        </p:txBody>
+      </p:sp>
+      <p:sp>
+        <p:nvSpPr>
+          <p:cNvPr id="29" name="Up Arrow 28">
+            <a:extLst>
+              <a:ext uri="{FF2B5EF4-FFF2-40B4-BE49-F238E27FC236}">
+                <a16:creationId xmlns:a16="http://schemas.microsoft.com/office/drawing/2014/main" id="{8EC4C580-34DE-4446-AEB0-B89103A82070}"/>
+              </a:ext>
+            </a:extLst>
+          </p:cNvPr>
+          <p:cNvSpPr/>
+          <p:nvPr/>
+        </p:nvSpPr>
+        <p:spPr>
+          <a:xfrm rot="7200000" flipH="1" flipV="1">
+            <a:off x="8035714" y="2313843"/>
+            <a:ext cx="220876" cy="788576"/>
+          </a:xfrm>
+          <a:prstGeom prst="upArrow">
+            <a:avLst/>
+          </a:prstGeom>
+          <a:solidFill>
+            <a:schemeClr val="accent6"/>
+          </a:solidFill>
+          <a:ln>
+            <a:solidFill>
+              <a:schemeClr val="accent6">
+                <a:lumMod val="75000"/>
+              </a:schemeClr>
+            </a:solidFill>
+          </a:ln>
+        </p:spPr>
+        <p:style>
+          <a:lnRef idx="2">
+            <a:schemeClr val="accent4">
+              <a:shade val="50000"/>
+            </a:schemeClr>
+          </a:lnRef>
+          <a:fillRef idx="1">
+            <a:schemeClr val="accent4"/>
+          </a:fillRef>
+          <a:effectRef idx="0">
+            <a:schemeClr val="accent4"/>
+          </a:effectRef>
+          <a:fontRef idx="minor">
+            <a:schemeClr val="lt1"/>
+          </a:fontRef>
+        </p:style>
+        <p:txBody>
+          <a:bodyPr rtlCol="0" anchor="ctr"/>
+          <a:lstStyle/>
+          <a:p>
+            <a:pPr algn="ctr"/>
+            <a:endParaRPr lang="en-GB" dirty="0"/>
+          </a:p>
+        </p:txBody>
+      </p:sp>
+      <p:sp>
+        <p:nvSpPr>
+          <p:cNvPr id="30" name="Up Arrow 29">
+            <a:extLst>
+              <a:ext uri="{FF2B5EF4-FFF2-40B4-BE49-F238E27FC236}">
+                <a16:creationId xmlns:a16="http://schemas.microsoft.com/office/drawing/2014/main" id="{CE2947BA-9141-9349-9130-A98526C40EC4}"/>
+              </a:ext>
+            </a:extLst>
+          </p:cNvPr>
+          <p:cNvSpPr/>
+          <p:nvPr/>
+        </p:nvSpPr>
+        <p:spPr>
+          <a:xfrm rot="7200000" flipH="1" flipV="1">
+            <a:off x="1692373" y="3039949"/>
+            <a:ext cx="220876" cy="788576"/>
+          </a:xfrm>
+          <a:prstGeom prst="upArrow">
+            <a:avLst/>
+          </a:prstGeom>
+          <a:solidFill>
+            <a:schemeClr val="accent6"/>
+          </a:solidFill>
+          <a:ln>
+            <a:solidFill>
+              <a:schemeClr val="accent6">
+                <a:lumMod val="75000"/>
+              </a:schemeClr>
+            </a:solidFill>
+          </a:ln>
+        </p:spPr>
+        <p:style>
+          <a:lnRef idx="2">
+            <a:schemeClr val="accent4">
+              <a:shade val="50000"/>
+            </a:schemeClr>
+          </a:lnRef>
+          <a:fillRef idx="1">
+            <a:schemeClr val="accent4"/>
+          </a:fillRef>
+          <a:effectRef idx="0">
+            <a:schemeClr val="accent4"/>
+          </a:effectRef>
+          <a:fontRef idx="minor">
+            <a:schemeClr val="lt1"/>
+          </a:fontRef>
+        </p:style>
+        <p:txBody>
+          <a:bodyPr rtlCol="0" anchor="ctr"/>
+          <a:lstStyle/>
+          <a:p>
+            <a:pPr algn="ctr"/>
+            <a:endParaRPr lang="en-GB" dirty="0"/>
+          </a:p>
+        </p:txBody>
+      </p:sp>
+      <p:sp>
+        <p:nvSpPr>
+          <p:cNvPr id="31" name="TextBox 30">
+            <a:extLst>
+              <a:ext uri="{FF2B5EF4-FFF2-40B4-BE49-F238E27FC236}">
+                <a16:creationId xmlns:a16="http://schemas.microsoft.com/office/drawing/2014/main" id="{BC51949C-6402-C847-A42D-FB565ABD00AC}"/>
               </a:ext>
             </a:extLst>
           </p:cNvPr>
@@ -11137,8 +11906,8 @@
         </p:nvSpPr>
         <p:spPr>
           <a:xfrm>
-            <a:off x="6096000" y="1471547"/>
-            <a:ext cx="1468992" cy="646331"/>
+            <a:off x="7808382" y="3256839"/>
+            <a:ext cx="679399" cy="307777"/>
           </a:xfrm>
           <a:prstGeom prst="rect">
             <a:avLst/>
@@ -11146,26 +11915,14 @@
           <a:noFill/>
         </p:spPr>
         <p:txBody>
-          <a:bodyPr wrap="none" rtlCol="0">
+          <a:bodyPr wrap="square" rtlCol="0">
             <a:spAutoFit/>
           </a:bodyPr>
           <a:lstStyle/>
           <a:p>
-            <a:pPr algn="ctr"/>
-            <a:r>
-              <a:rPr lang="en-GB" b="1" dirty="0" err="1"/>
-              <a:t>F</a:t>
-            </a:r>
-            <a:r>
-              <a:rPr lang="en-GB" b="1" baseline="-25000" dirty="0" err="1"/>
-              <a:t>n</a:t>
-            </a:r>
-            <a:br>
-              <a:rPr lang="en-GB" b="1" dirty="0"/>
-            </a:br>
-            <a:r>
-              <a:rPr lang="en-GB" b="1" dirty="0"/>
-              <a:t>Normal Force</a:t>
+            <a:r>
+              <a:rPr lang="en-GB" sz="1400" b="1" dirty="0"/>
+              <a:t>30°</a:t>
             </a:r>
           </a:p>
         </p:txBody>
@@ -11173,7 +11930,7 @@
     </p:spTree>
     <p:extLst>
       <p:ext uri="{BB962C8B-B14F-4D97-AF65-F5344CB8AC3E}">
-        <p14:creationId xmlns:p14="http://schemas.microsoft.com/office/powerpoint/2010/main" val="301955601"/>
+        <p14:creationId xmlns:p14="http://schemas.microsoft.com/office/powerpoint/2010/main" val="92818312"/>
       </p:ext>
     </p:extLst>
   </p:cSld>

</xml_diff>

<commit_message>
Improve: 12PHY Scalars, projectile motion, newton's laws
</commit_message>
<xml_diff>
--- a/content/12phy/as91171/assets/figures.pptx
+++ b/content/12phy/as91171/assets/figures.pptx
@@ -5,7 +5,7 @@
     <p:sldMasterId id="2147483648" r:id="rId1"/>
   </p:sldMasterIdLst>
   <p:notesMasterIdLst>
-    <p:notesMasterId r:id="rId31"/>
+    <p:notesMasterId r:id="rId32"/>
   </p:notesMasterIdLst>
   <p:sldIdLst>
     <p:sldId id="288" r:id="rId2"/>
@@ -37,6 +37,7 @@
     <p:sldId id="272" r:id="rId28"/>
     <p:sldId id="273" r:id="rId29"/>
     <p:sldId id="274" r:id="rId30"/>
+    <p:sldId id="289" r:id="rId31"/>
   </p:sldIdLst>
   <p:sldSz cx="12192000" cy="6858000"/>
   <p:notesSz cx="6858000" cy="9144000"/>
@@ -225,7 +226,7 @@
           <a:p>
             <a:fld id="{0483D25A-4BAB-E944-807E-86E318F72109}" type="datetimeFigureOut">
               <a:rPr lang="en-GB" smtClean="0"/>
-              <a:t>08/02/2023</a:t>
+              <a:t>23/02/2023</a:t>
             </a:fld>
             <a:endParaRPr lang="en-GB"/>
           </a:p>
@@ -723,7 +724,7 @@
           <a:p>
             <a:fld id="{C8CC8613-2118-1B48-A066-53E091D42CD0}" type="datetimeFigureOut">
               <a:rPr lang="en-GB" smtClean="0"/>
-              <a:t>08/02/2023</a:t>
+              <a:t>23/02/2023</a:t>
             </a:fld>
             <a:endParaRPr lang="en-GB"/>
           </a:p>
@@ -921,7 +922,7 @@
           <a:p>
             <a:fld id="{C8CC8613-2118-1B48-A066-53E091D42CD0}" type="datetimeFigureOut">
               <a:rPr lang="en-GB" smtClean="0"/>
-              <a:t>08/02/2023</a:t>
+              <a:t>23/02/2023</a:t>
             </a:fld>
             <a:endParaRPr lang="en-GB"/>
           </a:p>
@@ -1129,7 +1130,7 @@
           <a:p>
             <a:fld id="{C8CC8613-2118-1B48-A066-53E091D42CD0}" type="datetimeFigureOut">
               <a:rPr lang="en-GB" smtClean="0"/>
-              <a:t>08/02/2023</a:t>
+              <a:t>23/02/2023</a:t>
             </a:fld>
             <a:endParaRPr lang="en-GB"/>
           </a:p>
@@ -1327,7 +1328,7 @@
           <a:p>
             <a:fld id="{C8CC8613-2118-1B48-A066-53E091D42CD0}" type="datetimeFigureOut">
               <a:rPr lang="en-GB" smtClean="0"/>
-              <a:t>08/02/2023</a:t>
+              <a:t>23/02/2023</a:t>
             </a:fld>
             <a:endParaRPr lang="en-GB"/>
           </a:p>
@@ -1602,7 +1603,7 @@
           <a:p>
             <a:fld id="{C8CC8613-2118-1B48-A066-53E091D42CD0}" type="datetimeFigureOut">
               <a:rPr lang="en-GB" smtClean="0"/>
-              <a:t>08/02/2023</a:t>
+              <a:t>23/02/2023</a:t>
             </a:fld>
             <a:endParaRPr lang="en-GB"/>
           </a:p>
@@ -1867,7 +1868,7 @@
           <a:p>
             <a:fld id="{C8CC8613-2118-1B48-A066-53E091D42CD0}" type="datetimeFigureOut">
               <a:rPr lang="en-GB" smtClean="0"/>
-              <a:t>08/02/2023</a:t>
+              <a:t>23/02/2023</a:t>
             </a:fld>
             <a:endParaRPr lang="en-GB"/>
           </a:p>
@@ -2279,7 +2280,7 @@
           <a:p>
             <a:fld id="{C8CC8613-2118-1B48-A066-53E091D42CD0}" type="datetimeFigureOut">
               <a:rPr lang="en-GB" smtClean="0"/>
-              <a:t>08/02/2023</a:t>
+              <a:t>23/02/2023</a:t>
             </a:fld>
             <a:endParaRPr lang="en-GB"/>
           </a:p>
@@ -2420,7 +2421,7 @@
           <a:p>
             <a:fld id="{C8CC8613-2118-1B48-A066-53E091D42CD0}" type="datetimeFigureOut">
               <a:rPr lang="en-GB" smtClean="0"/>
-              <a:t>08/02/2023</a:t>
+              <a:t>23/02/2023</a:t>
             </a:fld>
             <a:endParaRPr lang="en-GB"/>
           </a:p>
@@ -2533,7 +2534,7 @@
           <a:p>
             <a:fld id="{C8CC8613-2118-1B48-A066-53E091D42CD0}" type="datetimeFigureOut">
               <a:rPr lang="en-GB" smtClean="0"/>
-              <a:t>08/02/2023</a:t>
+              <a:t>23/02/2023</a:t>
             </a:fld>
             <a:endParaRPr lang="en-GB"/>
           </a:p>
@@ -2844,7 +2845,7 @@
           <a:p>
             <a:fld id="{C8CC8613-2118-1B48-A066-53E091D42CD0}" type="datetimeFigureOut">
               <a:rPr lang="en-GB" smtClean="0"/>
-              <a:t>08/02/2023</a:t>
+              <a:t>23/02/2023</a:t>
             </a:fld>
             <a:endParaRPr lang="en-GB"/>
           </a:p>
@@ -3132,7 +3133,7 @@
           <a:p>
             <a:fld id="{C8CC8613-2118-1B48-A066-53E091D42CD0}" type="datetimeFigureOut">
               <a:rPr lang="en-GB" smtClean="0"/>
-              <a:t>08/02/2023</a:t>
+              <a:t>23/02/2023</a:t>
             </a:fld>
             <a:endParaRPr lang="en-GB"/>
           </a:p>
@@ -3373,7 +3374,7 @@
           <a:p>
             <a:fld id="{C8CC8613-2118-1B48-A066-53E091D42CD0}" type="datetimeFigureOut">
               <a:rPr lang="en-GB" smtClean="0"/>
-              <a:t>08/02/2023</a:t>
+              <a:t>23/02/2023</a:t>
             </a:fld>
             <a:endParaRPr lang="en-GB"/>
           </a:p>
@@ -15134,6 +15135,1012 @@
     <p:extLst>
       <p:ext uri="{BB962C8B-B14F-4D97-AF65-F5344CB8AC3E}">
         <p14:creationId xmlns:p14="http://schemas.microsoft.com/office/powerpoint/2010/main" val="2454433145"/>
+      </p:ext>
+    </p:extLst>
+  </p:cSld>
+  <p:clrMapOvr>
+    <a:masterClrMapping/>
+  </p:clrMapOvr>
+</p:sld>
+</file>
+
+<file path=ppt/slides/slide30.xml><?xml version="1.0" encoding="utf-8"?>
+<p:sld xmlns:a="http://schemas.openxmlformats.org/drawingml/2006/main" xmlns:r="http://schemas.openxmlformats.org/officeDocument/2006/relationships" xmlns:p="http://schemas.openxmlformats.org/presentationml/2006/main">
+  <p:cSld>
+    <p:spTree>
+      <p:nvGrpSpPr>
+        <p:cNvPr id="1" name=""/>
+        <p:cNvGrpSpPr/>
+        <p:nvPr/>
+      </p:nvGrpSpPr>
+      <p:grpSpPr>
+        <a:xfrm>
+          <a:off x="0" y="0"/>
+          <a:ext cx="0" cy="0"/>
+          <a:chOff x="0" y="0"/>
+          <a:chExt cx="0" cy="0"/>
+        </a:xfrm>
+      </p:grpSpPr>
+      <p:graphicFrame>
+        <p:nvGraphicFramePr>
+          <p:cNvPr id="5" name="Table 5">
+            <a:extLst>
+              <a:ext uri="{FF2B5EF4-FFF2-40B4-BE49-F238E27FC236}">
+                <a16:creationId xmlns:a16="http://schemas.microsoft.com/office/drawing/2014/main" id="{C3DC7335-5CA5-E0BE-2384-88E0CE186E5D}"/>
+              </a:ext>
+            </a:extLst>
+          </p:cNvPr>
+          <p:cNvGraphicFramePr>
+            <a:graphicFrameLocks noGrp="1"/>
+          </p:cNvGraphicFramePr>
+          <p:nvPr>
+            <p:extLst>
+              <p:ext uri="{D42A27DB-BD31-4B8C-83A1-F6EECF244321}">
+                <p14:modId xmlns:p14="http://schemas.microsoft.com/office/powerpoint/2010/main" val="2659562791"/>
+              </p:ext>
+            </p:extLst>
+          </p:nvPr>
+        </p:nvGraphicFramePr>
+        <p:xfrm>
+          <a:off x="719092" y="719665"/>
+          <a:ext cx="10697592" cy="5592357"/>
+        </p:xfrm>
+        <a:graphic>
+          <a:graphicData uri="http://schemas.openxmlformats.org/drawingml/2006/table">
+            <a:tbl>
+              <a:tblPr firstRow="1" bandRow="1">
+                <a:tableStyleId>{5C22544A-7EE6-4342-B048-85BDC9FD1C3A}</a:tableStyleId>
+              </a:tblPr>
+              <a:tblGrid>
+                <a:gridCol w="3565864">
+                  <a:extLst>
+                    <a:ext uri="{9D8B030D-6E8A-4147-A177-3AD203B41FA5}">
+                      <a16:colId xmlns:a16="http://schemas.microsoft.com/office/drawing/2014/main" val="417057521"/>
+                    </a:ext>
+                  </a:extLst>
+                </a:gridCol>
+                <a:gridCol w="3565864">
+                  <a:extLst>
+                    <a:ext uri="{9D8B030D-6E8A-4147-A177-3AD203B41FA5}">
+                      <a16:colId xmlns:a16="http://schemas.microsoft.com/office/drawing/2014/main" val="1325767052"/>
+                    </a:ext>
+                  </a:extLst>
+                </a:gridCol>
+                <a:gridCol w="3565864">
+                  <a:extLst>
+                    <a:ext uri="{9D8B030D-6E8A-4147-A177-3AD203B41FA5}">
+                      <a16:colId xmlns:a16="http://schemas.microsoft.com/office/drawing/2014/main" val="3290824905"/>
+                    </a:ext>
+                  </a:extLst>
+                </a:gridCol>
+              </a:tblGrid>
+              <a:tr h="5592357">
+                <a:tc>
+                  <a:txBody>
+                    <a:bodyPr/>
+                    <a:lstStyle/>
+                    <a:p>
+                      <a:pPr algn="ctr"/>
+                      <a:r>
+                        <a:rPr lang="en-GB" b="1" dirty="0">
+                          <a:solidFill>
+                            <a:schemeClr val="tx1"/>
+                          </a:solidFill>
+                        </a:rPr>
+                        <a:t>Half Parabola</a:t>
+                      </a:r>
+                    </a:p>
+                    <a:p>
+                      <a:pPr algn="ctr"/>
+                      <a:endParaRPr lang="en-GB" b="0" dirty="0">
+                        <a:solidFill>
+                          <a:schemeClr val="tx1"/>
+                        </a:solidFill>
+                      </a:endParaRPr>
+                    </a:p>
+                    <a:p>
+                      <a:pPr algn="ctr"/>
+                      <a:endParaRPr lang="en-GB" b="0" dirty="0">
+                        <a:solidFill>
+                          <a:schemeClr val="tx1"/>
+                        </a:solidFill>
+                      </a:endParaRPr>
+                    </a:p>
+                    <a:p>
+                      <a:pPr algn="ctr"/>
+                      <a:endParaRPr lang="en-GB" b="0" dirty="0">
+                        <a:solidFill>
+                          <a:schemeClr val="tx1"/>
+                        </a:solidFill>
+                      </a:endParaRPr>
+                    </a:p>
+                    <a:p>
+                      <a:pPr algn="ctr"/>
+                      <a:endParaRPr lang="en-GB" b="0" dirty="0">
+                        <a:solidFill>
+                          <a:schemeClr val="tx1"/>
+                        </a:solidFill>
+                      </a:endParaRPr>
+                    </a:p>
+                    <a:p>
+                      <a:pPr algn="ctr"/>
+                      <a:endParaRPr lang="en-GB" b="0" dirty="0">
+                        <a:solidFill>
+                          <a:schemeClr val="tx1"/>
+                        </a:solidFill>
+                      </a:endParaRPr>
+                    </a:p>
+                    <a:p>
+                      <a:pPr algn="ctr"/>
+                      <a:endParaRPr lang="en-GB" b="0" dirty="0">
+                        <a:solidFill>
+                          <a:schemeClr val="tx1"/>
+                        </a:solidFill>
+                      </a:endParaRPr>
+                    </a:p>
+                    <a:p>
+                      <a:pPr algn="ctr"/>
+                      <a:endParaRPr lang="en-GB" b="0" dirty="0">
+                        <a:solidFill>
+                          <a:schemeClr val="tx1"/>
+                        </a:solidFill>
+                      </a:endParaRPr>
+                    </a:p>
+                    <a:p>
+                      <a:pPr algn="ctr"/>
+                      <a:endParaRPr lang="en-GB" b="0" dirty="0">
+                        <a:solidFill>
+                          <a:schemeClr val="tx1"/>
+                        </a:solidFill>
+                      </a:endParaRPr>
+                    </a:p>
+                    <a:p>
+                      <a:pPr algn="l"/>
+                      <a:endParaRPr lang="en-GB" b="0" dirty="0">
+                        <a:solidFill>
+                          <a:schemeClr val="tx1"/>
+                        </a:solidFill>
+                      </a:endParaRPr>
+                    </a:p>
+                    <a:p>
+                      <a:pPr algn="l"/>
+                      <a:r>
+                        <a:rPr lang="en-GB" b="1" dirty="0">
+                          <a:solidFill>
+                            <a:schemeClr val="tx1"/>
+                          </a:solidFill>
+                        </a:rPr>
+                        <a:t>Homework Booklet</a:t>
+                      </a:r>
+                      <a:r>
+                        <a:rPr lang="en-GB" b="1">
+                          <a:solidFill>
+                            <a:schemeClr val="tx1"/>
+                          </a:solidFill>
+                        </a:rPr>
+                        <a:t>:</a:t>
+                      </a:r>
+                      <a:r>
+                        <a:rPr lang="en-GB" b="0">
+                          <a:solidFill>
+                            <a:schemeClr val="tx1"/>
+                          </a:solidFill>
+                        </a:rPr>
+                        <a:t> C4</a:t>
+                      </a:r>
+                      <a:endParaRPr lang="en-GB" b="0" dirty="0">
+                        <a:solidFill>
+                          <a:schemeClr val="tx1"/>
+                        </a:solidFill>
+                      </a:endParaRPr>
+                    </a:p>
+                  </a:txBody>
+                  <a:tcPr>
+                    <a:lnL w="12700" cap="flat" cmpd="sng" algn="ctr">
+                      <a:solidFill>
+                        <a:schemeClr val="tx1"/>
+                      </a:solidFill>
+                      <a:prstDash val="solid"/>
+                      <a:round/>
+                      <a:headEnd type="none" w="med" len="med"/>
+                      <a:tailEnd type="none" w="med" len="med"/>
+                    </a:lnL>
+                    <a:lnR w="12700" cap="flat" cmpd="sng" algn="ctr">
+                      <a:solidFill>
+                        <a:schemeClr val="tx1"/>
+                      </a:solidFill>
+                      <a:prstDash val="solid"/>
+                      <a:round/>
+                      <a:headEnd type="none" w="med" len="med"/>
+                      <a:tailEnd type="none" w="med" len="med"/>
+                    </a:lnR>
+                    <a:lnT w="12700" cap="flat" cmpd="sng" algn="ctr">
+                      <a:solidFill>
+                        <a:schemeClr val="tx1"/>
+                      </a:solidFill>
+                      <a:prstDash val="solid"/>
+                      <a:round/>
+                      <a:headEnd type="none" w="med" len="med"/>
+                      <a:tailEnd type="none" w="med" len="med"/>
+                    </a:lnT>
+                    <a:lnB w="12700" cap="flat" cmpd="sng" algn="ctr">
+                      <a:solidFill>
+                        <a:schemeClr val="tx1"/>
+                      </a:solidFill>
+                      <a:prstDash val="solid"/>
+                      <a:round/>
+                      <a:headEnd type="none" w="med" len="med"/>
+                      <a:tailEnd type="none" w="med" len="med"/>
+                    </a:lnB>
+                    <a:noFill/>
+                  </a:tcPr>
+                </a:tc>
+                <a:tc>
+                  <a:txBody>
+                    <a:bodyPr/>
+                    <a:lstStyle/>
+                    <a:p>
+                      <a:pPr algn="ctr"/>
+                      <a:r>
+                        <a:rPr lang="en-GB" b="1" dirty="0">
+                          <a:solidFill>
+                            <a:schemeClr val="tx1"/>
+                          </a:solidFill>
+                        </a:rPr>
+                        <a:t>Full Parabola</a:t>
+                      </a:r>
+                    </a:p>
+                    <a:p>
+                      <a:pPr algn="ctr"/>
+                      <a:endParaRPr lang="en-GB" b="0" dirty="0">
+                        <a:solidFill>
+                          <a:schemeClr val="tx1"/>
+                        </a:solidFill>
+                      </a:endParaRPr>
+                    </a:p>
+                    <a:p>
+                      <a:pPr algn="ctr"/>
+                      <a:endParaRPr lang="en-GB" b="0" dirty="0">
+                        <a:solidFill>
+                          <a:schemeClr val="tx1"/>
+                        </a:solidFill>
+                      </a:endParaRPr>
+                    </a:p>
+                    <a:p>
+                      <a:pPr algn="ctr"/>
+                      <a:endParaRPr lang="en-GB" b="0" dirty="0">
+                        <a:solidFill>
+                          <a:schemeClr val="tx1"/>
+                        </a:solidFill>
+                      </a:endParaRPr>
+                    </a:p>
+                    <a:p>
+                      <a:pPr algn="ctr"/>
+                      <a:endParaRPr lang="en-GB" b="0" dirty="0">
+                        <a:solidFill>
+                          <a:schemeClr val="tx1"/>
+                        </a:solidFill>
+                      </a:endParaRPr>
+                    </a:p>
+                    <a:p>
+                      <a:pPr algn="ctr"/>
+                      <a:endParaRPr lang="en-GB" b="0" dirty="0">
+                        <a:solidFill>
+                          <a:schemeClr val="tx1"/>
+                        </a:solidFill>
+                      </a:endParaRPr>
+                    </a:p>
+                    <a:p>
+                      <a:pPr algn="ctr"/>
+                      <a:endParaRPr lang="en-GB" b="0" dirty="0">
+                        <a:solidFill>
+                          <a:schemeClr val="tx1"/>
+                        </a:solidFill>
+                      </a:endParaRPr>
+                    </a:p>
+                    <a:p>
+                      <a:pPr algn="ctr"/>
+                      <a:endParaRPr lang="en-GB" b="0" dirty="0">
+                        <a:solidFill>
+                          <a:schemeClr val="tx1"/>
+                        </a:solidFill>
+                      </a:endParaRPr>
+                    </a:p>
+                    <a:p>
+                      <a:pPr algn="ctr"/>
+                      <a:endParaRPr lang="en-GB" b="0" dirty="0">
+                        <a:solidFill>
+                          <a:schemeClr val="tx1"/>
+                        </a:solidFill>
+                      </a:endParaRPr>
+                    </a:p>
+                    <a:p>
+                      <a:pPr algn="l"/>
+                      <a:endParaRPr lang="en-GB" b="0" dirty="0">
+                        <a:solidFill>
+                          <a:schemeClr val="tx1"/>
+                        </a:solidFill>
+                      </a:endParaRPr>
+                    </a:p>
+                    <a:p>
+                      <a:pPr algn="l"/>
+                      <a:r>
+                        <a:rPr lang="en-GB" b="1" dirty="0">
+                          <a:solidFill>
+                            <a:schemeClr val="tx1"/>
+                          </a:solidFill>
+                        </a:rPr>
+                        <a:t>Homework Booklet:</a:t>
+                      </a:r>
+                      <a:r>
+                        <a:rPr lang="en-GB" b="0" dirty="0">
+                          <a:solidFill>
+                            <a:schemeClr val="tx1"/>
+                          </a:solidFill>
+                        </a:rPr>
+                        <a:t> C2, C9</a:t>
+                      </a:r>
+                    </a:p>
+                    <a:p>
+                      <a:pPr algn="l"/>
+                      <a:endParaRPr lang="en-GB" b="0" dirty="0">
+                        <a:solidFill>
+                          <a:schemeClr val="tx1"/>
+                        </a:solidFill>
+                      </a:endParaRPr>
+                    </a:p>
+                  </a:txBody>
+                  <a:tcPr>
+                    <a:lnL w="12700" cap="flat" cmpd="sng" algn="ctr">
+                      <a:solidFill>
+                        <a:schemeClr val="tx1"/>
+                      </a:solidFill>
+                      <a:prstDash val="solid"/>
+                      <a:round/>
+                      <a:headEnd type="none" w="med" len="med"/>
+                      <a:tailEnd type="none" w="med" len="med"/>
+                    </a:lnL>
+                    <a:lnR w="12700" cap="flat" cmpd="sng" algn="ctr">
+                      <a:solidFill>
+                        <a:schemeClr val="tx1"/>
+                      </a:solidFill>
+                      <a:prstDash val="solid"/>
+                      <a:round/>
+                      <a:headEnd type="none" w="med" len="med"/>
+                      <a:tailEnd type="none" w="med" len="med"/>
+                    </a:lnR>
+                    <a:lnT w="12700" cap="flat" cmpd="sng" algn="ctr">
+                      <a:solidFill>
+                        <a:schemeClr val="tx1"/>
+                      </a:solidFill>
+                      <a:prstDash val="solid"/>
+                      <a:round/>
+                      <a:headEnd type="none" w="med" len="med"/>
+                      <a:tailEnd type="none" w="med" len="med"/>
+                    </a:lnT>
+                    <a:lnB w="12700" cap="flat" cmpd="sng" algn="ctr">
+                      <a:solidFill>
+                        <a:schemeClr val="tx1"/>
+                      </a:solidFill>
+                      <a:prstDash val="solid"/>
+                      <a:round/>
+                      <a:headEnd type="none" w="med" len="med"/>
+                      <a:tailEnd type="none" w="med" len="med"/>
+                    </a:lnB>
+                    <a:noFill/>
+                  </a:tcPr>
+                </a:tc>
+                <a:tc>
+                  <a:txBody>
+                    <a:bodyPr/>
+                    <a:lstStyle/>
+                    <a:p>
+                      <a:pPr algn="ctr"/>
+                      <a:r>
+                        <a:rPr lang="en-GB" b="1" dirty="0">
+                          <a:solidFill>
+                            <a:schemeClr val="tx1"/>
+                          </a:solidFill>
+                        </a:rPr>
+                        <a:t>Three-Quarter Parabola</a:t>
+                      </a:r>
+                    </a:p>
+                    <a:p>
+                      <a:pPr algn="ctr"/>
+                      <a:endParaRPr lang="en-GB" b="0" dirty="0">
+                        <a:solidFill>
+                          <a:schemeClr val="tx1"/>
+                        </a:solidFill>
+                      </a:endParaRPr>
+                    </a:p>
+                    <a:p>
+                      <a:pPr algn="ctr"/>
+                      <a:endParaRPr lang="en-GB" b="0" dirty="0">
+                        <a:solidFill>
+                          <a:schemeClr val="tx1"/>
+                        </a:solidFill>
+                      </a:endParaRPr>
+                    </a:p>
+                    <a:p>
+                      <a:pPr algn="ctr"/>
+                      <a:endParaRPr lang="en-GB" b="0" dirty="0">
+                        <a:solidFill>
+                          <a:schemeClr val="tx1"/>
+                        </a:solidFill>
+                      </a:endParaRPr>
+                    </a:p>
+                    <a:p>
+                      <a:pPr algn="ctr"/>
+                      <a:endParaRPr lang="en-GB" b="0" dirty="0">
+                        <a:solidFill>
+                          <a:schemeClr val="tx1"/>
+                        </a:solidFill>
+                      </a:endParaRPr>
+                    </a:p>
+                    <a:p>
+                      <a:pPr algn="ctr"/>
+                      <a:endParaRPr lang="en-GB" b="0" dirty="0">
+                        <a:solidFill>
+                          <a:schemeClr val="tx1"/>
+                        </a:solidFill>
+                      </a:endParaRPr>
+                    </a:p>
+                    <a:p>
+                      <a:pPr algn="ctr"/>
+                      <a:endParaRPr lang="en-GB" b="0" dirty="0">
+                        <a:solidFill>
+                          <a:schemeClr val="tx1"/>
+                        </a:solidFill>
+                      </a:endParaRPr>
+                    </a:p>
+                    <a:p>
+                      <a:pPr algn="ctr"/>
+                      <a:endParaRPr lang="en-GB" b="0" dirty="0">
+                        <a:solidFill>
+                          <a:schemeClr val="tx1"/>
+                        </a:solidFill>
+                      </a:endParaRPr>
+                    </a:p>
+                    <a:p>
+                      <a:pPr algn="ctr"/>
+                      <a:endParaRPr lang="en-GB" b="0" dirty="0">
+                        <a:solidFill>
+                          <a:schemeClr val="tx1"/>
+                        </a:solidFill>
+                      </a:endParaRPr>
+                    </a:p>
+                    <a:p>
+                      <a:pPr algn="l"/>
+                      <a:endParaRPr lang="en-GB" b="0" dirty="0">
+                        <a:solidFill>
+                          <a:schemeClr val="tx1"/>
+                        </a:solidFill>
+                      </a:endParaRPr>
+                    </a:p>
+                    <a:p>
+                      <a:pPr algn="l"/>
+                      <a:r>
+                        <a:rPr lang="en-GB" b="1" dirty="0">
+                          <a:solidFill>
+                            <a:schemeClr val="tx1"/>
+                          </a:solidFill>
+                        </a:rPr>
+                        <a:t>Homework Booklet:</a:t>
+                      </a:r>
+                      <a:r>
+                        <a:rPr lang="en-GB" b="0" dirty="0">
+                          <a:solidFill>
+                            <a:schemeClr val="tx1"/>
+                          </a:solidFill>
+                        </a:rPr>
+                        <a:t> C3, C8 (hard)</a:t>
+                      </a:r>
+                    </a:p>
+                    <a:p>
+                      <a:pPr algn="l"/>
+                      <a:endParaRPr lang="en-GB" b="0" dirty="0">
+                        <a:solidFill>
+                          <a:schemeClr val="tx1"/>
+                        </a:solidFill>
+                      </a:endParaRPr>
+                    </a:p>
+                  </a:txBody>
+                  <a:tcPr>
+                    <a:lnL w="12700" cap="flat" cmpd="sng" algn="ctr">
+                      <a:solidFill>
+                        <a:schemeClr val="tx1"/>
+                      </a:solidFill>
+                      <a:prstDash val="solid"/>
+                      <a:round/>
+                      <a:headEnd type="none" w="med" len="med"/>
+                      <a:tailEnd type="none" w="med" len="med"/>
+                    </a:lnL>
+                    <a:lnR w="12700" cap="flat" cmpd="sng" algn="ctr">
+                      <a:solidFill>
+                        <a:schemeClr val="tx1"/>
+                      </a:solidFill>
+                      <a:prstDash val="solid"/>
+                      <a:round/>
+                      <a:headEnd type="none" w="med" len="med"/>
+                      <a:tailEnd type="none" w="med" len="med"/>
+                    </a:lnR>
+                    <a:lnT w="12700" cap="flat" cmpd="sng" algn="ctr">
+                      <a:solidFill>
+                        <a:schemeClr val="tx1"/>
+                      </a:solidFill>
+                      <a:prstDash val="solid"/>
+                      <a:round/>
+                      <a:headEnd type="none" w="med" len="med"/>
+                      <a:tailEnd type="none" w="med" len="med"/>
+                    </a:lnT>
+                    <a:lnB w="12700" cap="flat" cmpd="sng" algn="ctr">
+                      <a:solidFill>
+                        <a:schemeClr val="tx1"/>
+                      </a:solidFill>
+                      <a:prstDash val="solid"/>
+                      <a:round/>
+                      <a:headEnd type="none" w="med" len="med"/>
+                      <a:tailEnd type="none" w="med" len="med"/>
+                    </a:lnB>
+                    <a:noFill/>
+                  </a:tcPr>
+                </a:tc>
+                <a:extLst>
+                  <a:ext uri="{0D108BD9-81ED-4DB2-BD59-A6C34878D82A}">
+                    <a16:rowId xmlns:a16="http://schemas.microsoft.com/office/drawing/2014/main" val="2708332065"/>
+                  </a:ext>
+                </a:extLst>
+              </a:tr>
+            </a:tbl>
+          </a:graphicData>
+        </a:graphic>
+      </p:graphicFrame>
+      <p:sp>
+        <p:nvSpPr>
+          <p:cNvPr id="6" name="TextBox 5">
+            <a:extLst>
+              <a:ext uri="{FF2B5EF4-FFF2-40B4-BE49-F238E27FC236}">
+                <a16:creationId xmlns:a16="http://schemas.microsoft.com/office/drawing/2014/main" id="{8B13F348-99ED-531D-01E2-AD42892720EC}"/>
+              </a:ext>
+            </a:extLst>
+          </p:cNvPr>
+          <p:cNvSpPr txBox="1"/>
+          <p:nvPr/>
+        </p:nvSpPr>
+        <p:spPr>
+          <a:xfrm>
+            <a:off x="2783041" y="196446"/>
+            <a:ext cx="6625916" cy="523220"/>
+          </a:xfrm>
+          <a:prstGeom prst="rect">
+            <a:avLst/>
+          </a:prstGeom>
+          <a:noFill/>
+        </p:spPr>
+        <p:txBody>
+          <a:bodyPr wrap="none" rtlCol="0">
+            <a:spAutoFit/>
+          </a:bodyPr>
+          <a:lstStyle/>
+          <a:p>
+            <a:r>
+              <a:rPr lang="en-GB" sz="2800" b="1" dirty="0"/>
+              <a:t>Three Types of Projectile Motion Questions</a:t>
+            </a:r>
+          </a:p>
+        </p:txBody>
+      </p:sp>
+      <p:sp>
+        <p:nvSpPr>
+          <p:cNvPr id="4" name="AutoShape 6" descr="MECHANICS (MOTION) / PROJECTILE MOTION - Pathwayz">
+            <a:extLst>
+              <a:ext uri="{FF2B5EF4-FFF2-40B4-BE49-F238E27FC236}">
+                <a16:creationId xmlns:a16="http://schemas.microsoft.com/office/drawing/2014/main" id="{E49359FE-0FE5-EBD9-24B4-9F1CD19C96C0}"/>
+              </a:ext>
+            </a:extLst>
+          </p:cNvPr>
+          <p:cNvSpPr>
+            <a:spLocks noChangeAspect="1" noChangeArrowheads="1"/>
+          </p:cNvSpPr>
+          <p:nvPr/>
+        </p:nvSpPr>
+        <p:spPr bwMode="auto">
+          <a:xfrm>
+            <a:off x="5943600" y="1820694"/>
+            <a:ext cx="1760706" cy="1760706"/>
+          </a:xfrm>
+          <a:prstGeom prst="rect">
+            <a:avLst/>
+          </a:prstGeom>
+          <a:noFill/>
+          <a:extLst>
+            <a:ext uri="{909E8E84-426E-40DD-AFC4-6F175D3DCCD1}">
+              <a14:hiddenFill xmlns:a14="http://schemas.microsoft.com/office/drawing/2010/main">
+                <a:solidFill>
+                  <a:srgbClr val="FFFFFF"/>
+                </a:solidFill>
+              </a14:hiddenFill>
+            </a:ext>
+          </a:extLst>
+        </p:spPr>
+        <p:txBody>
+          <a:bodyPr vert="horz" wrap="square" lIns="91440" tIns="45720" rIns="91440" bIns="45720" numCol="1" anchor="t" anchorCtr="0" compatLnSpc="1">
+            <a:prstTxWarp prst="textNoShape">
+              <a:avLst/>
+            </a:prstTxWarp>
+          </a:bodyPr>
+          <a:lstStyle/>
+          <a:p>
+            <a:endParaRPr lang="en-GB"/>
+          </a:p>
+        </p:txBody>
+      </p:sp>
+      <p:grpSp>
+        <p:nvGrpSpPr>
+          <p:cNvPr id="10" name="Group 9">
+            <a:extLst>
+              <a:ext uri="{FF2B5EF4-FFF2-40B4-BE49-F238E27FC236}">
+                <a16:creationId xmlns:a16="http://schemas.microsoft.com/office/drawing/2014/main" id="{71CF2ACE-618D-829A-ED55-C515D90F42C9}"/>
+              </a:ext>
+            </a:extLst>
+          </p:cNvPr>
+          <p:cNvGrpSpPr/>
+          <p:nvPr/>
+        </p:nvGrpSpPr>
+        <p:grpSpPr>
+          <a:xfrm>
+            <a:off x="4629705" y="1307590"/>
+            <a:ext cx="2876365" cy="3077979"/>
+            <a:chOff x="648070" y="2352583"/>
+            <a:chExt cx="1899821" cy="2032986"/>
+          </a:xfrm>
+        </p:grpSpPr>
+        <p:sp>
+          <p:nvSpPr>
+            <p:cNvPr id="8" name="Arc 7">
+              <a:extLst>
+                <a:ext uri="{FF2B5EF4-FFF2-40B4-BE49-F238E27FC236}">
+                  <a16:creationId xmlns:a16="http://schemas.microsoft.com/office/drawing/2014/main" id="{230C7ED9-3DC8-17A1-22BD-2D3CCAA1BC14}"/>
+                </a:ext>
+              </a:extLst>
+            </p:cNvPr>
+            <p:cNvSpPr/>
+            <p:nvPr/>
+          </p:nvSpPr>
+          <p:spPr>
+            <a:xfrm>
+              <a:off x="648070" y="2352583"/>
+              <a:ext cx="1899821" cy="2032986"/>
+            </a:xfrm>
+            <a:prstGeom prst="arc">
+              <a:avLst/>
+            </a:prstGeom>
+            <a:ln w="28575"/>
+          </p:spPr>
+          <p:style>
+            <a:lnRef idx="1">
+              <a:schemeClr val="accent1"/>
+            </a:lnRef>
+            <a:fillRef idx="0">
+              <a:schemeClr val="accent1"/>
+            </a:fillRef>
+            <a:effectRef idx="0">
+              <a:schemeClr val="accent1"/>
+            </a:effectRef>
+            <a:fontRef idx="minor">
+              <a:schemeClr val="tx1"/>
+            </a:fontRef>
+          </p:style>
+          <p:txBody>
+            <a:bodyPr rtlCol="0" anchor="ctr"/>
+            <a:lstStyle/>
+            <a:p>
+              <a:pPr algn="ctr"/>
+              <a:endParaRPr lang="en-GB"/>
+            </a:p>
+          </p:txBody>
+        </p:sp>
+        <p:sp>
+          <p:nvSpPr>
+            <p:cNvPr id="9" name="Arc 8">
+              <a:extLst>
+                <a:ext uri="{FF2B5EF4-FFF2-40B4-BE49-F238E27FC236}">
+                  <a16:creationId xmlns:a16="http://schemas.microsoft.com/office/drawing/2014/main" id="{7781C62C-F141-307F-7325-64C5D107016D}"/>
+                </a:ext>
+              </a:extLst>
+            </p:cNvPr>
+            <p:cNvSpPr/>
+            <p:nvPr/>
+          </p:nvSpPr>
+          <p:spPr>
+            <a:xfrm flipH="1">
+              <a:off x="648070" y="2352583"/>
+              <a:ext cx="1899821" cy="2032986"/>
+            </a:xfrm>
+            <a:prstGeom prst="arc">
+              <a:avLst/>
+            </a:prstGeom>
+            <a:ln w="28575"/>
+          </p:spPr>
+          <p:style>
+            <a:lnRef idx="1">
+              <a:schemeClr val="accent1"/>
+            </a:lnRef>
+            <a:fillRef idx="0">
+              <a:schemeClr val="accent1"/>
+            </a:fillRef>
+            <a:effectRef idx="0">
+              <a:schemeClr val="accent1"/>
+            </a:effectRef>
+            <a:fontRef idx="minor">
+              <a:schemeClr val="tx1"/>
+            </a:fontRef>
+          </p:style>
+          <p:txBody>
+            <a:bodyPr rtlCol="0" anchor="ctr"/>
+            <a:lstStyle/>
+            <a:p>
+              <a:pPr algn="ctr"/>
+              <a:endParaRPr lang="en-GB"/>
+            </a:p>
+          </p:txBody>
+        </p:sp>
+      </p:grpSp>
+      <p:sp>
+        <p:nvSpPr>
+          <p:cNvPr id="12" name="Arc 11">
+            <a:extLst>
+              <a:ext uri="{FF2B5EF4-FFF2-40B4-BE49-F238E27FC236}">
+                <a16:creationId xmlns:a16="http://schemas.microsoft.com/office/drawing/2014/main" id="{261DEAE0-989F-DB51-A71C-BCF3CD38E736}"/>
+              </a:ext>
+            </a:extLst>
+          </p:cNvPr>
+          <p:cNvSpPr/>
+          <p:nvPr/>
+        </p:nvSpPr>
+        <p:spPr>
+          <a:xfrm>
+            <a:off x="793039" y="1454775"/>
+            <a:ext cx="2876365" cy="3077979"/>
+          </a:xfrm>
+          <a:prstGeom prst="arc">
+            <a:avLst/>
+          </a:prstGeom>
+          <a:ln w="28575">
+            <a:headEnd type="none" w="med" len="med"/>
+            <a:tailEnd type="triangle" w="med" len="med"/>
+          </a:ln>
+        </p:spPr>
+        <p:style>
+          <a:lnRef idx="1">
+            <a:schemeClr val="accent1"/>
+          </a:lnRef>
+          <a:fillRef idx="0">
+            <a:schemeClr val="accent1"/>
+          </a:fillRef>
+          <a:effectRef idx="0">
+            <a:schemeClr val="accent1"/>
+          </a:effectRef>
+          <a:fontRef idx="minor">
+            <a:schemeClr val="tx1"/>
+          </a:fontRef>
+        </p:style>
+        <p:txBody>
+          <a:bodyPr rtlCol="0" anchor="ctr"/>
+          <a:lstStyle/>
+          <a:p>
+            <a:pPr algn="ctr"/>
+            <a:endParaRPr lang="en-GB"/>
+          </a:p>
+        </p:txBody>
+      </p:sp>
+      <p:sp>
+        <p:nvSpPr>
+          <p:cNvPr id="14" name="Rectangle 13">
+            <a:extLst>
+              <a:ext uri="{FF2B5EF4-FFF2-40B4-BE49-F238E27FC236}">
+                <a16:creationId xmlns:a16="http://schemas.microsoft.com/office/drawing/2014/main" id="{3030DB01-6A1E-22A9-802A-CB4B8BD0E517}"/>
+              </a:ext>
+            </a:extLst>
+          </p:cNvPr>
+          <p:cNvSpPr/>
+          <p:nvPr/>
+        </p:nvSpPr>
+        <p:spPr>
+          <a:xfrm>
+            <a:off x="1349406" y="1490867"/>
+            <a:ext cx="881816" cy="1571929"/>
+          </a:xfrm>
+          <a:prstGeom prst="rect">
+            <a:avLst/>
+          </a:prstGeom>
+        </p:spPr>
+        <p:style>
+          <a:lnRef idx="2">
+            <a:schemeClr val="accent1">
+              <a:shade val="50000"/>
+            </a:schemeClr>
+          </a:lnRef>
+          <a:fillRef idx="1">
+            <a:schemeClr val="accent1"/>
+          </a:fillRef>
+          <a:effectRef idx="0">
+            <a:schemeClr val="accent1"/>
+          </a:effectRef>
+          <a:fontRef idx="minor">
+            <a:schemeClr val="lt1"/>
+          </a:fontRef>
+        </p:style>
+        <p:txBody>
+          <a:bodyPr rtlCol="0" anchor="ctr"/>
+          <a:lstStyle/>
+          <a:p>
+            <a:pPr algn="ctr"/>
+            <a:endParaRPr lang="en-GB"/>
+          </a:p>
+        </p:txBody>
+      </p:sp>
+      <p:grpSp>
+        <p:nvGrpSpPr>
+          <p:cNvPr id="15" name="Group 14">
+            <a:extLst>
+              <a:ext uri="{FF2B5EF4-FFF2-40B4-BE49-F238E27FC236}">
+                <a16:creationId xmlns:a16="http://schemas.microsoft.com/office/drawing/2014/main" id="{DBBBDC80-BF9D-031E-17C2-F30818C369B7}"/>
+              </a:ext>
+            </a:extLst>
+          </p:cNvPr>
+          <p:cNvGrpSpPr/>
+          <p:nvPr/>
+        </p:nvGrpSpPr>
+        <p:grpSpPr>
+          <a:xfrm>
+            <a:off x="8305060" y="1307589"/>
+            <a:ext cx="2876365" cy="3077979"/>
+            <a:chOff x="648070" y="2352583"/>
+            <a:chExt cx="1899821" cy="2032986"/>
+          </a:xfrm>
+        </p:grpSpPr>
+        <p:sp>
+          <p:nvSpPr>
+            <p:cNvPr id="16" name="Arc 15">
+              <a:extLst>
+                <a:ext uri="{FF2B5EF4-FFF2-40B4-BE49-F238E27FC236}">
+                  <a16:creationId xmlns:a16="http://schemas.microsoft.com/office/drawing/2014/main" id="{28DD7F05-BB96-4162-C530-46204BDB86B8}"/>
+                </a:ext>
+              </a:extLst>
+            </p:cNvPr>
+            <p:cNvSpPr/>
+            <p:nvPr/>
+          </p:nvSpPr>
+          <p:spPr>
+            <a:xfrm>
+              <a:off x="648070" y="2352583"/>
+              <a:ext cx="1899821" cy="2032986"/>
+            </a:xfrm>
+            <a:prstGeom prst="arc">
+              <a:avLst/>
+            </a:prstGeom>
+            <a:ln w="28575"/>
+          </p:spPr>
+          <p:style>
+            <a:lnRef idx="1">
+              <a:schemeClr val="accent1"/>
+            </a:lnRef>
+            <a:fillRef idx="0">
+              <a:schemeClr val="accent1"/>
+            </a:fillRef>
+            <a:effectRef idx="0">
+              <a:schemeClr val="accent1"/>
+            </a:effectRef>
+            <a:fontRef idx="minor">
+              <a:schemeClr val="tx1"/>
+            </a:fontRef>
+          </p:style>
+          <p:txBody>
+            <a:bodyPr rtlCol="0" anchor="ctr"/>
+            <a:lstStyle/>
+            <a:p>
+              <a:pPr algn="ctr"/>
+              <a:endParaRPr lang="en-GB"/>
+            </a:p>
+          </p:txBody>
+        </p:sp>
+        <p:sp>
+          <p:nvSpPr>
+            <p:cNvPr id="17" name="Arc 16">
+              <a:extLst>
+                <a:ext uri="{FF2B5EF4-FFF2-40B4-BE49-F238E27FC236}">
+                  <a16:creationId xmlns:a16="http://schemas.microsoft.com/office/drawing/2014/main" id="{908BFDBE-A893-4AD1-FB4B-A613AADDB132}"/>
+                </a:ext>
+              </a:extLst>
+            </p:cNvPr>
+            <p:cNvSpPr/>
+            <p:nvPr/>
+          </p:nvSpPr>
+          <p:spPr>
+            <a:xfrm flipH="1">
+              <a:off x="648070" y="2352583"/>
+              <a:ext cx="1899821" cy="2032986"/>
+            </a:xfrm>
+            <a:prstGeom prst="arc">
+              <a:avLst/>
+            </a:prstGeom>
+            <a:ln w="28575"/>
+          </p:spPr>
+          <p:style>
+            <a:lnRef idx="1">
+              <a:schemeClr val="accent1"/>
+            </a:lnRef>
+            <a:fillRef idx="0">
+              <a:schemeClr val="accent1"/>
+            </a:fillRef>
+            <a:effectRef idx="0">
+              <a:schemeClr val="accent1"/>
+            </a:effectRef>
+            <a:fontRef idx="minor">
+              <a:schemeClr val="tx1"/>
+            </a:fontRef>
+          </p:style>
+          <p:txBody>
+            <a:bodyPr rtlCol="0" anchor="ctr"/>
+            <a:lstStyle/>
+            <a:p>
+              <a:pPr algn="ctr"/>
+              <a:endParaRPr lang="en-GB"/>
+            </a:p>
+          </p:txBody>
+        </p:sp>
+      </p:grpSp>
+      <p:sp>
+        <p:nvSpPr>
+          <p:cNvPr id="18" name="Rectangle 17">
+            <a:extLst>
+              <a:ext uri="{FF2B5EF4-FFF2-40B4-BE49-F238E27FC236}">
+                <a16:creationId xmlns:a16="http://schemas.microsoft.com/office/drawing/2014/main" id="{99997482-FBE4-5940-3BCF-084624A53DC5}"/>
+              </a:ext>
+            </a:extLst>
+          </p:cNvPr>
+          <p:cNvSpPr/>
+          <p:nvPr/>
+        </p:nvSpPr>
+        <p:spPr>
+          <a:xfrm>
+            <a:off x="7936637" y="1820694"/>
+            <a:ext cx="736846" cy="1100059"/>
+          </a:xfrm>
+          <a:prstGeom prst="rect">
+            <a:avLst/>
+          </a:prstGeom>
+        </p:spPr>
+        <p:style>
+          <a:lnRef idx="2">
+            <a:schemeClr val="accent1">
+              <a:shade val="50000"/>
+            </a:schemeClr>
+          </a:lnRef>
+          <a:fillRef idx="1">
+            <a:schemeClr val="accent1"/>
+          </a:fillRef>
+          <a:effectRef idx="0">
+            <a:schemeClr val="accent1"/>
+          </a:effectRef>
+          <a:fontRef idx="minor">
+            <a:schemeClr val="lt1"/>
+          </a:fontRef>
+        </p:style>
+        <p:txBody>
+          <a:bodyPr rtlCol="0" anchor="ctr"/>
+          <a:lstStyle/>
+          <a:p>
+            <a:pPr algn="ctr"/>
+            <a:endParaRPr lang="en-GB"/>
+          </a:p>
+        </p:txBody>
+      </p:sp>
+    </p:spTree>
+    <p:extLst>
+      <p:ext uri="{BB962C8B-B14F-4D97-AF65-F5344CB8AC3E}">
+        <p14:creationId xmlns:p14="http://schemas.microsoft.com/office/powerpoint/2010/main" val="868315583"/>
       </p:ext>
     </p:extLst>
   </p:cSld>

</xml_diff>